<commit_message>
added appendix and started adding T-matrix theory
</commit_message>
<xml_diff>
--- a/Figures/Figures.pptx
+++ b/Figures/Figures.pptx
@@ -3469,8 +3469,8 @@
         </p:blipFill>
         <p:spPr>
           <a:xfrm>
-            <a:off x="2214282" y="1925296"/>
-            <a:ext cx="4132730" cy="3230744"/>
+            <a:off x="2250353" y="1925296"/>
+            <a:ext cx="4060586" cy="3230744"/>
           </a:xfrm>
           <a:prstGeom prst="rect">
             <a:avLst/>
@@ -3536,8 +3536,8 @@
         </p:nvSpPr>
         <p:spPr>
           <a:xfrm rot="1218298">
-            <a:off x="2472086" y="4058759"/>
-            <a:ext cx="2671142" cy="369332"/>
+            <a:off x="2425196" y="4146212"/>
+            <a:ext cx="2671142" cy="384721"/>
           </a:xfrm>
           <a:prstGeom prst="rect">
             <a:avLst/>
@@ -3551,10 +3551,10 @@
           <a:lstStyle/>
           <a:p>
             <a:r>
-              <a:rPr lang="en-US" dirty="0" smtClean="0"/>
+              <a:rPr lang="en-US" sz="1900" b="1" dirty="0" smtClean="0"/>
               <a:t>SUPERCONDUCTOR</a:t>
             </a:r>
-            <a:endParaRPr lang="en-US" dirty="0"/>
+            <a:endParaRPr lang="en-US" sz="1900" b="1" dirty="0"/>
           </a:p>
         </p:txBody>
       </p:sp>
@@ -3566,8 +3566,8 @@
         </p:nvSpPr>
         <p:spPr>
           <a:xfrm rot="1188646">
-            <a:off x="2688254" y="3704126"/>
-            <a:ext cx="2407278" cy="369332"/>
+            <a:off x="2629167" y="3878604"/>
+            <a:ext cx="2858647" cy="400110"/>
           </a:xfrm>
           <a:prstGeom prst="rect">
             <a:avLst/>
@@ -3581,15 +3581,19 @@
           <a:lstStyle/>
           <a:p>
             <a:r>
-              <a:rPr lang="en-US" dirty="0" smtClean="0"/>
+              <a:rPr lang="en-US" sz="1900" b="1" dirty="0" smtClean="0"/>
               <a:t>FERROMAGNET</a:t>
             </a:r>
-            <a:endParaRPr lang="en-US" dirty="0"/>
+            <a:r>
+              <a:rPr lang="en-US" sz="2000" b="1" dirty="0" smtClean="0"/>
+              <a:t> </a:t>
+            </a:r>
+            <a:endParaRPr lang="en-US" sz="2000" b="1" dirty="0"/>
           </a:p>
         </p:txBody>
       </p:sp>
-      <mc:AlternateContent xmlns:mc="http://schemas.openxmlformats.org/markup-compatibility/2006">
-        <mc:Choice xmlns:a14="http://schemas.microsoft.com/office/drawing/2010/main" Requires="a14">
+      <mc:AlternateContent xmlns:mc="http://schemas.openxmlformats.org/markup-compatibility/2006" xmlns:a14="http://schemas.microsoft.com/office/drawing/2010/main">
+        <mc:Choice Requires="a14">
           <p:sp>
             <p:nvSpPr>
               <p:cNvPr id="12" name="TextBox 11"/>
@@ -3641,7 +3645,7 @@
             </p:txBody>
           </p:sp>
         </mc:Choice>
-        <mc:Fallback>
+        <mc:Fallback xmlns="">
           <p:sp>
             <p:nvSpPr>
               <p:cNvPr id="12" name="TextBox 11"/>
@@ -3680,8 +3684,8 @@
           </p:sp>
         </mc:Fallback>
       </mc:AlternateContent>
-      <mc:AlternateContent xmlns:mc="http://schemas.openxmlformats.org/markup-compatibility/2006">
-        <mc:Choice xmlns:a14="http://schemas.microsoft.com/office/drawing/2010/main" Requires="a14">
+      <mc:AlternateContent xmlns:mc="http://schemas.openxmlformats.org/markup-compatibility/2006" xmlns:a14="http://schemas.microsoft.com/office/drawing/2010/main">
+        <mc:Choice Requires="a14">
           <p:sp>
             <p:nvSpPr>
               <p:cNvPr id="15" name="TextBox 14"/>
@@ -3733,7 +3737,7 @@
             </p:txBody>
           </p:sp>
         </mc:Choice>
-        <mc:Fallback>
+        <mc:Fallback xmlns="">
           <p:sp>
             <p:nvSpPr>
               <p:cNvPr id="15" name="TextBox 14"/>
@@ -3859,8 +3863,8 @@
           <a:effectLst/>
         </p:spPr>
       </p:cxnSp>
-      <mc:AlternateContent xmlns:mc="http://schemas.openxmlformats.org/markup-compatibility/2006">
-        <mc:Choice xmlns:a14="http://schemas.microsoft.com/office/drawing/2010/main" Requires="a14">
+      <mc:AlternateContent xmlns:mc="http://schemas.openxmlformats.org/markup-compatibility/2006" xmlns:a14="http://schemas.microsoft.com/office/drawing/2010/main">
+        <mc:Choice Requires="a14">
           <p:sp>
             <p:nvSpPr>
               <p:cNvPr id="27" name="TextBox 26"/>
@@ -3912,7 +3916,7 @@
             </p:txBody>
           </p:sp>
         </mc:Choice>
-        <mc:Fallback>
+        <mc:Fallback xmlns="">
           <p:sp>
             <p:nvSpPr>
               <p:cNvPr id="27" name="TextBox 26"/>
@@ -4003,8 +4007,8 @@
         </p:blipFill>
         <p:spPr>
           <a:xfrm>
-            <a:off x="2258288" y="1964957"/>
-            <a:ext cx="4061377" cy="3191082"/>
+            <a:off x="2313171" y="1964957"/>
+            <a:ext cx="3951610" cy="3191082"/>
           </a:xfrm>
           <a:prstGeom prst="rect">
             <a:avLst/>
@@ -4062,68 +4066,8 @@
           </a:p>
         </p:txBody>
       </p:sp>
-      <p:sp>
-        <p:nvSpPr>
-          <p:cNvPr id="6" name="TextBox 5"/>
-          <p:cNvSpPr txBox="1"/>
-          <p:nvPr/>
-        </p:nvSpPr>
-        <p:spPr>
-          <a:xfrm rot="1218298">
-            <a:off x="2472086" y="4058759"/>
-            <a:ext cx="2671142" cy="369332"/>
-          </a:xfrm>
-          <a:prstGeom prst="rect">
-            <a:avLst/>
-          </a:prstGeom>
-          <a:noFill/>
-        </p:spPr>
-        <p:txBody>
-          <a:bodyPr wrap="square" rtlCol="0">
-            <a:spAutoFit/>
-          </a:bodyPr>
-          <a:lstStyle/>
-          <a:p>
-            <a:r>
-              <a:rPr lang="en-US" dirty="0" smtClean="0"/>
-              <a:t>SUPERCONDUCTOR</a:t>
-            </a:r>
-            <a:endParaRPr lang="en-US" dirty="0"/>
-          </a:p>
-        </p:txBody>
-      </p:sp>
-      <p:sp>
-        <p:nvSpPr>
-          <p:cNvPr id="10" name="TextBox 9"/>
-          <p:cNvSpPr txBox="1"/>
-          <p:nvPr/>
-        </p:nvSpPr>
-        <p:spPr>
-          <a:xfrm rot="1188646">
-            <a:off x="2688254" y="3704126"/>
-            <a:ext cx="2407278" cy="369332"/>
-          </a:xfrm>
-          <a:prstGeom prst="rect">
-            <a:avLst/>
-          </a:prstGeom>
-          <a:noFill/>
-        </p:spPr>
-        <p:txBody>
-          <a:bodyPr wrap="square" rtlCol="0">
-            <a:spAutoFit/>
-          </a:bodyPr>
-          <a:lstStyle/>
-          <a:p>
-            <a:r>
-              <a:rPr lang="en-US" dirty="0" smtClean="0"/>
-              <a:t>FERROMAGNET</a:t>
-            </a:r>
-            <a:endParaRPr lang="en-US" dirty="0"/>
-          </a:p>
-        </p:txBody>
-      </p:sp>
-      <mc:AlternateContent xmlns:mc="http://schemas.openxmlformats.org/markup-compatibility/2006">
-        <mc:Choice xmlns:a14="http://schemas.microsoft.com/office/drawing/2010/main" Requires="a14">
+      <mc:AlternateContent xmlns:mc="http://schemas.openxmlformats.org/markup-compatibility/2006" xmlns:a14="http://schemas.microsoft.com/office/drawing/2010/main">
+        <mc:Choice Requires="a14">
           <p:sp>
             <p:nvSpPr>
               <p:cNvPr id="12" name="TextBox 11"/>
@@ -4175,7 +4119,7 @@
             </p:txBody>
           </p:sp>
         </mc:Choice>
-        <mc:Fallback>
+        <mc:Fallback xmlns="">
           <p:sp>
             <p:nvSpPr>
               <p:cNvPr id="12" name="TextBox 11"/>
@@ -4214,8 +4158,8 @@
           </p:sp>
         </mc:Fallback>
       </mc:AlternateContent>
-      <mc:AlternateContent xmlns:mc="http://schemas.openxmlformats.org/markup-compatibility/2006">
-        <mc:Choice xmlns:a14="http://schemas.microsoft.com/office/drawing/2010/main" Requires="a14">
+      <mc:AlternateContent xmlns:mc="http://schemas.openxmlformats.org/markup-compatibility/2006" xmlns:a14="http://schemas.microsoft.com/office/drawing/2010/main">
+        <mc:Choice Requires="a14">
           <p:sp>
             <p:nvSpPr>
               <p:cNvPr id="15" name="TextBox 14"/>
@@ -4267,7 +4211,7 @@
             </p:txBody>
           </p:sp>
         </mc:Choice>
-        <mc:Fallback>
+        <mc:Fallback xmlns="">
           <p:sp>
             <p:nvSpPr>
               <p:cNvPr id="15" name="TextBox 14"/>
@@ -4393,8 +4337,8 @@
           <a:effectLst/>
         </p:spPr>
       </p:cxnSp>
-      <mc:AlternateContent xmlns:mc="http://schemas.openxmlformats.org/markup-compatibility/2006">
-        <mc:Choice xmlns:a14="http://schemas.microsoft.com/office/drawing/2010/main" Requires="a14">
+      <mc:AlternateContent xmlns:mc="http://schemas.openxmlformats.org/markup-compatibility/2006" xmlns:a14="http://schemas.microsoft.com/office/drawing/2010/main">
+        <mc:Choice Requires="a14">
           <p:sp>
             <p:nvSpPr>
               <p:cNvPr id="27" name="TextBox 26"/>
@@ -4446,7 +4390,7 @@
             </p:txBody>
           </p:sp>
         </mc:Choice>
-        <mc:Fallback>
+        <mc:Fallback xmlns="">
           <p:sp>
             <p:nvSpPr>
               <p:cNvPr id="27" name="TextBox 26"/>
@@ -4485,6 +4429,70 @@
           </p:sp>
         </mc:Fallback>
       </mc:AlternateContent>
+      <p:sp>
+        <p:nvSpPr>
+          <p:cNvPr id="13" name="TextBox 12"/>
+          <p:cNvSpPr txBox="1"/>
+          <p:nvPr/>
+        </p:nvSpPr>
+        <p:spPr>
+          <a:xfrm rot="1218298">
+            <a:off x="2425196" y="4146212"/>
+            <a:ext cx="2671142" cy="384721"/>
+          </a:xfrm>
+          <a:prstGeom prst="rect">
+            <a:avLst/>
+          </a:prstGeom>
+          <a:noFill/>
+        </p:spPr>
+        <p:txBody>
+          <a:bodyPr wrap="square" rtlCol="0">
+            <a:spAutoFit/>
+          </a:bodyPr>
+          <a:lstStyle/>
+          <a:p>
+            <a:r>
+              <a:rPr lang="en-US" sz="1900" b="1" dirty="0" smtClean="0"/>
+              <a:t>SUPERCONDUCTOR</a:t>
+            </a:r>
+            <a:endParaRPr lang="en-US" sz="1900" b="1" dirty="0"/>
+          </a:p>
+        </p:txBody>
+      </p:sp>
+      <p:sp>
+        <p:nvSpPr>
+          <p:cNvPr id="14" name="TextBox 13"/>
+          <p:cNvSpPr txBox="1"/>
+          <p:nvPr/>
+        </p:nvSpPr>
+        <p:spPr>
+          <a:xfrm rot="1188646">
+            <a:off x="2629167" y="3878604"/>
+            <a:ext cx="2858647" cy="400110"/>
+          </a:xfrm>
+          <a:prstGeom prst="rect">
+            <a:avLst/>
+          </a:prstGeom>
+          <a:noFill/>
+        </p:spPr>
+        <p:txBody>
+          <a:bodyPr wrap="square" rtlCol="0">
+            <a:spAutoFit/>
+          </a:bodyPr>
+          <a:lstStyle/>
+          <a:p>
+            <a:r>
+              <a:rPr lang="en-US" sz="1900" b="1" dirty="0" smtClean="0"/>
+              <a:t>FERROMAGNET</a:t>
+            </a:r>
+            <a:r>
+              <a:rPr lang="en-US" sz="2000" b="1" dirty="0" smtClean="0"/>
+              <a:t> </a:t>
+            </a:r>
+            <a:endParaRPr lang="en-US" sz="2000" b="1" dirty="0"/>
+          </a:p>
+        </p:txBody>
+      </p:sp>
     </p:spTree>
     <p:extLst>
       <p:ext uri="{BB962C8B-B14F-4D97-AF65-F5344CB8AC3E}">

</xml_diff>

<commit_message>
Modified figures. Added figure of numerical wavefunction
</commit_message>
<xml_diff>
--- a/Figures/Figures.pptx
+++ b/Figures/Figures.pptx
@@ -5,11 +5,12 @@
     <p:sldMasterId id="2147483648" r:id="rId1"/>
   </p:sldMasterIdLst>
   <p:notesMasterIdLst>
-    <p:notesMasterId r:id="rId4"/>
+    <p:notesMasterId r:id="rId5"/>
   </p:notesMasterIdLst>
   <p:sldIdLst>
     <p:sldId id="337" r:id="rId2"/>
     <p:sldId id="339" r:id="rId3"/>
+    <p:sldId id="340" r:id="rId4"/>
   </p:sldIdLst>
   <p:sldSz cx="9144000" cy="6858000" type="screen4x3"/>
   <p:notesSz cx="6797675" cy="9928225"/>
@@ -3469,8 +3470,8 @@
         </p:blipFill>
         <p:spPr>
           <a:xfrm>
-            <a:off x="2250353" y="1925296"/>
-            <a:ext cx="4060586" cy="3230744"/>
+            <a:off x="2250353" y="2029093"/>
+            <a:ext cx="4060586" cy="3023150"/>
           </a:xfrm>
           <a:prstGeom prst="rect">
             <a:avLst/>
@@ -3535,8 +3536,8 @@
           <p:nvPr/>
         </p:nvSpPr>
         <p:spPr>
-          <a:xfrm rot="1218298">
-            <a:off x="2425196" y="4146212"/>
+          <a:xfrm rot="1025576">
+            <a:off x="2425784" y="4075195"/>
             <a:ext cx="2671142" cy="384721"/>
           </a:xfrm>
           <a:prstGeom prst="rect">
@@ -3565,9 +3566,9 @@
           <p:nvPr/>
         </p:nvSpPr>
         <p:spPr>
-          <a:xfrm rot="1188646">
-            <a:off x="2629167" y="3878604"/>
-            <a:ext cx="2858647" cy="400110"/>
+          <a:xfrm rot="952989">
+            <a:off x="2717137" y="3686290"/>
+            <a:ext cx="2233029" cy="400110"/>
           </a:xfrm>
           <a:prstGeom prst="rect">
             <a:avLst/>
@@ -4007,8 +4008,8 @@
         </p:blipFill>
         <p:spPr>
           <a:xfrm>
-            <a:off x="2313171" y="1964957"/>
-            <a:ext cx="3951610" cy="3191082"/>
+            <a:off x="2313171" y="2089489"/>
+            <a:ext cx="3951610" cy="2942016"/>
           </a:xfrm>
           <a:prstGeom prst="rect">
             <a:avLst/>
@@ -4431,13 +4432,13 @@
       </mc:AlternateContent>
       <p:sp>
         <p:nvSpPr>
-          <p:cNvPr id="13" name="TextBox 12"/>
+          <p:cNvPr id="16" name="TextBox 15"/>
           <p:cNvSpPr txBox="1"/>
           <p:nvPr/>
         </p:nvSpPr>
         <p:spPr>
-          <a:xfrm rot="1218298">
-            <a:off x="2425196" y="4146212"/>
+          <a:xfrm rot="973654">
+            <a:off x="2458218" y="4056313"/>
             <a:ext cx="2671142" cy="384721"/>
           </a:xfrm>
           <a:prstGeom prst="rect">
@@ -4461,14 +4462,14 @@
       </p:sp>
       <p:sp>
         <p:nvSpPr>
-          <p:cNvPr id="14" name="TextBox 13"/>
+          <p:cNvPr id="17" name="TextBox 16"/>
           <p:cNvSpPr txBox="1"/>
           <p:nvPr/>
         </p:nvSpPr>
         <p:spPr>
-          <a:xfrm rot="1188646">
-            <a:off x="2629167" y="3878604"/>
-            <a:ext cx="2858647" cy="400110"/>
+          <a:xfrm rot="952989">
+            <a:off x="2717137" y="3686290"/>
+            <a:ext cx="2233029" cy="400110"/>
           </a:xfrm>
           <a:prstGeom prst="rect">
             <a:avLst/>
@@ -4497,6 +4498,1172 @@
     <p:extLst>
       <p:ext uri="{BB962C8B-B14F-4D97-AF65-F5344CB8AC3E}">
         <p14:creationId xmlns:p14="http://schemas.microsoft.com/office/powerpoint/2010/main" val="2065695452"/>
+      </p:ext>
+    </p:extLst>
+  </p:cSld>
+  <p:clrMapOvr>
+    <a:masterClrMapping/>
+  </p:clrMapOvr>
+</p:sld>
+</file>
+
+<file path=ppt/slides/slide3.xml><?xml version="1.0" encoding="utf-8"?>
+<p:sld xmlns:a="http://schemas.openxmlformats.org/drawingml/2006/main" xmlns:r="http://schemas.openxmlformats.org/officeDocument/2006/relationships" xmlns:p="http://schemas.openxmlformats.org/presentationml/2006/main">
+  <p:cSld>
+    <p:spTree>
+      <p:nvGrpSpPr>
+        <p:cNvPr id="1" name=""/>
+        <p:cNvGrpSpPr/>
+        <p:nvPr/>
+      </p:nvGrpSpPr>
+      <p:grpSpPr>
+        <a:xfrm>
+          <a:off x="0" y="0"/>
+          <a:ext cx="0" cy="0"/>
+          <a:chOff x="0" y="0"/>
+          <a:chExt cx="0" cy="0"/>
+        </a:xfrm>
+      </p:grpSpPr>
+      <p:pic>
+        <p:nvPicPr>
+          <p:cNvPr id="4" name="Picture 3"/>
+          <p:cNvPicPr>
+            <a:picLocks noChangeAspect="1"/>
+          </p:cNvPicPr>
+          <p:nvPr/>
+        </p:nvPicPr>
+        <p:blipFill>
+          <a:blip r:embed="rId2">
+            <a:extLst>
+              <a:ext uri="{28A0092B-C50C-407E-A947-70E740481C1C}">
+                <a14:useLocalDpi xmlns:a14="http://schemas.microsoft.com/office/drawing/2010/main" val="0"/>
+              </a:ext>
+            </a:extLst>
+          </a:blip>
+          <a:stretch>
+            <a:fillRect/>
+          </a:stretch>
+        </p:blipFill>
+        <p:spPr>
+          <a:xfrm>
+            <a:off x="2344183" y="1668110"/>
+            <a:ext cx="3777441" cy="4035788"/>
+          </a:xfrm>
+          <a:prstGeom prst="rect">
+            <a:avLst/>
+          </a:prstGeom>
+        </p:spPr>
+      </p:pic>
+      <p:sp>
+        <p:nvSpPr>
+          <p:cNvPr id="2" name="Rectangle 6"/>
+          <p:cNvSpPr>
+            <a:spLocks noChangeArrowheads="1"/>
+          </p:cNvSpPr>
+          <p:nvPr/>
+        </p:nvSpPr>
+        <p:spPr bwMode="auto">
+          <a:xfrm>
+            <a:off x="2344183" y="1742904"/>
+            <a:ext cx="3889587" cy="3886200"/>
+          </a:xfrm>
+          <a:prstGeom prst="rect">
+            <a:avLst/>
+          </a:prstGeom>
+          <a:noFill/>
+          <a:ln w="9360">
+            <a:solidFill>
+              <a:srgbClr val="000000"/>
+            </a:solidFill>
+            <a:miter lim="800000"/>
+            <a:headEnd/>
+            <a:tailEnd/>
+          </a:ln>
+          <a:extLst>
+            <a:ext uri="{909E8E84-426E-40DD-AFC4-6F175D3DCCD1}">
+              <a14:hiddenFill xmlns:a14="http://schemas.microsoft.com/office/drawing/2010/main">
+                <a:solidFill>
+                  <a:srgbClr val="FFFFFF"/>
+                </a:solidFill>
+              </a14:hiddenFill>
+            </a:ext>
+          </a:extLst>
+        </p:spPr>
+        <p:txBody>
+          <a:bodyPr wrap="none" anchor="ctr"/>
+          <a:lstStyle/>
+          <a:p>
+            <a:pPr eaLnBrk="1" hangingPunct="1">
+              <a:buClr>
+                <a:srgbClr val="000000"/>
+              </a:buClr>
+              <a:buSzPct val="100000"/>
+              <a:buFont typeface="Times New Roman" panose="02020603050405020304" pitchFamily="18" charset="0"/>
+              <a:buNone/>
+            </a:pPr>
+            <a:endParaRPr lang="en-US" altLang="en-US"/>
+          </a:p>
+        </p:txBody>
+      </p:sp>
+      <mc:AlternateContent xmlns:mc="http://schemas.openxmlformats.org/markup-compatibility/2006">
+        <mc:Choice xmlns:a14="http://schemas.microsoft.com/office/drawing/2010/main" Requires="a14">
+          <p:sp>
+            <p:nvSpPr>
+              <p:cNvPr id="5" name="TextBox 4"/>
+              <p:cNvSpPr txBox="1"/>
+              <p:nvPr/>
+            </p:nvSpPr>
+            <p:spPr>
+              <a:xfrm>
+                <a:off x="5266750" y="4825477"/>
+                <a:ext cx="149079" cy="215444"/>
+              </a:xfrm>
+              <a:prstGeom prst="rect">
+                <a:avLst/>
+              </a:prstGeom>
+              <a:noFill/>
+            </p:spPr>
+            <p:txBody>
+              <a:bodyPr wrap="none" lIns="0" tIns="0" rIns="0" bIns="0" rtlCol="0">
+                <a:spAutoFit/>
+              </a:bodyPr>
+              <a:lstStyle/>
+              <a:p>
+                <a14:m>
+                  <m:oMathPara xmlns:m="http://schemas.openxmlformats.org/officeDocument/2006/math">
+                    <m:oMathParaPr>
+                      <m:jc m:val="centerGroup"/>
+                    </m:oMathParaPr>
+                    <m:oMath xmlns:m="http://schemas.openxmlformats.org/officeDocument/2006/math">
+                      <m:r>
+                        <a:rPr lang="en-US" sz="1400" b="0" i="1" smtClean="0">
+                          <a:solidFill>
+                            <a:schemeClr val="tx1"/>
+                          </a:solidFill>
+                          <a:latin typeface="Cambria Math" panose="02040503050406030204" pitchFamily="18" charset="0"/>
+                        </a:rPr>
+                        <m:t>0</m:t>
+                      </m:r>
+                    </m:oMath>
+                  </m:oMathPara>
+                </a14:m>
+                <a:endParaRPr lang="en-US" sz="1400" dirty="0"/>
+              </a:p>
+            </p:txBody>
+          </p:sp>
+        </mc:Choice>
+        <mc:Fallback>
+          <p:sp>
+            <p:nvSpPr>
+              <p:cNvPr id="5" name="TextBox 4"/>
+              <p:cNvSpPr txBox="1">
+                <a:spLocks noRot="1" noChangeAspect="1" noMove="1" noResize="1" noEditPoints="1" noAdjustHandles="1" noChangeArrowheads="1" noChangeShapeType="1" noTextEdit="1"/>
+              </p:cNvSpPr>
+              <p:nvPr/>
+            </p:nvSpPr>
+            <p:spPr>
+              <a:xfrm>
+                <a:off x="5266750" y="4825477"/>
+                <a:ext cx="149079" cy="215444"/>
+              </a:xfrm>
+              <a:prstGeom prst="rect">
+                <a:avLst/>
+              </a:prstGeom>
+              <a:blipFill rotWithShape="0">
+                <a:blip r:embed="rId3"/>
+                <a:stretch>
+                  <a:fillRect l="-25000" r="-25000" b="-8571"/>
+                </a:stretch>
+              </a:blipFill>
+            </p:spPr>
+            <p:txBody>
+              <a:bodyPr/>
+              <a:lstStyle/>
+              <a:p>
+                <a:r>
+                  <a:rPr lang="en-US">
+                    <a:noFill/>
+                  </a:rPr>
+                  <a:t> </a:t>
+                </a:r>
+              </a:p>
+            </p:txBody>
+          </p:sp>
+        </mc:Fallback>
+      </mc:AlternateContent>
+      <mc:AlternateContent xmlns:mc="http://schemas.openxmlformats.org/markup-compatibility/2006">
+        <mc:Choice xmlns:a14="http://schemas.microsoft.com/office/drawing/2010/main" Requires="a14">
+          <p:sp>
+            <p:nvSpPr>
+              <p:cNvPr id="6" name="TextBox 5"/>
+              <p:cNvSpPr txBox="1"/>
+              <p:nvPr/>
+            </p:nvSpPr>
+            <p:spPr>
+              <a:xfrm>
+                <a:off x="5558849" y="4521908"/>
+                <a:ext cx="248465" cy="215444"/>
+              </a:xfrm>
+              <a:prstGeom prst="rect">
+                <a:avLst/>
+              </a:prstGeom>
+              <a:noFill/>
+            </p:spPr>
+            <p:txBody>
+              <a:bodyPr wrap="none" lIns="0" tIns="0" rIns="0" bIns="0" rtlCol="0">
+                <a:spAutoFit/>
+              </a:bodyPr>
+              <a:lstStyle/>
+              <a:p>
+                <a14:m>
+                  <m:oMathPara xmlns:m="http://schemas.openxmlformats.org/officeDocument/2006/math">
+                    <m:oMathParaPr>
+                      <m:jc m:val="centerGroup"/>
+                    </m:oMathParaPr>
+                    <m:oMath xmlns:m="http://schemas.openxmlformats.org/officeDocument/2006/math">
+                      <m:r>
+                        <a:rPr lang="en-US" sz="1400" b="0" i="1" smtClean="0">
+                          <a:solidFill>
+                            <a:schemeClr val="tx1"/>
+                          </a:solidFill>
+                          <a:latin typeface="Cambria Math" panose="02040503050406030204" pitchFamily="18" charset="0"/>
+                        </a:rPr>
+                        <m:t>10</m:t>
+                      </m:r>
+                    </m:oMath>
+                  </m:oMathPara>
+                </a14:m>
+                <a:endParaRPr lang="en-US" sz="1400" dirty="0"/>
+              </a:p>
+            </p:txBody>
+          </p:sp>
+        </mc:Choice>
+        <mc:Fallback>
+          <p:sp>
+            <p:nvSpPr>
+              <p:cNvPr id="6" name="TextBox 5"/>
+              <p:cNvSpPr txBox="1">
+                <a:spLocks noRot="1" noChangeAspect="1" noMove="1" noResize="1" noEditPoints="1" noAdjustHandles="1" noChangeArrowheads="1" noChangeShapeType="1" noTextEdit="1"/>
+              </p:cNvSpPr>
+              <p:nvPr/>
+            </p:nvSpPr>
+            <p:spPr>
+              <a:xfrm>
+                <a:off x="5558849" y="4521908"/>
+                <a:ext cx="248465" cy="215444"/>
+              </a:xfrm>
+              <a:prstGeom prst="rect">
+                <a:avLst/>
+              </a:prstGeom>
+              <a:blipFill rotWithShape="0">
+                <a:blip r:embed="rId4"/>
+                <a:stretch>
+                  <a:fillRect l="-14634" r="-12195" b="-8571"/>
+                </a:stretch>
+              </a:blipFill>
+            </p:spPr>
+            <p:txBody>
+              <a:bodyPr/>
+              <a:lstStyle/>
+              <a:p>
+                <a:r>
+                  <a:rPr lang="en-US">
+                    <a:noFill/>
+                  </a:rPr>
+                  <a:t> </a:t>
+                </a:r>
+              </a:p>
+            </p:txBody>
+          </p:sp>
+        </mc:Fallback>
+      </mc:AlternateContent>
+      <mc:AlternateContent xmlns:mc="http://schemas.openxmlformats.org/markup-compatibility/2006">
+        <mc:Choice xmlns:a14="http://schemas.microsoft.com/office/drawing/2010/main" Requires="a14">
+          <p:sp>
+            <p:nvSpPr>
+              <p:cNvPr id="7" name="TextBox 6"/>
+              <p:cNvSpPr txBox="1"/>
+              <p:nvPr/>
+            </p:nvSpPr>
+            <p:spPr>
+              <a:xfrm>
+                <a:off x="4924858" y="5163400"/>
+                <a:ext cx="258084" cy="215444"/>
+              </a:xfrm>
+              <a:prstGeom prst="rect">
+                <a:avLst/>
+              </a:prstGeom>
+              <a:noFill/>
+            </p:spPr>
+            <p:txBody>
+              <a:bodyPr wrap="none" lIns="0" tIns="0" rIns="0" bIns="0" rtlCol="0">
+                <a:spAutoFit/>
+              </a:bodyPr>
+              <a:lstStyle/>
+              <a:p>
+                <a:r>
+                  <a:rPr lang="en-US" sz="1400" b="0" dirty="0" smtClean="0">
+                    <a:solidFill>
+                      <a:schemeClr val="tx1"/>
+                    </a:solidFill>
+                  </a:rPr>
+                  <a:t>-</a:t>
+                </a:r>
+                <a14:m>
+                  <m:oMath xmlns:m="http://schemas.openxmlformats.org/officeDocument/2006/math">
+                    <m:r>
+                      <a:rPr lang="en-US" sz="1400" b="0" i="1" smtClean="0">
+                        <a:solidFill>
+                          <a:schemeClr val="tx1"/>
+                        </a:solidFill>
+                        <a:latin typeface="Cambria Math" panose="02040503050406030204" pitchFamily="18" charset="0"/>
+                      </a:rPr>
+                      <m:t>10</m:t>
+                    </m:r>
+                  </m:oMath>
+                </a14:m>
+                <a:endParaRPr lang="en-US" sz="1400" dirty="0"/>
+              </a:p>
+            </p:txBody>
+          </p:sp>
+        </mc:Choice>
+        <mc:Fallback>
+          <p:sp>
+            <p:nvSpPr>
+              <p:cNvPr id="7" name="TextBox 6"/>
+              <p:cNvSpPr txBox="1">
+                <a:spLocks noRot="1" noChangeAspect="1" noMove="1" noResize="1" noEditPoints="1" noAdjustHandles="1" noChangeArrowheads="1" noChangeShapeType="1" noTextEdit="1"/>
+              </p:cNvSpPr>
+              <p:nvPr/>
+            </p:nvSpPr>
+            <p:spPr>
+              <a:xfrm>
+                <a:off x="4924858" y="5163400"/>
+                <a:ext cx="258084" cy="215444"/>
+              </a:xfrm>
+              <a:prstGeom prst="rect">
+                <a:avLst/>
+              </a:prstGeom>
+              <a:blipFill rotWithShape="0">
+                <a:blip r:embed="rId5"/>
+                <a:stretch>
+                  <a:fillRect l="-42857" t="-25714" r="-23810" b="-51429"/>
+                </a:stretch>
+              </a:blipFill>
+            </p:spPr>
+            <p:txBody>
+              <a:bodyPr/>
+              <a:lstStyle/>
+              <a:p>
+                <a:r>
+                  <a:rPr lang="en-US">
+                    <a:noFill/>
+                  </a:rPr>
+                  <a:t> </a:t>
+                </a:r>
+              </a:p>
+            </p:txBody>
+          </p:sp>
+        </mc:Fallback>
+      </mc:AlternateContent>
+      <mc:AlternateContent xmlns:mc="http://schemas.openxmlformats.org/markup-compatibility/2006">
+        <mc:Choice xmlns:a14="http://schemas.microsoft.com/office/drawing/2010/main" Requires="a14">
+          <p:sp>
+            <p:nvSpPr>
+              <p:cNvPr id="8" name="TextBox 7"/>
+              <p:cNvSpPr txBox="1"/>
+              <p:nvPr/>
+            </p:nvSpPr>
+            <p:spPr>
+              <a:xfrm>
+                <a:off x="3467979" y="4958507"/>
+                <a:ext cx="149079" cy="215444"/>
+              </a:xfrm>
+              <a:prstGeom prst="rect">
+                <a:avLst/>
+              </a:prstGeom>
+              <a:noFill/>
+            </p:spPr>
+            <p:txBody>
+              <a:bodyPr wrap="none" lIns="0" tIns="0" rIns="0" bIns="0" rtlCol="0">
+                <a:spAutoFit/>
+              </a:bodyPr>
+              <a:lstStyle/>
+              <a:p>
+                <a14:m>
+                  <m:oMathPara xmlns:m="http://schemas.openxmlformats.org/officeDocument/2006/math">
+                    <m:oMathParaPr>
+                      <m:jc m:val="centerGroup"/>
+                    </m:oMathParaPr>
+                    <m:oMath xmlns:m="http://schemas.openxmlformats.org/officeDocument/2006/math">
+                      <m:r>
+                        <a:rPr lang="en-US" sz="1400" b="0" i="1" smtClean="0">
+                          <a:solidFill>
+                            <a:schemeClr val="tx1"/>
+                          </a:solidFill>
+                          <a:latin typeface="Cambria Math" panose="02040503050406030204" pitchFamily="18" charset="0"/>
+                        </a:rPr>
+                        <m:t>0</m:t>
+                      </m:r>
+                    </m:oMath>
+                  </m:oMathPara>
+                </a14:m>
+                <a:endParaRPr lang="en-US" sz="1400" dirty="0"/>
+              </a:p>
+            </p:txBody>
+          </p:sp>
+        </mc:Choice>
+        <mc:Fallback>
+          <p:sp>
+            <p:nvSpPr>
+              <p:cNvPr id="8" name="TextBox 7"/>
+              <p:cNvSpPr txBox="1">
+                <a:spLocks noRot="1" noChangeAspect="1" noMove="1" noResize="1" noEditPoints="1" noAdjustHandles="1" noChangeArrowheads="1" noChangeShapeType="1" noTextEdit="1"/>
+              </p:cNvSpPr>
+              <p:nvPr/>
+            </p:nvSpPr>
+            <p:spPr>
+              <a:xfrm>
+                <a:off x="3467979" y="4958507"/>
+                <a:ext cx="149079" cy="215444"/>
+              </a:xfrm>
+              <a:prstGeom prst="rect">
+                <a:avLst/>
+              </a:prstGeom>
+              <a:blipFill rotWithShape="0">
+                <a:blip r:embed="rId3"/>
+                <a:stretch>
+                  <a:fillRect l="-25000" r="-25000" b="-5556"/>
+                </a:stretch>
+              </a:blipFill>
+            </p:spPr>
+            <p:txBody>
+              <a:bodyPr/>
+              <a:lstStyle/>
+              <a:p>
+                <a:r>
+                  <a:rPr lang="en-US">
+                    <a:noFill/>
+                  </a:rPr>
+                  <a:t> </a:t>
+                </a:r>
+              </a:p>
+            </p:txBody>
+          </p:sp>
+        </mc:Fallback>
+      </mc:AlternateContent>
+      <mc:AlternateContent xmlns:mc="http://schemas.openxmlformats.org/markup-compatibility/2006">
+        <mc:Choice xmlns:a14="http://schemas.microsoft.com/office/drawing/2010/main" Requires="a14">
+          <p:sp>
+            <p:nvSpPr>
+              <p:cNvPr id="9" name="TextBox 8"/>
+              <p:cNvSpPr txBox="1"/>
+              <p:nvPr/>
+            </p:nvSpPr>
+            <p:spPr>
+              <a:xfrm>
+                <a:off x="3809711" y="5214405"/>
+                <a:ext cx="248465" cy="215444"/>
+              </a:xfrm>
+              <a:prstGeom prst="rect">
+                <a:avLst/>
+              </a:prstGeom>
+              <a:noFill/>
+            </p:spPr>
+            <p:txBody>
+              <a:bodyPr wrap="none" lIns="0" tIns="0" rIns="0" bIns="0" rtlCol="0">
+                <a:spAutoFit/>
+              </a:bodyPr>
+              <a:lstStyle/>
+              <a:p>
+                <a14:m>
+                  <m:oMathPara xmlns:m="http://schemas.openxmlformats.org/officeDocument/2006/math">
+                    <m:oMathParaPr>
+                      <m:jc m:val="centerGroup"/>
+                    </m:oMathParaPr>
+                    <m:oMath xmlns:m="http://schemas.openxmlformats.org/officeDocument/2006/math">
+                      <m:r>
+                        <a:rPr lang="en-US" sz="1400" b="0" i="0" smtClean="0">
+                          <a:solidFill>
+                            <a:schemeClr val="tx1"/>
+                          </a:solidFill>
+                          <a:latin typeface="Cambria Math" panose="02040503050406030204" pitchFamily="18" charset="0"/>
+                        </a:rPr>
+                        <m:t>1</m:t>
+                      </m:r>
+                      <m:r>
+                        <a:rPr lang="en-US" sz="1400" b="0" i="1" smtClean="0">
+                          <a:solidFill>
+                            <a:schemeClr val="tx1"/>
+                          </a:solidFill>
+                          <a:latin typeface="Cambria Math" panose="02040503050406030204" pitchFamily="18" charset="0"/>
+                        </a:rPr>
+                        <m:t>0</m:t>
+                      </m:r>
+                    </m:oMath>
+                  </m:oMathPara>
+                </a14:m>
+                <a:endParaRPr lang="en-US" sz="1400" dirty="0"/>
+              </a:p>
+            </p:txBody>
+          </p:sp>
+        </mc:Choice>
+        <mc:Fallback>
+          <p:sp>
+            <p:nvSpPr>
+              <p:cNvPr id="9" name="TextBox 8"/>
+              <p:cNvSpPr txBox="1">
+                <a:spLocks noRot="1" noChangeAspect="1" noMove="1" noResize="1" noEditPoints="1" noAdjustHandles="1" noChangeArrowheads="1" noChangeShapeType="1" noTextEdit="1"/>
+              </p:cNvSpPr>
+              <p:nvPr/>
+            </p:nvSpPr>
+            <p:spPr>
+              <a:xfrm>
+                <a:off x="3809711" y="5214405"/>
+                <a:ext cx="248465" cy="215444"/>
+              </a:xfrm>
+              <a:prstGeom prst="rect">
+                <a:avLst/>
+              </a:prstGeom>
+              <a:blipFill rotWithShape="0">
+                <a:blip r:embed="rId4"/>
+                <a:stretch>
+                  <a:fillRect l="-14634" r="-12195" b="-5556"/>
+                </a:stretch>
+              </a:blipFill>
+            </p:spPr>
+            <p:txBody>
+              <a:bodyPr/>
+              <a:lstStyle/>
+              <a:p>
+                <a:r>
+                  <a:rPr lang="en-US">
+                    <a:noFill/>
+                  </a:rPr>
+                  <a:t> </a:t>
+                </a:r>
+              </a:p>
+            </p:txBody>
+          </p:sp>
+        </mc:Fallback>
+      </mc:AlternateContent>
+      <mc:AlternateContent xmlns:mc="http://schemas.openxmlformats.org/markup-compatibility/2006">
+        <mc:Choice xmlns:a14="http://schemas.microsoft.com/office/drawing/2010/main" Requires="a14">
+          <p:sp>
+            <p:nvSpPr>
+              <p:cNvPr id="10" name="TextBox 9"/>
+              <p:cNvSpPr txBox="1"/>
+              <p:nvPr/>
+            </p:nvSpPr>
+            <p:spPr>
+              <a:xfrm>
+                <a:off x="2893550" y="4717755"/>
+                <a:ext cx="258084" cy="215444"/>
+              </a:xfrm>
+              <a:prstGeom prst="rect">
+                <a:avLst/>
+              </a:prstGeom>
+              <a:noFill/>
+            </p:spPr>
+            <p:txBody>
+              <a:bodyPr wrap="none" lIns="0" tIns="0" rIns="0" bIns="0" rtlCol="0">
+                <a:spAutoFit/>
+              </a:bodyPr>
+              <a:lstStyle/>
+              <a:p>
+                <a:r>
+                  <a:rPr lang="en-US" sz="1400" b="0" dirty="0" smtClean="0">
+                    <a:solidFill>
+                      <a:schemeClr val="tx1"/>
+                    </a:solidFill>
+                  </a:rPr>
+                  <a:t>-</a:t>
+                </a:r>
+                <a14:m>
+                  <m:oMath xmlns:m="http://schemas.openxmlformats.org/officeDocument/2006/math">
+                    <m:r>
+                      <a:rPr lang="en-US" sz="1400" b="0" i="0" smtClean="0">
+                        <a:solidFill>
+                          <a:schemeClr val="tx1"/>
+                        </a:solidFill>
+                        <a:latin typeface="Cambria Math" panose="02040503050406030204" pitchFamily="18" charset="0"/>
+                      </a:rPr>
+                      <m:t>1</m:t>
+                    </m:r>
+                    <m:r>
+                      <a:rPr lang="en-US" sz="1400" b="0" i="1" smtClean="0">
+                        <a:solidFill>
+                          <a:schemeClr val="tx1"/>
+                        </a:solidFill>
+                        <a:latin typeface="Cambria Math" panose="02040503050406030204" pitchFamily="18" charset="0"/>
+                      </a:rPr>
+                      <m:t>0</m:t>
+                    </m:r>
+                  </m:oMath>
+                </a14:m>
+                <a:endParaRPr lang="en-US" sz="1400" dirty="0"/>
+              </a:p>
+            </p:txBody>
+          </p:sp>
+        </mc:Choice>
+        <mc:Fallback>
+          <p:sp>
+            <p:nvSpPr>
+              <p:cNvPr id="10" name="TextBox 9"/>
+              <p:cNvSpPr txBox="1">
+                <a:spLocks noRot="1" noChangeAspect="1" noMove="1" noResize="1" noEditPoints="1" noAdjustHandles="1" noChangeArrowheads="1" noChangeShapeType="1" noTextEdit="1"/>
+              </p:cNvSpPr>
+              <p:nvPr/>
+            </p:nvSpPr>
+            <p:spPr>
+              <a:xfrm>
+                <a:off x="2893550" y="4717755"/>
+                <a:ext cx="258084" cy="215444"/>
+              </a:xfrm>
+              <a:prstGeom prst="rect">
+                <a:avLst/>
+              </a:prstGeom>
+              <a:blipFill rotWithShape="0">
+                <a:blip r:embed="rId5"/>
+                <a:stretch>
+                  <a:fillRect l="-42857" t="-25714" r="-23810" b="-51429"/>
+                </a:stretch>
+              </a:blipFill>
+            </p:spPr>
+            <p:txBody>
+              <a:bodyPr/>
+              <a:lstStyle/>
+              <a:p>
+                <a:r>
+                  <a:rPr lang="en-US">
+                    <a:noFill/>
+                  </a:rPr>
+                  <a:t> </a:t>
+                </a:r>
+              </a:p>
+            </p:txBody>
+          </p:sp>
+        </mc:Fallback>
+      </mc:AlternateContent>
+      <mc:AlternateContent xmlns:mc="http://schemas.openxmlformats.org/markup-compatibility/2006">
+        <mc:Choice xmlns:a14="http://schemas.microsoft.com/office/drawing/2010/main" Requires="a14">
+          <p:sp>
+            <p:nvSpPr>
+              <p:cNvPr id="11" name="TextBox 10"/>
+              <p:cNvSpPr txBox="1"/>
+              <p:nvPr/>
+            </p:nvSpPr>
+            <p:spPr>
+              <a:xfrm>
+                <a:off x="2605282" y="4383079"/>
+                <a:ext cx="149079" cy="215444"/>
+              </a:xfrm>
+              <a:prstGeom prst="rect">
+                <a:avLst/>
+              </a:prstGeom>
+              <a:noFill/>
+            </p:spPr>
+            <p:txBody>
+              <a:bodyPr wrap="none" lIns="0" tIns="0" rIns="0" bIns="0" rtlCol="0">
+                <a:spAutoFit/>
+              </a:bodyPr>
+              <a:lstStyle/>
+              <a:p>
+                <a14:m>
+                  <m:oMathPara xmlns:m="http://schemas.openxmlformats.org/officeDocument/2006/math">
+                    <m:oMathParaPr>
+                      <m:jc m:val="centerGroup"/>
+                    </m:oMathParaPr>
+                    <m:oMath xmlns:m="http://schemas.openxmlformats.org/officeDocument/2006/math">
+                      <m:r>
+                        <a:rPr lang="en-US" sz="1400" b="0" i="1" smtClean="0">
+                          <a:solidFill>
+                            <a:schemeClr val="tx1"/>
+                          </a:solidFill>
+                          <a:latin typeface="Cambria Math" panose="02040503050406030204" pitchFamily="18" charset="0"/>
+                        </a:rPr>
+                        <m:t>0</m:t>
+                      </m:r>
+                    </m:oMath>
+                  </m:oMathPara>
+                </a14:m>
+                <a:endParaRPr lang="en-US" sz="1400" dirty="0"/>
+              </a:p>
+            </p:txBody>
+          </p:sp>
+        </mc:Choice>
+        <mc:Fallback>
+          <p:sp>
+            <p:nvSpPr>
+              <p:cNvPr id="11" name="TextBox 10"/>
+              <p:cNvSpPr txBox="1">
+                <a:spLocks noRot="1" noChangeAspect="1" noMove="1" noResize="1" noEditPoints="1" noAdjustHandles="1" noChangeArrowheads="1" noChangeShapeType="1" noTextEdit="1"/>
+              </p:cNvSpPr>
+              <p:nvPr/>
+            </p:nvSpPr>
+            <p:spPr>
+              <a:xfrm>
+                <a:off x="2605282" y="4383079"/>
+                <a:ext cx="149079" cy="215444"/>
+              </a:xfrm>
+              <a:prstGeom prst="rect">
+                <a:avLst/>
+              </a:prstGeom>
+              <a:blipFill rotWithShape="0">
+                <a:blip r:embed="rId3"/>
+                <a:stretch>
+                  <a:fillRect l="-24000" r="-20000" b="-8571"/>
+                </a:stretch>
+              </a:blipFill>
+            </p:spPr>
+            <p:txBody>
+              <a:bodyPr/>
+              <a:lstStyle/>
+              <a:p>
+                <a:r>
+                  <a:rPr lang="en-US">
+                    <a:noFill/>
+                  </a:rPr>
+                  <a:t> </a:t>
+                </a:r>
+              </a:p>
+            </p:txBody>
+          </p:sp>
+        </mc:Fallback>
+      </mc:AlternateContent>
+      <mc:AlternateContent xmlns:mc="http://schemas.openxmlformats.org/markup-compatibility/2006">
+        <mc:Choice xmlns:a14="http://schemas.microsoft.com/office/drawing/2010/main" Requires="a14">
+          <p:sp>
+            <p:nvSpPr>
+              <p:cNvPr id="12" name="TextBox 11"/>
+              <p:cNvSpPr txBox="1"/>
+              <p:nvPr/>
+            </p:nvSpPr>
+            <p:spPr>
+              <a:xfrm>
+                <a:off x="2689973" y="3633313"/>
+                <a:ext cx="484107" cy="215444"/>
+              </a:xfrm>
+              <a:prstGeom prst="rect">
+                <a:avLst/>
+              </a:prstGeom>
+              <a:noFill/>
+            </p:spPr>
+            <p:txBody>
+              <a:bodyPr wrap="none" lIns="0" tIns="0" rIns="0" bIns="0" rtlCol="0">
+                <a:spAutoFit/>
+              </a:bodyPr>
+              <a:lstStyle/>
+              <a:p>
+                <a14:m>
+                  <m:oMathPara xmlns:m="http://schemas.openxmlformats.org/officeDocument/2006/math">
+                    <m:oMathParaPr>
+                      <m:jc m:val="centerGroup"/>
+                    </m:oMathParaPr>
+                    <m:oMath xmlns:m="http://schemas.openxmlformats.org/officeDocument/2006/math">
+                      <m:r>
+                        <a:rPr lang="en-US" sz="1400" b="0" i="1" smtClean="0">
+                          <a:solidFill>
+                            <a:schemeClr val="tx1"/>
+                          </a:solidFill>
+                          <a:latin typeface="Cambria Math" panose="02040503050406030204" pitchFamily="18" charset="0"/>
+                        </a:rPr>
+                        <m:t>0.002</m:t>
+                      </m:r>
+                    </m:oMath>
+                  </m:oMathPara>
+                </a14:m>
+                <a:endParaRPr lang="en-US" sz="1400" dirty="0"/>
+              </a:p>
+            </p:txBody>
+          </p:sp>
+        </mc:Choice>
+        <mc:Fallback>
+          <p:sp>
+            <p:nvSpPr>
+              <p:cNvPr id="12" name="TextBox 11"/>
+              <p:cNvSpPr txBox="1">
+                <a:spLocks noRot="1" noChangeAspect="1" noMove="1" noResize="1" noEditPoints="1" noAdjustHandles="1" noChangeArrowheads="1" noChangeShapeType="1" noTextEdit="1"/>
+              </p:cNvSpPr>
+              <p:nvPr/>
+            </p:nvSpPr>
+            <p:spPr>
+              <a:xfrm>
+                <a:off x="2689973" y="3633313"/>
+                <a:ext cx="484107" cy="215444"/>
+              </a:xfrm>
+              <a:prstGeom prst="rect">
+                <a:avLst/>
+              </a:prstGeom>
+              <a:blipFill rotWithShape="0">
+                <a:blip r:embed="rId6"/>
+                <a:stretch>
+                  <a:fillRect l="-7500" r="-5000" b="-8571"/>
+                </a:stretch>
+              </a:blipFill>
+            </p:spPr>
+            <p:txBody>
+              <a:bodyPr/>
+              <a:lstStyle/>
+              <a:p>
+                <a:r>
+                  <a:rPr lang="en-US">
+                    <a:noFill/>
+                  </a:rPr>
+                  <a:t> </a:t>
+                </a:r>
+              </a:p>
+            </p:txBody>
+          </p:sp>
+        </mc:Fallback>
+      </mc:AlternateContent>
+      <mc:AlternateContent xmlns:mc="http://schemas.openxmlformats.org/markup-compatibility/2006">
+        <mc:Choice xmlns:a14="http://schemas.microsoft.com/office/drawing/2010/main" Requires="a14">
+          <p:sp>
+            <p:nvSpPr>
+              <p:cNvPr id="14" name="TextBox 13"/>
+              <p:cNvSpPr txBox="1"/>
+              <p:nvPr/>
+            </p:nvSpPr>
+            <p:spPr>
+              <a:xfrm>
+                <a:off x="2483612" y="2602732"/>
+                <a:ext cx="392418" cy="523220"/>
+              </a:xfrm>
+              <a:prstGeom prst="rect">
+                <a:avLst/>
+              </a:prstGeom>
+              <a:noFill/>
+            </p:spPr>
+            <p:txBody>
+              <a:bodyPr wrap="square" rtlCol="0">
+                <a:spAutoFit/>
+              </a:bodyPr>
+              <a:lstStyle/>
+              <a:p>
+                <a:pPr/>
+                <a14:m>
+                  <m:oMathPara xmlns:m="http://schemas.openxmlformats.org/officeDocument/2006/math">
+                    <m:oMathParaPr>
+                      <m:jc m:val="centerGroup"/>
+                    </m:oMathParaPr>
+                    <m:oMath xmlns:m="http://schemas.openxmlformats.org/officeDocument/2006/math">
+                      <m:sSup>
+                        <m:sSupPr>
+                          <m:ctrlPr>
+                            <a:rPr lang="en-US" sz="2800" b="0" i="1" smtClean="0">
+                              <a:solidFill>
+                                <a:schemeClr val="tx1"/>
+                              </a:solidFill>
+                              <a:latin typeface="Cambria Math" panose="02040503050406030204" pitchFamily="18" charset="0"/>
+                            </a:rPr>
+                          </m:ctrlPr>
+                        </m:sSupPr>
+                        <m:e>
+                          <m:r>
+                            <m:rPr>
+                              <m:sty m:val="p"/>
+                            </m:rPr>
+                            <a:rPr lang="en-US" sz="2800" b="0" i="0" smtClean="0">
+                              <a:solidFill>
+                                <a:schemeClr val="tx1"/>
+                              </a:solidFill>
+                              <a:latin typeface="Cambria Math" panose="02040503050406030204" pitchFamily="18" charset="0"/>
+                            </a:rPr>
+                            <m:t>Ψ</m:t>
+                          </m:r>
+                        </m:e>
+                        <m:sup>
+                          <m:r>
+                            <a:rPr lang="en-US" sz="2800" b="0" i="1" smtClean="0">
+                              <a:solidFill>
+                                <a:schemeClr val="tx1"/>
+                              </a:solidFill>
+                              <a:latin typeface="Cambria Math" panose="02040503050406030204" pitchFamily="18" charset="0"/>
+                            </a:rPr>
+                            <m:t>2</m:t>
+                          </m:r>
+                        </m:sup>
+                      </m:sSup>
+                    </m:oMath>
+                  </m:oMathPara>
+                </a14:m>
+                <a:endParaRPr lang="en-US" sz="2800" dirty="0">
+                  <a:solidFill>
+                    <a:schemeClr val="tx1"/>
+                  </a:solidFill>
+                  <a:latin typeface="Cambria" panose="02040503050406030204" pitchFamily="18" charset="0"/>
+                </a:endParaRPr>
+              </a:p>
+            </p:txBody>
+          </p:sp>
+        </mc:Choice>
+        <mc:Fallback>
+          <p:sp>
+            <p:nvSpPr>
+              <p:cNvPr id="14" name="TextBox 13"/>
+              <p:cNvSpPr txBox="1">
+                <a:spLocks noRot="1" noChangeAspect="1" noMove="1" noResize="1" noEditPoints="1" noAdjustHandles="1" noChangeArrowheads="1" noChangeShapeType="1" noTextEdit="1"/>
+              </p:cNvSpPr>
+              <p:nvPr/>
+            </p:nvSpPr>
+            <p:spPr>
+              <a:xfrm>
+                <a:off x="2483612" y="2602732"/>
+                <a:ext cx="392418" cy="523220"/>
+              </a:xfrm>
+              <a:prstGeom prst="rect">
+                <a:avLst/>
+              </a:prstGeom>
+              <a:blipFill rotWithShape="0">
+                <a:blip r:embed="rId7"/>
+                <a:stretch>
+                  <a:fillRect r="-27692"/>
+                </a:stretch>
+              </a:blipFill>
+            </p:spPr>
+            <p:txBody>
+              <a:bodyPr/>
+              <a:lstStyle/>
+              <a:p>
+                <a:r>
+                  <a:rPr lang="en-US">
+                    <a:noFill/>
+                  </a:rPr>
+                  <a:t> </a:t>
+                </a:r>
+              </a:p>
+            </p:txBody>
+          </p:sp>
+        </mc:Fallback>
+      </mc:AlternateContent>
+      <mc:AlternateContent xmlns:mc="http://schemas.openxmlformats.org/markup-compatibility/2006">
+        <mc:Choice xmlns:a14="http://schemas.microsoft.com/office/drawing/2010/main" Requires="a14">
+          <p:sp>
+            <p:nvSpPr>
+              <p:cNvPr id="15" name="TextBox 14"/>
+              <p:cNvSpPr txBox="1"/>
+              <p:nvPr/>
+            </p:nvSpPr>
+            <p:spPr>
+              <a:xfrm rot="1931034">
+                <a:off x="2878834" y="4930325"/>
+                <a:ext cx="875532" cy="523220"/>
+              </a:xfrm>
+              <a:prstGeom prst="rect">
+                <a:avLst/>
+              </a:prstGeom>
+              <a:noFill/>
+            </p:spPr>
+            <p:txBody>
+              <a:bodyPr wrap="square" rtlCol="0">
+                <a:spAutoFit/>
+              </a:bodyPr>
+              <a:lstStyle/>
+              <a:p>
+                <a:pPr/>
+                <a14:m>
+                  <m:oMathPara xmlns:m="http://schemas.openxmlformats.org/officeDocument/2006/math">
+                    <m:oMathParaPr>
+                      <m:jc m:val="centerGroup"/>
+                    </m:oMathParaPr>
+                    <m:oMath xmlns:m="http://schemas.openxmlformats.org/officeDocument/2006/math">
+                      <m:r>
+                        <a:rPr lang="en-US" sz="2800" b="0" i="1" smtClean="0">
+                          <a:solidFill>
+                            <a:schemeClr val="tx1"/>
+                          </a:solidFill>
+                          <a:latin typeface="Cambria Math" panose="02040503050406030204" pitchFamily="18" charset="0"/>
+                        </a:rPr>
+                        <m:t>𝑥</m:t>
+                      </m:r>
+                      <m:r>
+                        <a:rPr lang="en-US" sz="2800" b="0" i="1" smtClean="0">
+                          <a:solidFill>
+                            <a:schemeClr val="tx1"/>
+                          </a:solidFill>
+                          <a:latin typeface="Cambria Math" panose="02040503050406030204" pitchFamily="18" charset="0"/>
+                        </a:rPr>
+                        <m:t>/</m:t>
+                      </m:r>
+                      <m:r>
+                        <a:rPr lang="en-US" sz="2800" b="0" i="1" smtClean="0">
+                          <a:solidFill>
+                            <a:schemeClr val="tx1"/>
+                          </a:solidFill>
+                          <a:latin typeface="Cambria Math" panose="02040503050406030204" pitchFamily="18" charset="0"/>
+                        </a:rPr>
+                        <m:t>𝑎</m:t>
+                      </m:r>
+                    </m:oMath>
+                  </m:oMathPara>
+                </a14:m>
+                <a:endParaRPr lang="en-US" sz="2800" dirty="0">
+                  <a:solidFill>
+                    <a:schemeClr val="tx1"/>
+                  </a:solidFill>
+                  <a:latin typeface="Cambria" panose="02040503050406030204" pitchFamily="18" charset="0"/>
+                </a:endParaRPr>
+              </a:p>
+            </p:txBody>
+          </p:sp>
+        </mc:Choice>
+        <mc:Fallback>
+          <p:sp>
+            <p:nvSpPr>
+              <p:cNvPr id="15" name="TextBox 14"/>
+              <p:cNvSpPr txBox="1">
+                <a:spLocks noRot="1" noChangeAspect="1" noMove="1" noResize="1" noEditPoints="1" noAdjustHandles="1" noChangeArrowheads="1" noChangeShapeType="1" noTextEdit="1"/>
+              </p:cNvSpPr>
+              <p:nvPr/>
+            </p:nvSpPr>
+            <p:spPr>
+              <a:xfrm rot="1931034">
+                <a:off x="2878834" y="4930325"/>
+                <a:ext cx="875532" cy="523220"/>
+              </a:xfrm>
+              <a:prstGeom prst="rect">
+                <a:avLst/>
+              </a:prstGeom>
+              <a:blipFill rotWithShape="0">
+                <a:blip r:embed="rId8"/>
+                <a:stretch>
+                  <a:fillRect/>
+                </a:stretch>
+              </a:blipFill>
+            </p:spPr>
+            <p:txBody>
+              <a:bodyPr/>
+              <a:lstStyle/>
+              <a:p>
+                <a:r>
+                  <a:rPr lang="en-US">
+                    <a:noFill/>
+                  </a:rPr>
+                  <a:t> </a:t>
+                </a:r>
+              </a:p>
+            </p:txBody>
+          </p:sp>
+        </mc:Fallback>
+      </mc:AlternateContent>
+      <mc:AlternateContent xmlns:mc="http://schemas.openxmlformats.org/markup-compatibility/2006">
+        <mc:Choice xmlns:a14="http://schemas.microsoft.com/office/drawing/2010/main" Requires="a14">
+          <p:sp>
+            <p:nvSpPr>
+              <p:cNvPr id="16" name="TextBox 15"/>
+              <p:cNvSpPr txBox="1"/>
+              <p:nvPr/>
+            </p:nvSpPr>
+            <p:spPr>
+              <a:xfrm rot="18893241">
+                <a:off x="5100921" y="4804618"/>
+                <a:ext cx="875532" cy="523220"/>
+              </a:xfrm>
+              <a:prstGeom prst="rect">
+                <a:avLst/>
+              </a:prstGeom>
+              <a:noFill/>
+            </p:spPr>
+            <p:txBody>
+              <a:bodyPr wrap="square" rtlCol="0">
+                <a:spAutoFit/>
+              </a:bodyPr>
+              <a:lstStyle/>
+              <a:p>
+                <a:pPr/>
+                <a14:m>
+                  <m:oMathPara xmlns:m="http://schemas.openxmlformats.org/officeDocument/2006/math">
+                    <m:oMathParaPr>
+                      <m:jc m:val="centerGroup"/>
+                    </m:oMathParaPr>
+                    <m:oMath xmlns:m="http://schemas.openxmlformats.org/officeDocument/2006/math">
+                      <m:r>
+                        <m:rPr>
+                          <m:sty m:val="p"/>
+                        </m:rPr>
+                        <a:rPr lang="en-US" sz="2800" b="0" i="0" smtClean="0">
+                          <a:solidFill>
+                            <a:schemeClr val="tx1"/>
+                          </a:solidFill>
+                          <a:latin typeface="Cambria Math" panose="02040503050406030204" pitchFamily="18" charset="0"/>
+                        </a:rPr>
+                        <m:t>y</m:t>
+                      </m:r>
+                      <m:r>
+                        <a:rPr lang="en-US" sz="2800" b="0" i="1" smtClean="0">
+                          <a:solidFill>
+                            <a:schemeClr val="tx1"/>
+                          </a:solidFill>
+                          <a:latin typeface="Cambria Math" panose="02040503050406030204" pitchFamily="18" charset="0"/>
+                        </a:rPr>
+                        <m:t>/</m:t>
+                      </m:r>
+                      <m:r>
+                        <a:rPr lang="en-US" sz="2800" b="0" i="1" smtClean="0">
+                          <a:solidFill>
+                            <a:schemeClr val="tx1"/>
+                          </a:solidFill>
+                          <a:latin typeface="Cambria Math" panose="02040503050406030204" pitchFamily="18" charset="0"/>
+                        </a:rPr>
+                        <m:t>𝑎</m:t>
+                      </m:r>
+                    </m:oMath>
+                  </m:oMathPara>
+                </a14:m>
+                <a:endParaRPr lang="en-US" sz="2800" dirty="0">
+                  <a:solidFill>
+                    <a:schemeClr val="tx1"/>
+                  </a:solidFill>
+                  <a:latin typeface="Cambria" panose="02040503050406030204" pitchFamily="18" charset="0"/>
+                </a:endParaRPr>
+              </a:p>
+            </p:txBody>
+          </p:sp>
+        </mc:Choice>
+        <mc:Fallback>
+          <p:sp>
+            <p:nvSpPr>
+              <p:cNvPr id="16" name="TextBox 15"/>
+              <p:cNvSpPr txBox="1">
+                <a:spLocks noRot="1" noChangeAspect="1" noMove="1" noResize="1" noEditPoints="1" noAdjustHandles="1" noChangeArrowheads="1" noChangeShapeType="1" noTextEdit="1"/>
+              </p:cNvSpPr>
+              <p:nvPr/>
+            </p:nvSpPr>
+            <p:spPr>
+              <a:xfrm rot="18893241">
+                <a:off x="5100921" y="4804618"/>
+                <a:ext cx="875532" cy="523220"/>
+              </a:xfrm>
+              <a:prstGeom prst="rect">
+                <a:avLst/>
+              </a:prstGeom>
+              <a:blipFill rotWithShape="0">
+                <a:blip r:embed="rId9"/>
+                <a:stretch>
+                  <a:fillRect/>
+                </a:stretch>
+              </a:blipFill>
+            </p:spPr>
+            <p:txBody>
+              <a:bodyPr/>
+              <a:lstStyle/>
+              <a:p>
+                <a:r>
+                  <a:rPr lang="en-US">
+                    <a:noFill/>
+                  </a:rPr>
+                  <a:t> </a:t>
+                </a:r>
+              </a:p>
+            </p:txBody>
+          </p:sp>
+        </mc:Fallback>
+      </mc:AlternateContent>
+    </p:spTree>
+    <p:extLst>
+      <p:ext uri="{BB962C8B-B14F-4D97-AF65-F5344CB8AC3E}">
+        <p14:creationId xmlns:p14="http://schemas.microsoft.com/office/powerpoint/2010/main" val="1940335275"/>
       </p:ext>
     </p:extLst>
   </p:cSld>

</xml_diff>

<commit_message>
Added analytic figures of LDOS.
</commit_message>
<xml_diff>
--- a/Figures/Figures.pptx
+++ b/Figures/Figures.pptx
@@ -5,12 +5,18 @@
     <p:sldMasterId id="2147483648" r:id="rId1"/>
   </p:sldMasterIdLst>
   <p:notesMasterIdLst>
-    <p:notesMasterId r:id="rId5"/>
+    <p:notesMasterId r:id="rId11"/>
   </p:notesMasterIdLst>
   <p:sldIdLst>
     <p:sldId id="337" r:id="rId2"/>
     <p:sldId id="339" r:id="rId3"/>
     <p:sldId id="340" r:id="rId4"/>
+    <p:sldId id="341" r:id="rId5"/>
+    <p:sldId id="343" r:id="rId6"/>
+    <p:sldId id="344" r:id="rId7"/>
+    <p:sldId id="345" r:id="rId8"/>
+    <p:sldId id="346" r:id="rId9"/>
+    <p:sldId id="347" r:id="rId10"/>
   </p:sldIdLst>
   <p:sldSz cx="9144000" cy="6858000" type="screen4x3"/>
   <p:notesSz cx="6797675" cy="9928225"/>
@@ -4564,7 +4570,7 @@
         </p:nvSpPr>
         <p:spPr bwMode="auto">
           <a:xfrm>
-            <a:off x="2344183" y="1742904"/>
+            <a:off x="2288109" y="1742904"/>
             <a:ext cx="3889587" cy="3886200"/>
           </a:xfrm>
           <a:prstGeom prst="rect">
@@ -4605,8 +4611,8 @@
           </a:p>
         </p:txBody>
       </p:sp>
-      <mc:AlternateContent xmlns:mc="http://schemas.openxmlformats.org/markup-compatibility/2006">
-        <mc:Choice xmlns:a14="http://schemas.microsoft.com/office/drawing/2010/main" Requires="a14">
+      <mc:AlternateContent xmlns:mc="http://schemas.openxmlformats.org/markup-compatibility/2006" xmlns:a14="http://schemas.microsoft.com/office/drawing/2010/main">
+        <mc:Choice Requires="a14">
           <p:sp>
             <p:nvSpPr>
               <p:cNvPr id="5" name="TextBox 4"/>
@@ -4629,6 +4635,7 @@
               </a:bodyPr>
               <a:lstStyle/>
               <a:p>
+                <a:pPr/>
                 <a14:m>
                   <m:oMathPara xmlns:m="http://schemas.openxmlformats.org/officeDocument/2006/math">
                     <m:oMathParaPr>
@@ -4652,7 +4659,7 @@
             </p:txBody>
           </p:sp>
         </mc:Choice>
-        <mc:Fallback>
+        <mc:Fallback xmlns="">
           <p:sp>
             <p:nvSpPr>
               <p:cNvPr id="5" name="TextBox 4"/>
@@ -4691,8 +4698,8 @@
           </p:sp>
         </mc:Fallback>
       </mc:AlternateContent>
-      <mc:AlternateContent xmlns:mc="http://schemas.openxmlformats.org/markup-compatibility/2006">
-        <mc:Choice xmlns:a14="http://schemas.microsoft.com/office/drawing/2010/main" Requires="a14">
+      <mc:AlternateContent xmlns:mc="http://schemas.openxmlformats.org/markup-compatibility/2006" xmlns:a14="http://schemas.microsoft.com/office/drawing/2010/main">
+        <mc:Choice Requires="a14">
           <p:sp>
             <p:nvSpPr>
               <p:cNvPr id="6" name="TextBox 5"/>
@@ -4715,6 +4722,7 @@
               </a:bodyPr>
               <a:lstStyle/>
               <a:p>
+                <a:pPr/>
                 <a14:m>
                   <m:oMathPara xmlns:m="http://schemas.openxmlformats.org/officeDocument/2006/math">
                     <m:oMathParaPr>
@@ -4738,7 +4746,7 @@
             </p:txBody>
           </p:sp>
         </mc:Choice>
-        <mc:Fallback>
+        <mc:Fallback xmlns="">
           <p:sp>
             <p:nvSpPr>
               <p:cNvPr id="6" name="TextBox 5"/>
@@ -4777,8 +4785,8 @@
           </p:sp>
         </mc:Fallback>
       </mc:AlternateContent>
-      <mc:AlternateContent xmlns:mc="http://schemas.openxmlformats.org/markup-compatibility/2006">
-        <mc:Choice xmlns:a14="http://schemas.microsoft.com/office/drawing/2010/main" Requires="a14">
+      <mc:AlternateContent xmlns:mc="http://schemas.openxmlformats.org/markup-compatibility/2006" xmlns:a14="http://schemas.microsoft.com/office/drawing/2010/main">
+        <mc:Choice Requires="a14">
           <p:sp>
             <p:nvSpPr>
               <p:cNvPr id="7" name="TextBox 6"/>
@@ -4827,7 +4835,7 @@
             </p:txBody>
           </p:sp>
         </mc:Choice>
-        <mc:Fallback>
+        <mc:Fallback xmlns="">
           <p:sp>
             <p:nvSpPr>
               <p:cNvPr id="7" name="TextBox 6"/>
@@ -4866,8 +4874,8 @@
           </p:sp>
         </mc:Fallback>
       </mc:AlternateContent>
-      <mc:AlternateContent xmlns:mc="http://schemas.openxmlformats.org/markup-compatibility/2006">
-        <mc:Choice xmlns:a14="http://schemas.microsoft.com/office/drawing/2010/main" Requires="a14">
+      <mc:AlternateContent xmlns:mc="http://schemas.openxmlformats.org/markup-compatibility/2006" xmlns:a14="http://schemas.microsoft.com/office/drawing/2010/main">
+        <mc:Choice Requires="a14">
           <p:sp>
             <p:nvSpPr>
               <p:cNvPr id="8" name="TextBox 7"/>
@@ -4890,6 +4898,7 @@
               </a:bodyPr>
               <a:lstStyle/>
               <a:p>
+                <a:pPr/>
                 <a14:m>
                   <m:oMathPara xmlns:m="http://schemas.openxmlformats.org/officeDocument/2006/math">
                     <m:oMathParaPr>
@@ -4913,7 +4922,7 @@
             </p:txBody>
           </p:sp>
         </mc:Choice>
-        <mc:Fallback>
+        <mc:Fallback xmlns="">
           <p:sp>
             <p:nvSpPr>
               <p:cNvPr id="8" name="TextBox 7"/>
@@ -4952,8 +4961,8 @@
           </p:sp>
         </mc:Fallback>
       </mc:AlternateContent>
-      <mc:AlternateContent xmlns:mc="http://schemas.openxmlformats.org/markup-compatibility/2006">
-        <mc:Choice xmlns:a14="http://schemas.microsoft.com/office/drawing/2010/main" Requires="a14">
+      <mc:AlternateContent xmlns:mc="http://schemas.openxmlformats.org/markup-compatibility/2006" xmlns:a14="http://schemas.microsoft.com/office/drawing/2010/main">
+        <mc:Choice Requires="a14">
           <p:sp>
             <p:nvSpPr>
               <p:cNvPr id="9" name="TextBox 8"/>
@@ -4976,6 +4985,7 @@
               </a:bodyPr>
               <a:lstStyle/>
               <a:p>
+                <a:pPr/>
                 <a14:m>
                   <m:oMathPara xmlns:m="http://schemas.openxmlformats.org/officeDocument/2006/math">
                     <m:oMathParaPr>
@@ -5008,7 +5018,7 @@
             </p:txBody>
           </p:sp>
         </mc:Choice>
-        <mc:Fallback>
+        <mc:Fallback xmlns="">
           <p:sp>
             <p:nvSpPr>
               <p:cNvPr id="9" name="TextBox 8"/>
@@ -5047,8 +5057,8 @@
           </p:sp>
         </mc:Fallback>
       </mc:AlternateContent>
-      <mc:AlternateContent xmlns:mc="http://schemas.openxmlformats.org/markup-compatibility/2006">
-        <mc:Choice xmlns:a14="http://schemas.microsoft.com/office/drawing/2010/main" Requires="a14">
+      <mc:AlternateContent xmlns:mc="http://schemas.openxmlformats.org/markup-compatibility/2006" xmlns:a14="http://schemas.microsoft.com/office/drawing/2010/main">
+        <mc:Choice Requires="a14">
           <p:sp>
             <p:nvSpPr>
               <p:cNvPr id="10" name="TextBox 9"/>
@@ -5106,7 +5116,7 @@
             </p:txBody>
           </p:sp>
         </mc:Choice>
-        <mc:Fallback>
+        <mc:Fallback xmlns="">
           <p:sp>
             <p:nvSpPr>
               <p:cNvPr id="10" name="TextBox 9"/>
@@ -5145,8 +5155,8 @@
           </p:sp>
         </mc:Fallback>
       </mc:AlternateContent>
-      <mc:AlternateContent xmlns:mc="http://schemas.openxmlformats.org/markup-compatibility/2006">
-        <mc:Choice xmlns:a14="http://schemas.microsoft.com/office/drawing/2010/main" Requires="a14">
+      <mc:AlternateContent xmlns:mc="http://schemas.openxmlformats.org/markup-compatibility/2006" xmlns:a14="http://schemas.microsoft.com/office/drawing/2010/main">
+        <mc:Choice Requires="a14">
           <p:sp>
             <p:nvSpPr>
               <p:cNvPr id="11" name="TextBox 10"/>
@@ -5155,7 +5165,7 @@
             </p:nvSpPr>
             <p:spPr>
               <a:xfrm>
-                <a:off x="2605282" y="4383079"/>
+                <a:off x="2744471" y="4302548"/>
                 <a:ext cx="149079" cy="215444"/>
               </a:xfrm>
               <a:prstGeom prst="rect">
@@ -5169,6 +5179,7 @@
               </a:bodyPr>
               <a:lstStyle/>
               <a:p>
+                <a:pPr/>
                 <a14:m>
                   <m:oMathPara xmlns:m="http://schemas.openxmlformats.org/officeDocument/2006/math">
                     <m:oMathParaPr>
@@ -5192,7 +5203,7 @@
             </p:txBody>
           </p:sp>
         </mc:Choice>
-        <mc:Fallback>
+        <mc:Fallback xmlns="">
           <p:sp>
             <p:nvSpPr>
               <p:cNvPr id="11" name="TextBox 10"/>
@@ -5203,7 +5214,7 @@
             </p:nvSpPr>
             <p:spPr>
               <a:xfrm>
-                <a:off x="2605282" y="4383079"/>
+                <a:off x="2744471" y="4302548"/>
                 <a:ext cx="149079" cy="215444"/>
               </a:xfrm>
               <a:prstGeom prst="rect">
@@ -5231,8 +5242,8 @@
           </p:sp>
         </mc:Fallback>
       </mc:AlternateContent>
-      <mc:AlternateContent xmlns:mc="http://schemas.openxmlformats.org/markup-compatibility/2006">
-        <mc:Choice xmlns:a14="http://schemas.microsoft.com/office/drawing/2010/main" Requires="a14">
+      <mc:AlternateContent xmlns:mc="http://schemas.openxmlformats.org/markup-compatibility/2006" xmlns:a14="http://schemas.microsoft.com/office/drawing/2010/main">
+        <mc:Choice Requires="a14">
           <p:sp>
             <p:nvSpPr>
               <p:cNvPr id="12" name="TextBox 11"/>
@@ -5241,7 +5252,7 @@
             </p:nvSpPr>
             <p:spPr>
               <a:xfrm>
-                <a:off x="2689973" y="3633313"/>
+                <a:off x="2714309" y="3606643"/>
                 <a:ext cx="484107" cy="215444"/>
               </a:xfrm>
               <a:prstGeom prst="rect">
@@ -5255,6 +5266,7 @@
               </a:bodyPr>
               <a:lstStyle/>
               <a:p>
+                <a:pPr/>
                 <a14:m>
                   <m:oMathPara xmlns:m="http://schemas.openxmlformats.org/officeDocument/2006/math">
                     <m:oMathParaPr>
@@ -5278,7 +5290,7 @@
             </p:txBody>
           </p:sp>
         </mc:Choice>
-        <mc:Fallback>
+        <mc:Fallback xmlns="">
           <p:sp>
             <p:nvSpPr>
               <p:cNvPr id="12" name="TextBox 11"/>
@@ -5289,7 +5301,7 @@
             </p:nvSpPr>
             <p:spPr>
               <a:xfrm>
-                <a:off x="2689973" y="3633313"/>
+                <a:off x="2714309" y="3606643"/>
                 <a:ext cx="484107" cy="215444"/>
               </a:xfrm>
               <a:prstGeom prst="rect">
@@ -5317,8 +5329,8 @@
           </p:sp>
         </mc:Fallback>
       </mc:AlternateContent>
-      <mc:AlternateContent xmlns:mc="http://schemas.openxmlformats.org/markup-compatibility/2006">
-        <mc:Choice xmlns:a14="http://schemas.microsoft.com/office/drawing/2010/main" Requires="a14">
+      <mc:AlternateContent xmlns:mc="http://schemas.openxmlformats.org/markup-compatibility/2006" xmlns:a14="http://schemas.microsoft.com/office/drawing/2010/main">
+        <mc:Choice Requires="a14">
           <p:sp>
             <p:nvSpPr>
               <p:cNvPr id="14" name="TextBox 13"/>
@@ -5326,9 +5338,9 @@
               <p:nvPr/>
             </p:nvSpPr>
             <p:spPr>
-              <a:xfrm>
-                <a:off x="2483612" y="2602732"/>
-                <a:ext cx="392418" cy="523220"/>
+              <a:xfrm rot="15836113">
+                <a:off x="2270398" y="3298063"/>
+                <a:ext cx="392418" cy="400110"/>
               </a:xfrm>
               <a:prstGeom prst="rect">
                 <a:avLst/>
@@ -5351,7 +5363,7 @@
                       <m:sSup>
                         <m:sSupPr>
                           <m:ctrlPr>
-                            <a:rPr lang="en-US" sz="2800" b="0" i="1" smtClean="0">
+                            <a:rPr lang="en-US" sz="2000" b="0" i="1" smtClean="0">
                               <a:solidFill>
                                 <a:schemeClr val="tx1"/>
                               </a:solidFill>
@@ -5364,7 +5376,7 @@
                             <m:rPr>
                               <m:sty m:val="p"/>
                             </m:rPr>
-                            <a:rPr lang="en-US" sz="2800" b="0" i="0" smtClean="0">
+                            <a:rPr lang="en-US" sz="2000" b="0" i="0" smtClean="0">
                               <a:solidFill>
                                 <a:schemeClr val="tx1"/>
                               </a:solidFill>
@@ -5375,7 +5387,7 @@
                         </m:e>
                         <m:sup>
                           <m:r>
-                            <a:rPr lang="en-US" sz="2800" b="0" i="1" smtClean="0">
+                            <a:rPr lang="en-US" sz="2000" b="0" i="0" smtClean="0">
                               <a:solidFill>
                                 <a:schemeClr val="tx1"/>
                               </a:solidFill>
@@ -5388,7 +5400,7 @@
                     </m:oMath>
                   </m:oMathPara>
                 </a14:m>
-                <a:endParaRPr lang="en-US" sz="2800" dirty="0">
+                <a:endParaRPr lang="en-US" sz="2000" dirty="0">
                   <a:solidFill>
                     <a:schemeClr val="tx1"/>
                   </a:solidFill>
@@ -5398,7 +5410,7 @@
             </p:txBody>
           </p:sp>
         </mc:Choice>
-        <mc:Fallback>
+        <mc:Fallback xmlns="">
           <p:sp>
             <p:nvSpPr>
               <p:cNvPr id="14" name="TextBox 13"/>
@@ -5408,9 +5420,9 @@
               <p:nvPr/>
             </p:nvSpPr>
             <p:spPr>
-              <a:xfrm>
-                <a:off x="2483612" y="2602732"/>
-                <a:ext cx="392418" cy="523220"/>
+              <a:xfrm rot="15836113">
+                <a:off x="2270398" y="3298063"/>
+                <a:ext cx="392418" cy="400110"/>
               </a:xfrm>
               <a:prstGeom prst="rect">
                 <a:avLst/>
@@ -5418,7 +5430,7 @@
               <a:blipFill rotWithShape="0">
                 <a:blip r:embed="rId7"/>
                 <a:stretch>
-                  <a:fillRect r="-27692"/>
+                  <a:fillRect t="-13889"/>
                 </a:stretch>
               </a:blipFill>
             </p:spPr>
@@ -5437,8 +5449,8 @@
           </p:sp>
         </mc:Fallback>
       </mc:AlternateContent>
-      <mc:AlternateContent xmlns:mc="http://schemas.openxmlformats.org/markup-compatibility/2006">
-        <mc:Choice xmlns:a14="http://schemas.microsoft.com/office/drawing/2010/main" Requires="a14">
+      <mc:AlternateContent xmlns:mc="http://schemas.openxmlformats.org/markup-compatibility/2006" xmlns:a14="http://schemas.microsoft.com/office/drawing/2010/main">
+        <mc:Choice Requires="a14">
           <p:sp>
             <p:nvSpPr>
               <p:cNvPr id="15" name="TextBox 14"/>
@@ -5447,8 +5459,8 @@
             </p:nvSpPr>
             <p:spPr>
               <a:xfrm rot="1931034">
-                <a:off x="2878834" y="4930325"/>
-                <a:ext cx="875532" cy="523220"/>
+                <a:off x="2878834" y="4991880"/>
+                <a:ext cx="875532" cy="400110"/>
               </a:xfrm>
               <a:prstGeom prst="rect">
                 <a:avLst/>
@@ -5469,7 +5481,7 @@
                     </m:oMathParaPr>
                     <m:oMath xmlns:m="http://schemas.openxmlformats.org/officeDocument/2006/math">
                       <m:r>
-                        <a:rPr lang="en-US" sz="2800" b="0" i="1" smtClean="0">
+                        <a:rPr lang="en-US" sz="2000" b="0" i="1" smtClean="0">
                           <a:solidFill>
                             <a:schemeClr val="tx1"/>
                           </a:solidFill>
@@ -5478,7 +5490,7 @@
                         <m:t>𝑥</m:t>
                       </m:r>
                       <m:r>
-                        <a:rPr lang="en-US" sz="2800" b="0" i="1" smtClean="0">
+                        <a:rPr lang="en-US" sz="2000" b="0" i="1" smtClean="0">
                           <a:solidFill>
                             <a:schemeClr val="tx1"/>
                           </a:solidFill>
@@ -5487,7 +5499,7 @@
                         <m:t>/</m:t>
                       </m:r>
                       <m:r>
-                        <a:rPr lang="en-US" sz="2800" b="0" i="1" smtClean="0">
+                        <a:rPr lang="en-US" sz="2000" b="0" i="1" smtClean="0">
                           <a:solidFill>
                             <a:schemeClr val="tx1"/>
                           </a:solidFill>
@@ -5498,7 +5510,7 @@
                     </m:oMath>
                   </m:oMathPara>
                 </a14:m>
-                <a:endParaRPr lang="en-US" sz="2800" dirty="0">
+                <a:endParaRPr lang="en-US" sz="2000" dirty="0">
                   <a:solidFill>
                     <a:schemeClr val="tx1"/>
                   </a:solidFill>
@@ -5508,7 +5520,7 @@
             </p:txBody>
           </p:sp>
         </mc:Choice>
-        <mc:Fallback>
+        <mc:Fallback xmlns="">
           <p:sp>
             <p:nvSpPr>
               <p:cNvPr id="15" name="TextBox 14"/>
@@ -5519,8 +5531,8 @@
             </p:nvSpPr>
             <p:spPr>
               <a:xfrm rot="1931034">
-                <a:off x="2878834" y="4930325"/>
-                <a:ext cx="875532" cy="523220"/>
+                <a:off x="2878834" y="4991880"/>
+                <a:ext cx="875532" cy="400110"/>
               </a:xfrm>
               <a:prstGeom prst="rect">
                 <a:avLst/>
@@ -5547,8 +5559,8 @@
           </p:sp>
         </mc:Fallback>
       </mc:AlternateContent>
-      <mc:AlternateContent xmlns:mc="http://schemas.openxmlformats.org/markup-compatibility/2006">
-        <mc:Choice xmlns:a14="http://schemas.microsoft.com/office/drawing/2010/main" Requires="a14">
+      <mc:AlternateContent xmlns:mc="http://schemas.openxmlformats.org/markup-compatibility/2006" xmlns:a14="http://schemas.microsoft.com/office/drawing/2010/main">
+        <mc:Choice Requires="a14">
           <p:sp>
             <p:nvSpPr>
               <p:cNvPr id="16" name="TextBox 15"/>
@@ -5557,8 +5569,8 @@
             </p:nvSpPr>
             <p:spPr>
               <a:xfrm rot="18893241">
-                <a:off x="5100921" y="4804618"/>
-                <a:ext cx="875532" cy="523220"/>
+                <a:off x="5100921" y="4866173"/>
+                <a:ext cx="875532" cy="400110"/>
               </a:xfrm>
               <a:prstGeom prst="rect">
                 <a:avLst/>
@@ -5582,7 +5594,7 @@
                         <m:rPr>
                           <m:sty m:val="p"/>
                         </m:rPr>
-                        <a:rPr lang="en-US" sz="2800" b="0" i="0" smtClean="0">
+                        <a:rPr lang="en-US" sz="2000" b="0" i="0" smtClean="0">
                           <a:solidFill>
                             <a:schemeClr val="tx1"/>
                           </a:solidFill>
@@ -5591,7 +5603,7 @@
                         <m:t>y</m:t>
                       </m:r>
                       <m:r>
-                        <a:rPr lang="en-US" sz="2800" b="0" i="1" smtClean="0">
+                        <a:rPr lang="en-US" sz="2000" b="0" i="1" smtClean="0">
                           <a:solidFill>
                             <a:schemeClr val="tx1"/>
                           </a:solidFill>
@@ -5600,7 +5612,7 @@
                         <m:t>/</m:t>
                       </m:r>
                       <m:r>
-                        <a:rPr lang="en-US" sz="2800" b="0" i="1" smtClean="0">
+                        <a:rPr lang="en-US" sz="2000" b="0" i="1" smtClean="0">
                           <a:solidFill>
                             <a:schemeClr val="tx1"/>
                           </a:solidFill>
@@ -5611,7 +5623,7 @@
                     </m:oMath>
                   </m:oMathPara>
                 </a14:m>
-                <a:endParaRPr lang="en-US" sz="2800" dirty="0">
+                <a:endParaRPr lang="en-US" sz="2000" dirty="0">
                   <a:solidFill>
                     <a:schemeClr val="tx1"/>
                   </a:solidFill>
@@ -5621,7 +5633,7 @@
             </p:txBody>
           </p:sp>
         </mc:Choice>
-        <mc:Fallback>
+        <mc:Fallback xmlns="">
           <p:sp>
             <p:nvSpPr>
               <p:cNvPr id="16" name="TextBox 15"/>
@@ -5632,8 +5644,8 @@
             </p:nvSpPr>
             <p:spPr>
               <a:xfrm rot="18893241">
-                <a:off x="5100921" y="4804618"/>
-                <a:ext cx="875532" cy="523220"/>
+                <a:off x="5100921" y="4866173"/>
+                <a:ext cx="875532" cy="400110"/>
               </a:xfrm>
               <a:prstGeom prst="rect">
                 <a:avLst/>
@@ -5660,10 +5672,4037 @@
           </p:sp>
         </mc:Fallback>
       </mc:AlternateContent>
+      <mc:AlternateContent xmlns:mc="http://schemas.openxmlformats.org/markup-compatibility/2006" xmlns:a14="http://schemas.microsoft.com/office/drawing/2010/main">
+        <mc:Choice Requires="a14">
+          <p:sp>
+            <p:nvSpPr>
+              <p:cNvPr id="17" name="TextBox 16"/>
+              <p:cNvSpPr txBox="1"/>
+              <p:nvPr/>
+            </p:nvSpPr>
+            <p:spPr>
+              <a:xfrm>
+                <a:off x="2608326" y="2772830"/>
+                <a:ext cx="484107" cy="215444"/>
+              </a:xfrm>
+              <a:prstGeom prst="rect">
+                <a:avLst/>
+              </a:prstGeom>
+              <a:noFill/>
+            </p:spPr>
+            <p:txBody>
+              <a:bodyPr wrap="none" lIns="0" tIns="0" rIns="0" bIns="0" rtlCol="0">
+                <a:spAutoFit/>
+              </a:bodyPr>
+              <a:lstStyle/>
+              <a:p>
+                <a:pPr/>
+                <a14:m>
+                  <m:oMathPara xmlns:m="http://schemas.openxmlformats.org/officeDocument/2006/math">
+                    <m:oMathParaPr>
+                      <m:jc m:val="centerGroup"/>
+                    </m:oMathParaPr>
+                    <m:oMath xmlns:m="http://schemas.openxmlformats.org/officeDocument/2006/math">
+                      <m:r>
+                        <a:rPr lang="en-US" sz="1400" b="0" i="1" smtClean="0">
+                          <a:solidFill>
+                            <a:schemeClr val="tx1"/>
+                          </a:solidFill>
+                          <a:latin typeface="Cambria Math" panose="02040503050406030204" pitchFamily="18" charset="0"/>
+                        </a:rPr>
+                        <m:t>0.004</m:t>
+                      </m:r>
+                    </m:oMath>
+                  </m:oMathPara>
+                </a14:m>
+                <a:endParaRPr lang="en-US" sz="1400" dirty="0"/>
+              </a:p>
+            </p:txBody>
+          </p:sp>
+        </mc:Choice>
+        <mc:Fallback xmlns="">
+          <p:sp>
+            <p:nvSpPr>
+              <p:cNvPr id="17" name="TextBox 16"/>
+              <p:cNvSpPr txBox="1">
+                <a:spLocks noRot="1" noChangeAspect="1" noMove="1" noResize="1" noEditPoints="1" noAdjustHandles="1" noChangeArrowheads="1" noChangeShapeType="1" noTextEdit="1"/>
+              </p:cNvSpPr>
+              <p:nvPr/>
+            </p:nvSpPr>
+            <p:spPr>
+              <a:xfrm>
+                <a:off x="2608326" y="2772830"/>
+                <a:ext cx="484107" cy="215444"/>
+              </a:xfrm>
+              <a:prstGeom prst="rect">
+                <a:avLst/>
+              </a:prstGeom>
+              <a:blipFill rotWithShape="0">
+                <a:blip r:embed="rId10"/>
+                <a:stretch>
+                  <a:fillRect l="-7595" r="-6329" b="-8571"/>
+                </a:stretch>
+              </a:blipFill>
+            </p:spPr>
+            <p:txBody>
+              <a:bodyPr/>
+              <a:lstStyle/>
+              <a:p>
+                <a:r>
+                  <a:rPr lang="en-US">
+                    <a:noFill/>
+                  </a:rPr>
+                  <a:t> </a:t>
+                </a:r>
+              </a:p>
+            </p:txBody>
+          </p:sp>
+        </mc:Fallback>
+      </mc:AlternateContent>
     </p:spTree>
     <p:extLst>
       <p:ext uri="{BB962C8B-B14F-4D97-AF65-F5344CB8AC3E}">
         <p14:creationId xmlns:p14="http://schemas.microsoft.com/office/powerpoint/2010/main" val="1940335275"/>
+      </p:ext>
+    </p:extLst>
+  </p:cSld>
+  <p:clrMapOvr>
+    <a:masterClrMapping/>
+  </p:clrMapOvr>
+</p:sld>
+</file>
+
+<file path=ppt/slides/slide4.xml><?xml version="1.0" encoding="utf-8"?>
+<p:sld xmlns:a="http://schemas.openxmlformats.org/drawingml/2006/main" xmlns:r="http://schemas.openxmlformats.org/officeDocument/2006/relationships" xmlns:p="http://schemas.openxmlformats.org/presentationml/2006/main">
+  <p:cSld>
+    <p:spTree>
+      <p:nvGrpSpPr>
+        <p:cNvPr id="1" name=""/>
+        <p:cNvGrpSpPr/>
+        <p:nvPr/>
+      </p:nvGrpSpPr>
+      <p:grpSpPr>
+        <a:xfrm>
+          <a:off x="0" y="0"/>
+          <a:ext cx="0" cy="0"/>
+          <a:chOff x="0" y="0"/>
+          <a:chExt cx="0" cy="0"/>
+        </a:xfrm>
+      </p:grpSpPr>
+      <p:sp>
+        <p:nvSpPr>
+          <p:cNvPr id="2" name="Rectangle 6"/>
+          <p:cNvSpPr>
+            <a:spLocks noChangeArrowheads="1"/>
+          </p:cNvSpPr>
+          <p:nvPr/>
+        </p:nvSpPr>
+        <p:spPr bwMode="auto">
+          <a:xfrm>
+            <a:off x="2288109" y="1742904"/>
+            <a:ext cx="3889587" cy="3886200"/>
+          </a:xfrm>
+          <a:prstGeom prst="rect">
+            <a:avLst/>
+          </a:prstGeom>
+          <a:noFill/>
+          <a:ln w="9360">
+            <a:solidFill>
+              <a:srgbClr val="000000"/>
+            </a:solidFill>
+            <a:miter lim="800000"/>
+            <a:headEnd/>
+            <a:tailEnd/>
+          </a:ln>
+          <a:extLst>
+            <a:ext uri="{909E8E84-426E-40DD-AFC4-6F175D3DCCD1}">
+              <a14:hiddenFill xmlns:a14="http://schemas.microsoft.com/office/drawing/2010/main">
+                <a:solidFill>
+                  <a:srgbClr val="FFFFFF"/>
+                </a:solidFill>
+              </a14:hiddenFill>
+            </a:ext>
+          </a:extLst>
+        </p:spPr>
+        <p:txBody>
+          <a:bodyPr wrap="none" anchor="ctr"/>
+          <a:lstStyle/>
+          <a:p>
+            <a:pPr eaLnBrk="1" hangingPunct="1">
+              <a:buClr>
+                <a:srgbClr val="000000"/>
+              </a:buClr>
+              <a:buSzPct val="100000"/>
+              <a:buFont typeface="Times New Roman" panose="02020603050405020304" pitchFamily="18" charset="0"/>
+              <a:buNone/>
+            </a:pPr>
+            <a:endParaRPr lang="en-US" altLang="en-US"/>
+          </a:p>
+        </p:txBody>
+      </p:sp>
+      <p:pic>
+        <p:nvPicPr>
+          <p:cNvPr id="3" name="Picture 2"/>
+          <p:cNvPicPr>
+            <a:picLocks noChangeAspect="1"/>
+          </p:cNvPicPr>
+          <p:nvPr/>
+        </p:nvPicPr>
+        <p:blipFill>
+          <a:blip r:embed="rId2">
+            <a:extLst>
+              <a:ext uri="{28A0092B-C50C-407E-A947-70E740481C1C}">
+                <a14:useLocalDpi xmlns:a14="http://schemas.microsoft.com/office/drawing/2010/main" val="0"/>
+              </a:ext>
+            </a:extLst>
+          </a:blip>
+          <a:stretch>
+            <a:fillRect/>
+          </a:stretch>
+        </p:blipFill>
+        <p:spPr>
+          <a:xfrm>
+            <a:off x="2407722" y="2286699"/>
+            <a:ext cx="3650360" cy="2798610"/>
+          </a:xfrm>
+          <a:prstGeom prst="rect">
+            <a:avLst/>
+          </a:prstGeom>
+        </p:spPr>
+      </p:pic>
+      <p:cxnSp>
+        <p:nvCxnSpPr>
+          <p:cNvPr id="6" name="Straight Arrow Connector 5"/>
+          <p:cNvCxnSpPr/>
+          <p:nvPr/>
+        </p:nvCxnSpPr>
+        <p:spPr bwMode="auto">
+          <a:xfrm flipV="1">
+            <a:off x="2928880" y="5319515"/>
+            <a:ext cx="1726920" cy="8966"/>
+          </a:xfrm>
+          <a:prstGeom prst="straightConnector1">
+            <a:avLst/>
+          </a:prstGeom>
+          <a:solidFill>
+            <a:srgbClr val="00B8FF"/>
+          </a:solidFill>
+          <a:ln w="9525" cap="flat" cmpd="sng" algn="ctr">
+            <a:solidFill>
+              <a:schemeClr val="tx1"/>
+            </a:solidFill>
+            <a:prstDash val="solid"/>
+            <a:round/>
+            <a:headEnd type="triangle"/>
+            <a:tailEnd type="triangle"/>
+          </a:ln>
+          <a:effectLst/>
+        </p:spPr>
+      </p:cxnSp>
+      <mc:AlternateContent xmlns:mc="http://schemas.openxmlformats.org/markup-compatibility/2006">
+        <mc:Choice xmlns:a14="http://schemas.microsoft.com/office/drawing/2010/main" Requires="a14">
+          <p:sp>
+            <p:nvSpPr>
+              <p:cNvPr id="7" name="TextBox 6"/>
+              <p:cNvSpPr txBox="1"/>
+              <p:nvPr/>
+            </p:nvSpPr>
+            <p:spPr>
+              <a:xfrm>
+                <a:off x="3342502" y="5280081"/>
+                <a:ext cx="875532" cy="400110"/>
+              </a:xfrm>
+              <a:prstGeom prst="rect">
+                <a:avLst/>
+              </a:prstGeom>
+              <a:noFill/>
+            </p:spPr>
+            <p:txBody>
+              <a:bodyPr wrap="square" rtlCol="0">
+                <a:spAutoFit/>
+              </a:bodyPr>
+              <a:lstStyle/>
+              <a:p>
+                <a:pPr/>
+                <a14:m>
+                  <m:oMathPara xmlns:m="http://schemas.openxmlformats.org/officeDocument/2006/math">
+                    <m:oMathParaPr>
+                      <m:jc m:val="centerGroup"/>
+                    </m:oMathParaPr>
+                    <m:oMath xmlns:m="http://schemas.openxmlformats.org/officeDocument/2006/math">
+                      <m:r>
+                        <a:rPr lang="en-US" sz="2000" b="0" i="1" smtClean="0">
+                          <a:solidFill>
+                            <a:schemeClr val="tx1"/>
+                          </a:solidFill>
+                          <a:latin typeface="Cambria Math" panose="02040503050406030204" pitchFamily="18" charset="0"/>
+                        </a:rPr>
+                        <m:t>2</m:t>
+                      </m:r>
+                      <m:r>
+                        <m:rPr>
+                          <m:sty m:val="p"/>
+                        </m:rPr>
+                        <a:rPr lang="en-US" sz="2000" b="0" i="0" smtClean="0">
+                          <a:solidFill>
+                            <a:schemeClr val="tx1"/>
+                          </a:solidFill>
+                          <a:latin typeface="Cambria Math" panose="02040503050406030204" pitchFamily="18" charset="0"/>
+                        </a:rPr>
+                        <m:t>Δ</m:t>
+                      </m:r>
+                    </m:oMath>
+                  </m:oMathPara>
+                </a14:m>
+                <a:endParaRPr lang="en-US" sz="2000" dirty="0">
+                  <a:solidFill>
+                    <a:schemeClr val="tx1"/>
+                  </a:solidFill>
+                  <a:latin typeface="Cambria" panose="02040503050406030204" pitchFamily="18" charset="0"/>
+                </a:endParaRPr>
+              </a:p>
+            </p:txBody>
+          </p:sp>
+        </mc:Choice>
+        <mc:Fallback>
+          <p:sp>
+            <p:nvSpPr>
+              <p:cNvPr id="7" name="TextBox 6"/>
+              <p:cNvSpPr txBox="1">
+                <a:spLocks noRot="1" noChangeAspect="1" noMove="1" noResize="1" noEditPoints="1" noAdjustHandles="1" noChangeArrowheads="1" noChangeShapeType="1" noTextEdit="1"/>
+              </p:cNvSpPr>
+              <p:nvPr/>
+            </p:nvSpPr>
+            <p:spPr>
+              <a:xfrm>
+                <a:off x="3342502" y="5280081"/>
+                <a:ext cx="875532" cy="400110"/>
+              </a:xfrm>
+              <a:prstGeom prst="rect">
+                <a:avLst/>
+              </a:prstGeom>
+              <a:blipFill rotWithShape="0">
+                <a:blip r:embed="rId3"/>
+                <a:stretch>
+                  <a:fillRect/>
+                </a:stretch>
+              </a:blipFill>
+            </p:spPr>
+            <p:txBody>
+              <a:bodyPr/>
+              <a:lstStyle/>
+              <a:p>
+                <a:r>
+                  <a:rPr lang="en-US">
+                    <a:noFill/>
+                  </a:rPr>
+                  <a:t> </a:t>
+                </a:r>
+              </a:p>
+            </p:txBody>
+          </p:sp>
+        </mc:Fallback>
+      </mc:AlternateContent>
+      <p:cxnSp>
+        <p:nvCxnSpPr>
+          <p:cNvPr id="8" name="Straight Arrow Connector 7"/>
+          <p:cNvCxnSpPr/>
+          <p:nvPr/>
+        </p:nvCxnSpPr>
+        <p:spPr bwMode="auto">
+          <a:xfrm flipV="1">
+            <a:off x="4655800" y="5309865"/>
+            <a:ext cx="906800" cy="9650"/>
+          </a:xfrm>
+          <a:prstGeom prst="straightConnector1">
+            <a:avLst/>
+          </a:prstGeom>
+          <a:solidFill>
+            <a:srgbClr val="00B8FF"/>
+          </a:solidFill>
+          <a:ln w="9525" cap="flat" cmpd="sng" algn="ctr">
+            <a:solidFill>
+              <a:schemeClr val="tx1"/>
+            </a:solidFill>
+            <a:prstDash val="solid"/>
+            <a:round/>
+            <a:headEnd type="triangle"/>
+            <a:tailEnd type="triangle"/>
+          </a:ln>
+          <a:effectLst/>
+        </p:spPr>
+      </p:cxnSp>
+      <mc:AlternateContent xmlns:mc="http://schemas.openxmlformats.org/markup-compatibility/2006">
+        <mc:Choice xmlns:a14="http://schemas.microsoft.com/office/drawing/2010/main" Requires="a14">
+          <p:sp>
+            <p:nvSpPr>
+              <p:cNvPr id="12" name="TextBox 11"/>
+              <p:cNvSpPr txBox="1"/>
+              <p:nvPr/>
+            </p:nvSpPr>
+            <p:spPr>
+              <a:xfrm>
+                <a:off x="4652663" y="5243039"/>
+                <a:ext cx="875532" cy="400110"/>
+              </a:xfrm>
+              <a:prstGeom prst="rect">
+                <a:avLst/>
+              </a:prstGeom>
+              <a:noFill/>
+            </p:spPr>
+            <p:txBody>
+              <a:bodyPr wrap="square" rtlCol="0">
+                <a:spAutoFit/>
+              </a:bodyPr>
+              <a:lstStyle/>
+              <a:p>
+                <a:pPr/>
+                <a14:m>
+                  <m:oMathPara xmlns:m="http://schemas.openxmlformats.org/officeDocument/2006/math">
+                    <m:oMathParaPr>
+                      <m:jc m:val="centerGroup"/>
+                    </m:oMathParaPr>
+                    <m:oMath xmlns:m="http://schemas.openxmlformats.org/officeDocument/2006/math">
+                      <m:r>
+                        <a:rPr lang="en-US" sz="2000" b="0" i="1" smtClean="0">
+                          <a:solidFill>
+                            <a:schemeClr val="tx1"/>
+                          </a:solidFill>
+                          <a:latin typeface="Cambria Math" panose="02040503050406030204" pitchFamily="18" charset="0"/>
+                        </a:rPr>
+                        <m:t>2</m:t>
+                      </m:r>
+                      <m:r>
+                        <m:rPr>
+                          <m:sty m:val="p"/>
+                        </m:rPr>
+                        <a:rPr lang="en-US" sz="2000" b="0" i="0" smtClean="0">
+                          <a:solidFill>
+                            <a:schemeClr val="tx1"/>
+                          </a:solidFill>
+                          <a:latin typeface="Cambria Math" panose="02040503050406030204" pitchFamily="18" charset="0"/>
+                        </a:rPr>
+                        <m:t>S</m:t>
+                      </m:r>
+                    </m:oMath>
+                  </m:oMathPara>
+                </a14:m>
+                <a:endParaRPr lang="en-US" sz="2000" dirty="0">
+                  <a:solidFill>
+                    <a:schemeClr val="tx1"/>
+                  </a:solidFill>
+                  <a:latin typeface="Cambria" panose="02040503050406030204" pitchFamily="18" charset="0"/>
+                </a:endParaRPr>
+              </a:p>
+            </p:txBody>
+          </p:sp>
+        </mc:Choice>
+        <mc:Fallback>
+          <p:sp>
+            <p:nvSpPr>
+              <p:cNvPr id="12" name="TextBox 11"/>
+              <p:cNvSpPr txBox="1">
+                <a:spLocks noRot="1" noChangeAspect="1" noMove="1" noResize="1" noEditPoints="1" noAdjustHandles="1" noChangeArrowheads="1" noChangeShapeType="1" noTextEdit="1"/>
+              </p:cNvSpPr>
+              <p:nvPr/>
+            </p:nvSpPr>
+            <p:spPr>
+              <a:xfrm>
+                <a:off x="4652663" y="5243039"/>
+                <a:ext cx="875532" cy="400110"/>
+              </a:xfrm>
+              <a:prstGeom prst="rect">
+                <a:avLst/>
+              </a:prstGeom>
+              <a:blipFill rotWithShape="0">
+                <a:blip r:embed="rId4"/>
+                <a:stretch>
+                  <a:fillRect/>
+                </a:stretch>
+              </a:blipFill>
+            </p:spPr>
+            <p:txBody>
+              <a:bodyPr/>
+              <a:lstStyle/>
+              <a:p>
+                <a:r>
+                  <a:rPr lang="en-US">
+                    <a:noFill/>
+                  </a:rPr>
+                  <a:t> </a:t>
+                </a:r>
+              </a:p>
+            </p:txBody>
+          </p:sp>
+        </mc:Fallback>
+      </mc:AlternateContent>
+      <mc:AlternateContent xmlns:mc="http://schemas.openxmlformats.org/markup-compatibility/2006">
+        <mc:Choice xmlns:a14="http://schemas.microsoft.com/office/drawing/2010/main" Requires="a14">
+          <p:sp>
+            <p:nvSpPr>
+              <p:cNvPr id="13" name="TextBox 12"/>
+              <p:cNvSpPr txBox="1"/>
+              <p:nvPr/>
+            </p:nvSpPr>
+            <p:spPr>
+              <a:xfrm rot="5400000">
+                <a:off x="3887937" y="2676305"/>
+                <a:ext cx="1207412" cy="400110"/>
+              </a:xfrm>
+              <a:prstGeom prst="rect">
+                <a:avLst/>
+              </a:prstGeom>
+              <a:noFill/>
+            </p:spPr>
+            <p:txBody>
+              <a:bodyPr wrap="square" rtlCol="0">
+                <a:spAutoFit/>
+              </a:bodyPr>
+              <a:lstStyle/>
+              <a:p>
+                <a:pPr/>
+                <a14:m>
+                  <m:oMathPara xmlns:m="http://schemas.openxmlformats.org/officeDocument/2006/math">
+                    <m:oMathParaPr>
+                      <m:jc m:val="centerGroup"/>
+                    </m:oMathParaPr>
+                    <m:oMath xmlns:m="http://schemas.openxmlformats.org/officeDocument/2006/math">
+                      <m:r>
+                        <a:rPr lang="en-US" sz="2000" b="0" i="1" smtClean="0">
+                          <a:solidFill>
+                            <a:schemeClr val="tx1"/>
+                          </a:solidFill>
+                          <a:latin typeface="Cambria Math" panose="02040503050406030204" pitchFamily="18" charset="0"/>
+                        </a:rPr>
+                        <m:t>𝜌</m:t>
+                      </m:r>
+                      <m:r>
+                        <a:rPr lang="en-US" sz="2000" b="0" i="1" smtClean="0">
+                          <a:solidFill>
+                            <a:schemeClr val="tx1"/>
+                          </a:solidFill>
+                          <a:latin typeface="Cambria Math" panose="02040503050406030204" pitchFamily="18" charset="0"/>
+                        </a:rPr>
+                        <m:t>(</m:t>
+                      </m:r>
+                      <m:r>
+                        <a:rPr lang="en-US" sz="2000" b="0" i="1" smtClean="0">
+                          <a:solidFill>
+                            <a:schemeClr val="tx1"/>
+                          </a:solidFill>
+                          <a:latin typeface="Cambria Math" panose="02040503050406030204" pitchFamily="18" charset="0"/>
+                        </a:rPr>
+                        <m:t>𝜔</m:t>
+                      </m:r>
+                      <m:r>
+                        <a:rPr lang="en-US" sz="2000" b="0" i="1" smtClean="0">
+                          <a:solidFill>
+                            <a:schemeClr val="tx1"/>
+                          </a:solidFill>
+                          <a:latin typeface="Cambria Math" panose="02040503050406030204" pitchFamily="18" charset="0"/>
+                        </a:rPr>
+                        <m:t>)/</m:t>
+                      </m:r>
+                      <m:sSub>
+                        <m:sSubPr>
+                          <m:ctrlPr>
+                            <a:rPr lang="en-US" sz="2000" b="0" i="1" smtClean="0">
+                              <a:solidFill>
+                                <a:schemeClr val="tx1"/>
+                              </a:solidFill>
+                              <a:latin typeface="Cambria Math" panose="02040503050406030204" pitchFamily="18" charset="0"/>
+                            </a:rPr>
+                          </m:ctrlPr>
+                        </m:sSubPr>
+                        <m:e>
+                          <m:r>
+                            <a:rPr lang="en-US" sz="2000" b="0" i="1" smtClean="0">
+                              <a:solidFill>
+                                <a:schemeClr val="tx1"/>
+                              </a:solidFill>
+                              <a:latin typeface="Cambria Math" panose="02040503050406030204" pitchFamily="18" charset="0"/>
+                            </a:rPr>
+                            <m:t>𝜌</m:t>
+                          </m:r>
+                        </m:e>
+                        <m:sub>
+                          <m:r>
+                            <a:rPr lang="en-US" sz="2000" b="0" i="1" smtClean="0">
+                              <a:solidFill>
+                                <a:schemeClr val="tx1"/>
+                              </a:solidFill>
+                              <a:latin typeface="Cambria Math" panose="02040503050406030204" pitchFamily="18" charset="0"/>
+                            </a:rPr>
+                            <m:t>0</m:t>
+                          </m:r>
+                        </m:sub>
+                      </m:sSub>
+                    </m:oMath>
+                  </m:oMathPara>
+                </a14:m>
+                <a:endParaRPr lang="en-US" sz="2000" dirty="0">
+                  <a:solidFill>
+                    <a:schemeClr val="tx1"/>
+                  </a:solidFill>
+                  <a:latin typeface="Cambria" panose="02040503050406030204" pitchFamily="18" charset="0"/>
+                </a:endParaRPr>
+              </a:p>
+            </p:txBody>
+          </p:sp>
+        </mc:Choice>
+        <mc:Fallback>
+          <p:sp>
+            <p:nvSpPr>
+              <p:cNvPr id="13" name="TextBox 12"/>
+              <p:cNvSpPr txBox="1">
+                <a:spLocks noRot="1" noChangeAspect="1" noMove="1" noResize="1" noEditPoints="1" noAdjustHandles="1" noChangeArrowheads="1" noChangeShapeType="1" noTextEdit="1"/>
+              </p:cNvSpPr>
+              <p:nvPr/>
+            </p:nvSpPr>
+            <p:spPr>
+              <a:xfrm rot="5400000">
+                <a:off x="3887937" y="2676305"/>
+                <a:ext cx="1207412" cy="400110"/>
+              </a:xfrm>
+              <a:prstGeom prst="rect">
+                <a:avLst/>
+              </a:prstGeom>
+              <a:blipFill rotWithShape="0">
+                <a:blip r:embed="rId5"/>
+                <a:stretch>
+                  <a:fillRect l="-18182"/>
+                </a:stretch>
+              </a:blipFill>
+            </p:spPr>
+            <p:txBody>
+              <a:bodyPr/>
+              <a:lstStyle/>
+              <a:p>
+                <a:r>
+                  <a:rPr lang="en-US">
+                    <a:noFill/>
+                  </a:rPr>
+                  <a:t> </a:t>
+                </a:r>
+              </a:p>
+            </p:txBody>
+          </p:sp>
+        </mc:Fallback>
+      </mc:AlternateContent>
+      <p:grpSp>
+        <p:nvGrpSpPr>
+          <p:cNvPr id="15" name="Group 14"/>
+          <p:cNvGrpSpPr/>
+          <p:nvPr/>
+        </p:nvGrpSpPr>
+        <p:grpSpPr>
+          <a:xfrm>
+            <a:off x="3750485" y="4807582"/>
+            <a:ext cx="1098550" cy="400110"/>
+            <a:chOff x="4580189" y="4761926"/>
+            <a:chExt cx="1098550" cy="400110"/>
+          </a:xfrm>
+        </p:grpSpPr>
+        <p:sp>
+          <p:nvSpPr>
+            <p:cNvPr id="14" name="Rectangle 13"/>
+            <p:cNvSpPr/>
+            <p:nvPr/>
+          </p:nvSpPr>
+          <p:spPr bwMode="auto">
+            <a:xfrm>
+              <a:off x="4580189" y="4864099"/>
+              <a:ext cx="1098550" cy="293051"/>
+            </a:xfrm>
+            <a:prstGeom prst="rect">
+              <a:avLst/>
+            </a:prstGeom>
+            <a:solidFill>
+              <a:schemeClr val="bg1"/>
+            </a:solidFill>
+            <a:ln w="9525" cap="flat" cmpd="sng" algn="ctr">
+              <a:solidFill>
+                <a:schemeClr val="bg1"/>
+              </a:solidFill>
+              <a:prstDash val="solid"/>
+              <a:round/>
+              <a:headEnd type="none" w="med" len="med"/>
+              <a:tailEnd type="none" w="med" len="med"/>
+            </a:ln>
+            <a:effectLst/>
+          </p:spPr>
+          <p:txBody>
+            <a:bodyPr vert="horz" wrap="square" lIns="91440" tIns="45720" rIns="91440" bIns="45720" numCol="1" rtlCol="0" anchor="t" anchorCtr="0" compatLnSpc="1">
+              <a:prstTxWarp prst="textNoShape">
+                <a:avLst/>
+              </a:prstTxWarp>
+            </a:bodyPr>
+            <a:lstStyle/>
+            <a:p>
+              <a:pPr marL="0" marR="0" indent="0" algn="l" defTabSz="457200" rtl="0" eaLnBrk="1" fontAlgn="base" latinLnBrk="0" hangingPunct="1">
+                <a:lnSpc>
+                  <a:spcPct val="100000"/>
+                </a:lnSpc>
+                <a:spcBef>
+                  <a:spcPct val="0"/>
+                </a:spcBef>
+                <a:spcAft>
+                  <a:spcPct val="0"/>
+                </a:spcAft>
+                <a:buClr>
+                  <a:srgbClr val="000000"/>
+                </a:buClr>
+                <a:buSzPct val="100000"/>
+                <a:buFont typeface="Times New Roman" pitchFamily="16" charset="0"/>
+                <a:buNone/>
+                <a:tabLst/>
+              </a:pPr>
+              <a:endParaRPr kumimoji="0" lang="en-US" sz="1800" b="0" i="0" u="none" strike="noStrike" cap="none" normalizeH="0" baseline="0" smtClean="0">
+                <a:ln>
+                  <a:noFill/>
+                </a:ln>
+                <a:solidFill>
+                  <a:schemeClr val="bg1"/>
+                </a:solidFill>
+                <a:effectLst/>
+                <a:latin typeface="Arial" charset="0"/>
+              </a:endParaRPr>
+            </a:p>
+          </p:txBody>
+        </p:sp>
+        <mc:AlternateContent xmlns:mc="http://schemas.openxmlformats.org/markup-compatibility/2006">
+          <mc:Choice xmlns:a14="http://schemas.microsoft.com/office/drawing/2010/main" Requires="a14">
+            <p:sp>
+              <p:nvSpPr>
+                <p:cNvPr id="4" name="TextBox 3"/>
+                <p:cNvSpPr txBox="1"/>
+                <p:nvPr/>
+              </p:nvSpPr>
+              <p:spPr>
+                <a:xfrm>
+                  <a:off x="4624840" y="4761926"/>
+                  <a:ext cx="875532" cy="400110"/>
+                </a:xfrm>
+                <a:prstGeom prst="rect">
+                  <a:avLst/>
+                </a:prstGeom>
+                <a:noFill/>
+              </p:spPr>
+              <p:txBody>
+                <a:bodyPr wrap="square" rtlCol="0">
+                  <a:spAutoFit/>
+                </a:bodyPr>
+                <a:lstStyle/>
+                <a:p>
+                  <a:pPr/>
+                  <a14:m>
+                    <m:oMathPara xmlns:m="http://schemas.openxmlformats.org/officeDocument/2006/math">
+                      <m:oMathParaPr>
+                        <m:jc m:val="centerGroup"/>
+                      </m:oMathParaPr>
+                      <m:oMath xmlns:m="http://schemas.openxmlformats.org/officeDocument/2006/math">
+                        <m:r>
+                          <a:rPr lang="en-US" sz="2000" b="0" i="1" smtClean="0">
+                            <a:solidFill>
+                              <a:schemeClr val="tx1"/>
+                            </a:solidFill>
+                            <a:latin typeface="Cambria Math" panose="02040503050406030204" pitchFamily="18" charset="0"/>
+                          </a:rPr>
+                          <m:t>𝜔</m:t>
+                        </m:r>
+                        <m:r>
+                          <a:rPr lang="en-US" sz="2000" b="0" i="1" smtClean="0">
+                            <a:solidFill>
+                              <a:schemeClr val="tx1"/>
+                            </a:solidFill>
+                            <a:latin typeface="Cambria Math" panose="02040503050406030204" pitchFamily="18" charset="0"/>
+                          </a:rPr>
+                          <m:t>/</m:t>
+                        </m:r>
+                        <m:r>
+                          <m:rPr>
+                            <m:sty m:val="p"/>
+                          </m:rPr>
+                          <a:rPr lang="en-US" sz="2000" b="0" i="0" smtClean="0">
+                            <a:solidFill>
+                              <a:schemeClr val="tx1"/>
+                            </a:solidFill>
+                            <a:latin typeface="Cambria Math" panose="02040503050406030204" pitchFamily="18" charset="0"/>
+                          </a:rPr>
+                          <m:t>Δ</m:t>
+                        </m:r>
+                      </m:oMath>
+                    </m:oMathPara>
+                  </a14:m>
+                  <a:endParaRPr lang="en-US" sz="2000" dirty="0">
+                    <a:solidFill>
+                      <a:schemeClr val="tx1"/>
+                    </a:solidFill>
+                    <a:latin typeface="Cambria" panose="02040503050406030204" pitchFamily="18" charset="0"/>
+                  </a:endParaRPr>
+                </a:p>
+              </p:txBody>
+            </p:sp>
+          </mc:Choice>
+          <mc:Fallback>
+            <p:sp>
+              <p:nvSpPr>
+                <p:cNvPr id="4" name="TextBox 3"/>
+                <p:cNvSpPr txBox="1">
+                  <a:spLocks noRot="1" noChangeAspect="1" noMove="1" noResize="1" noEditPoints="1" noAdjustHandles="1" noChangeArrowheads="1" noChangeShapeType="1" noTextEdit="1"/>
+                </p:cNvSpPr>
+                <p:nvPr/>
+              </p:nvSpPr>
+              <p:spPr>
+                <a:xfrm>
+                  <a:off x="4624840" y="4761926"/>
+                  <a:ext cx="875532" cy="400110"/>
+                </a:xfrm>
+                <a:prstGeom prst="rect">
+                  <a:avLst/>
+                </a:prstGeom>
+                <a:blipFill rotWithShape="0">
+                  <a:blip r:embed="rId6"/>
+                  <a:stretch>
+                    <a:fillRect b="-18462"/>
+                  </a:stretch>
+                </a:blipFill>
+              </p:spPr>
+              <p:txBody>
+                <a:bodyPr/>
+                <a:lstStyle/>
+                <a:p>
+                  <a:r>
+                    <a:rPr lang="en-US">
+                      <a:noFill/>
+                    </a:rPr>
+                    <a:t> </a:t>
+                  </a:r>
+                </a:p>
+              </p:txBody>
+            </p:sp>
+          </mc:Fallback>
+        </mc:AlternateContent>
+      </p:grpSp>
+      <p:cxnSp>
+        <p:nvCxnSpPr>
+          <p:cNvPr id="16" name="Straight Arrow Connector 15"/>
+          <p:cNvCxnSpPr/>
+          <p:nvPr/>
+        </p:nvCxnSpPr>
+        <p:spPr bwMode="auto">
+          <a:xfrm flipV="1">
+            <a:off x="5705475" y="2876360"/>
+            <a:ext cx="0" cy="314325"/>
+          </a:xfrm>
+          <a:prstGeom prst="straightConnector1">
+            <a:avLst/>
+          </a:prstGeom>
+          <a:solidFill>
+            <a:srgbClr val="00B8FF"/>
+          </a:solidFill>
+          <a:ln w="34925" cap="flat" cmpd="sng" algn="ctr">
+            <a:solidFill>
+              <a:srgbClr val="0404BC"/>
+            </a:solidFill>
+            <a:prstDash val="solid"/>
+            <a:round/>
+            <a:headEnd type="none" w="med" len="med"/>
+            <a:tailEnd type="triangle"/>
+          </a:ln>
+          <a:effectLst/>
+        </p:spPr>
+      </p:cxnSp>
+      <p:cxnSp>
+        <p:nvCxnSpPr>
+          <p:cNvPr id="20" name="Straight Arrow Connector 19"/>
+          <p:cNvCxnSpPr/>
+          <p:nvPr/>
+        </p:nvCxnSpPr>
+        <p:spPr bwMode="auto">
+          <a:xfrm flipV="1">
+            <a:off x="3676650" y="2908110"/>
+            <a:ext cx="0" cy="314325"/>
+          </a:xfrm>
+          <a:prstGeom prst="straightConnector1">
+            <a:avLst/>
+          </a:prstGeom>
+          <a:solidFill>
+            <a:srgbClr val="00B8FF"/>
+          </a:solidFill>
+          <a:ln w="34925" cap="flat" cmpd="sng" algn="ctr">
+            <a:solidFill>
+              <a:srgbClr val="0404BC"/>
+            </a:solidFill>
+            <a:prstDash val="solid"/>
+            <a:round/>
+            <a:headEnd type="none" w="med" len="med"/>
+            <a:tailEnd type="triangle"/>
+          </a:ln>
+          <a:effectLst/>
+        </p:spPr>
+      </p:cxnSp>
+      <p:cxnSp>
+        <p:nvCxnSpPr>
+          <p:cNvPr id="21" name="Straight Arrow Connector 20"/>
+          <p:cNvCxnSpPr/>
+          <p:nvPr/>
+        </p:nvCxnSpPr>
+        <p:spPr bwMode="auto">
+          <a:xfrm>
+            <a:off x="4849035" y="2908110"/>
+            <a:ext cx="0" cy="320864"/>
+          </a:xfrm>
+          <a:prstGeom prst="straightConnector1">
+            <a:avLst/>
+          </a:prstGeom>
+          <a:solidFill>
+            <a:srgbClr val="00B8FF"/>
+          </a:solidFill>
+          <a:ln w="34925" cap="flat" cmpd="sng" algn="ctr">
+            <a:solidFill>
+              <a:srgbClr val="FF0000"/>
+            </a:solidFill>
+            <a:prstDash val="solid"/>
+            <a:round/>
+            <a:headEnd type="none" w="med" len="med"/>
+            <a:tailEnd type="triangle"/>
+          </a:ln>
+          <a:effectLst/>
+        </p:spPr>
+      </p:cxnSp>
+      <p:cxnSp>
+        <p:nvCxnSpPr>
+          <p:cNvPr id="23" name="Straight Arrow Connector 22"/>
+          <p:cNvCxnSpPr/>
+          <p:nvPr/>
+        </p:nvCxnSpPr>
+        <p:spPr bwMode="auto">
+          <a:xfrm>
+            <a:off x="2817035" y="2908110"/>
+            <a:ext cx="0" cy="320864"/>
+          </a:xfrm>
+          <a:prstGeom prst="straightConnector1">
+            <a:avLst/>
+          </a:prstGeom>
+          <a:solidFill>
+            <a:srgbClr val="00B8FF"/>
+          </a:solidFill>
+          <a:ln w="34925" cap="flat" cmpd="sng" algn="ctr">
+            <a:solidFill>
+              <a:srgbClr val="FF0000"/>
+            </a:solidFill>
+            <a:prstDash val="solid"/>
+            <a:round/>
+            <a:headEnd type="none" w="med" len="med"/>
+            <a:tailEnd type="triangle"/>
+          </a:ln>
+          <a:effectLst/>
+        </p:spPr>
+      </p:cxnSp>
+      <p:cxnSp>
+        <p:nvCxnSpPr>
+          <p:cNvPr id="25" name="Straight Connector 24"/>
+          <p:cNvCxnSpPr/>
+          <p:nvPr/>
+        </p:nvCxnSpPr>
+        <p:spPr bwMode="auto">
+          <a:xfrm>
+            <a:off x="2817035" y="2002412"/>
+            <a:ext cx="539750" cy="6350"/>
+          </a:xfrm>
+          <a:prstGeom prst="line">
+            <a:avLst/>
+          </a:prstGeom>
+          <a:solidFill>
+            <a:srgbClr val="00B8FF"/>
+          </a:solidFill>
+          <a:ln w="25400" cap="flat" cmpd="sng" algn="ctr">
+            <a:solidFill>
+              <a:srgbClr val="FF0000"/>
+            </a:solidFill>
+            <a:prstDash val="solid"/>
+            <a:round/>
+            <a:headEnd type="none" w="med" len="med"/>
+            <a:tailEnd type="none" w="med" len="med"/>
+          </a:ln>
+          <a:effectLst/>
+        </p:spPr>
+      </p:cxnSp>
+      <p:cxnSp>
+        <p:nvCxnSpPr>
+          <p:cNvPr id="26" name="Straight Connector 25"/>
+          <p:cNvCxnSpPr/>
+          <p:nvPr/>
+        </p:nvCxnSpPr>
+        <p:spPr bwMode="auto">
+          <a:xfrm>
+            <a:off x="4610486" y="2003031"/>
+            <a:ext cx="539750" cy="6350"/>
+          </a:xfrm>
+          <a:prstGeom prst="line">
+            <a:avLst/>
+          </a:prstGeom>
+          <a:solidFill>
+            <a:srgbClr val="00B8FF"/>
+          </a:solidFill>
+          <a:ln w="25400" cap="flat" cmpd="sng" algn="ctr">
+            <a:solidFill>
+              <a:srgbClr val="0404BC"/>
+            </a:solidFill>
+            <a:prstDash val="solid"/>
+            <a:round/>
+            <a:headEnd type="none" w="med" len="med"/>
+            <a:tailEnd type="none" w="med" len="med"/>
+          </a:ln>
+          <a:effectLst/>
+        </p:spPr>
+      </p:cxnSp>
+      <p:sp>
+        <p:nvSpPr>
+          <p:cNvPr id="27" name="TextBox 26"/>
+          <p:cNvSpPr txBox="1"/>
+          <p:nvPr/>
+        </p:nvSpPr>
+        <p:spPr>
+          <a:xfrm>
+            <a:off x="5090429" y="1826652"/>
+            <a:ext cx="965443" cy="307777"/>
+          </a:xfrm>
+          <a:prstGeom prst="rect">
+            <a:avLst/>
+          </a:prstGeom>
+          <a:noFill/>
+        </p:spPr>
+        <p:txBody>
+          <a:bodyPr wrap="square" rtlCol="0">
+            <a:spAutoFit/>
+          </a:bodyPr>
+          <a:lstStyle/>
+          <a:p>
+            <a:r>
+              <a:rPr lang="en-US" sz="1400" dirty="0" smtClean="0">
+                <a:solidFill>
+                  <a:schemeClr val="tx1"/>
+                </a:solidFill>
+              </a:rPr>
+              <a:t>spin up</a:t>
+            </a:r>
+            <a:endParaRPr lang="en-US" sz="1400" dirty="0">
+              <a:solidFill>
+                <a:schemeClr val="tx1"/>
+              </a:solidFill>
+            </a:endParaRPr>
+          </a:p>
+        </p:txBody>
+      </p:sp>
+      <p:sp>
+        <p:nvSpPr>
+          <p:cNvPr id="28" name="TextBox 27"/>
+          <p:cNvSpPr txBox="1"/>
+          <p:nvPr/>
+        </p:nvSpPr>
+        <p:spPr>
+          <a:xfrm>
+            <a:off x="3311338" y="1842213"/>
+            <a:ext cx="1132205" cy="307777"/>
+          </a:xfrm>
+          <a:prstGeom prst="rect">
+            <a:avLst/>
+          </a:prstGeom>
+          <a:noFill/>
+        </p:spPr>
+        <p:txBody>
+          <a:bodyPr wrap="square" rtlCol="0">
+            <a:spAutoFit/>
+          </a:bodyPr>
+          <a:lstStyle/>
+          <a:p>
+            <a:r>
+              <a:rPr lang="en-US" sz="1400" dirty="0" smtClean="0">
+                <a:solidFill>
+                  <a:schemeClr val="tx1"/>
+                </a:solidFill>
+              </a:rPr>
+              <a:t>spin down</a:t>
+            </a:r>
+            <a:endParaRPr lang="en-US" sz="1400" dirty="0">
+              <a:solidFill>
+                <a:schemeClr val="tx1"/>
+              </a:solidFill>
+            </a:endParaRPr>
+          </a:p>
+        </p:txBody>
+      </p:sp>
+    </p:spTree>
+    <p:extLst>
+      <p:ext uri="{BB962C8B-B14F-4D97-AF65-F5344CB8AC3E}">
+        <p14:creationId xmlns:p14="http://schemas.microsoft.com/office/powerpoint/2010/main" val="1485288233"/>
+      </p:ext>
+    </p:extLst>
+  </p:cSld>
+  <p:clrMapOvr>
+    <a:masterClrMapping/>
+  </p:clrMapOvr>
+</p:sld>
+</file>
+
+<file path=ppt/slides/slide5.xml><?xml version="1.0" encoding="utf-8"?>
+<p:sld xmlns:a="http://schemas.openxmlformats.org/drawingml/2006/main" xmlns:r="http://schemas.openxmlformats.org/officeDocument/2006/relationships" xmlns:p="http://schemas.openxmlformats.org/presentationml/2006/main">
+  <p:cSld>
+    <p:spTree>
+      <p:nvGrpSpPr>
+        <p:cNvPr id="1" name=""/>
+        <p:cNvGrpSpPr/>
+        <p:nvPr/>
+      </p:nvGrpSpPr>
+      <p:grpSpPr>
+        <a:xfrm>
+          <a:off x="0" y="0"/>
+          <a:ext cx="0" cy="0"/>
+          <a:chOff x="0" y="0"/>
+          <a:chExt cx="0" cy="0"/>
+        </a:xfrm>
+      </p:grpSpPr>
+      <p:sp>
+        <p:nvSpPr>
+          <p:cNvPr id="2" name="Rectangle 6"/>
+          <p:cNvSpPr>
+            <a:spLocks noChangeArrowheads="1"/>
+          </p:cNvSpPr>
+          <p:nvPr/>
+        </p:nvSpPr>
+        <p:spPr bwMode="auto">
+          <a:xfrm>
+            <a:off x="2288109" y="1742904"/>
+            <a:ext cx="3889587" cy="3886200"/>
+          </a:xfrm>
+          <a:prstGeom prst="rect">
+            <a:avLst/>
+          </a:prstGeom>
+          <a:noFill/>
+          <a:ln w="9360">
+            <a:solidFill>
+              <a:srgbClr val="000000"/>
+            </a:solidFill>
+            <a:miter lim="800000"/>
+            <a:headEnd/>
+            <a:tailEnd/>
+          </a:ln>
+          <a:extLst>
+            <a:ext uri="{909E8E84-426E-40DD-AFC4-6F175D3DCCD1}">
+              <a14:hiddenFill xmlns:a14="http://schemas.microsoft.com/office/drawing/2010/main">
+                <a:solidFill>
+                  <a:srgbClr val="FFFFFF"/>
+                </a:solidFill>
+              </a14:hiddenFill>
+            </a:ext>
+          </a:extLst>
+        </p:spPr>
+        <p:txBody>
+          <a:bodyPr wrap="none" anchor="ctr"/>
+          <a:lstStyle/>
+          <a:p>
+            <a:pPr eaLnBrk="1" hangingPunct="1">
+              <a:buClr>
+                <a:srgbClr val="000000"/>
+              </a:buClr>
+              <a:buSzPct val="100000"/>
+              <a:buFont typeface="Times New Roman" panose="02020603050405020304" pitchFamily="18" charset="0"/>
+              <a:buNone/>
+            </a:pPr>
+            <a:endParaRPr lang="en-US" altLang="en-US"/>
+          </a:p>
+        </p:txBody>
+      </p:sp>
+      <p:pic>
+        <p:nvPicPr>
+          <p:cNvPr id="3" name="Picture 2"/>
+          <p:cNvPicPr>
+            <a:picLocks noChangeAspect="1"/>
+          </p:cNvPicPr>
+          <p:nvPr/>
+        </p:nvPicPr>
+        <p:blipFill>
+          <a:blip r:embed="rId2">
+            <a:extLst>
+              <a:ext uri="{28A0092B-C50C-407E-A947-70E740481C1C}">
+                <a14:useLocalDpi xmlns:a14="http://schemas.microsoft.com/office/drawing/2010/main" val="0"/>
+              </a:ext>
+            </a:extLst>
+          </a:blip>
+          <a:stretch>
+            <a:fillRect/>
+          </a:stretch>
+        </p:blipFill>
+        <p:spPr>
+          <a:xfrm>
+            <a:off x="2407722" y="2286699"/>
+            <a:ext cx="3650360" cy="2798609"/>
+          </a:xfrm>
+          <a:prstGeom prst="rect">
+            <a:avLst/>
+          </a:prstGeom>
+        </p:spPr>
+      </p:pic>
+      <mc:AlternateContent xmlns:mc="http://schemas.openxmlformats.org/markup-compatibility/2006">
+        <mc:Choice xmlns:a14="http://schemas.microsoft.com/office/drawing/2010/main" Requires="a14">
+          <p:sp>
+            <p:nvSpPr>
+              <p:cNvPr id="13" name="TextBox 12"/>
+              <p:cNvSpPr txBox="1"/>
+              <p:nvPr/>
+            </p:nvSpPr>
+            <p:spPr>
+              <a:xfrm rot="5400000">
+                <a:off x="3887937" y="2676305"/>
+                <a:ext cx="1207412" cy="400110"/>
+              </a:xfrm>
+              <a:prstGeom prst="rect">
+                <a:avLst/>
+              </a:prstGeom>
+              <a:noFill/>
+            </p:spPr>
+            <p:txBody>
+              <a:bodyPr wrap="square" rtlCol="0">
+                <a:spAutoFit/>
+              </a:bodyPr>
+              <a:lstStyle/>
+              <a:p>
+                <a:pPr/>
+                <a14:m>
+                  <m:oMathPara xmlns:m="http://schemas.openxmlformats.org/officeDocument/2006/math">
+                    <m:oMathParaPr>
+                      <m:jc m:val="centerGroup"/>
+                    </m:oMathParaPr>
+                    <m:oMath xmlns:m="http://schemas.openxmlformats.org/officeDocument/2006/math">
+                      <m:r>
+                        <a:rPr lang="en-US" sz="2000" b="0" i="1" smtClean="0">
+                          <a:solidFill>
+                            <a:schemeClr val="tx1"/>
+                          </a:solidFill>
+                          <a:latin typeface="Cambria Math" panose="02040503050406030204" pitchFamily="18" charset="0"/>
+                        </a:rPr>
+                        <m:t>𝜌</m:t>
+                      </m:r>
+                      <m:r>
+                        <a:rPr lang="en-US" sz="2000" b="0" i="1" smtClean="0">
+                          <a:solidFill>
+                            <a:schemeClr val="tx1"/>
+                          </a:solidFill>
+                          <a:latin typeface="Cambria Math" panose="02040503050406030204" pitchFamily="18" charset="0"/>
+                        </a:rPr>
+                        <m:t>(</m:t>
+                      </m:r>
+                      <m:r>
+                        <a:rPr lang="en-US" sz="2000" b="0" i="1" smtClean="0">
+                          <a:solidFill>
+                            <a:schemeClr val="tx1"/>
+                          </a:solidFill>
+                          <a:latin typeface="Cambria Math" panose="02040503050406030204" pitchFamily="18" charset="0"/>
+                        </a:rPr>
+                        <m:t>𝜔</m:t>
+                      </m:r>
+                      <m:r>
+                        <a:rPr lang="en-US" sz="2000" b="0" i="1" smtClean="0">
+                          <a:solidFill>
+                            <a:schemeClr val="tx1"/>
+                          </a:solidFill>
+                          <a:latin typeface="Cambria Math" panose="02040503050406030204" pitchFamily="18" charset="0"/>
+                        </a:rPr>
+                        <m:t>)/</m:t>
+                      </m:r>
+                      <m:sSub>
+                        <m:sSubPr>
+                          <m:ctrlPr>
+                            <a:rPr lang="en-US" sz="2000" b="0" i="1" smtClean="0">
+                              <a:solidFill>
+                                <a:schemeClr val="tx1"/>
+                              </a:solidFill>
+                              <a:latin typeface="Cambria Math" panose="02040503050406030204" pitchFamily="18" charset="0"/>
+                            </a:rPr>
+                          </m:ctrlPr>
+                        </m:sSubPr>
+                        <m:e>
+                          <m:r>
+                            <a:rPr lang="en-US" sz="2000" b="0" i="1" smtClean="0">
+                              <a:solidFill>
+                                <a:schemeClr val="tx1"/>
+                              </a:solidFill>
+                              <a:latin typeface="Cambria Math" panose="02040503050406030204" pitchFamily="18" charset="0"/>
+                            </a:rPr>
+                            <m:t>𝜌</m:t>
+                          </m:r>
+                        </m:e>
+                        <m:sub>
+                          <m:r>
+                            <a:rPr lang="en-US" sz="2000" b="0" i="1" smtClean="0">
+                              <a:solidFill>
+                                <a:schemeClr val="tx1"/>
+                              </a:solidFill>
+                              <a:latin typeface="Cambria Math" panose="02040503050406030204" pitchFamily="18" charset="0"/>
+                            </a:rPr>
+                            <m:t>0</m:t>
+                          </m:r>
+                        </m:sub>
+                      </m:sSub>
+                    </m:oMath>
+                  </m:oMathPara>
+                </a14:m>
+                <a:endParaRPr lang="en-US" sz="2000" dirty="0">
+                  <a:solidFill>
+                    <a:schemeClr val="tx1"/>
+                  </a:solidFill>
+                  <a:latin typeface="Cambria" panose="02040503050406030204" pitchFamily="18" charset="0"/>
+                </a:endParaRPr>
+              </a:p>
+            </p:txBody>
+          </p:sp>
+        </mc:Choice>
+        <mc:Fallback>
+          <p:sp>
+            <p:nvSpPr>
+              <p:cNvPr id="13" name="TextBox 12"/>
+              <p:cNvSpPr txBox="1">
+                <a:spLocks noRot="1" noChangeAspect="1" noMove="1" noResize="1" noEditPoints="1" noAdjustHandles="1" noChangeArrowheads="1" noChangeShapeType="1" noTextEdit="1"/>
+              </p:cNvSpPr>
+              <p:nvPr/>
+            </p:nvSpPr>
+            <p:spPr>
+              <a:xfrm rot="5400000">
+                <a:off x="3887937" y="2676305"/>
+                <a:ext cx="1207412" cy="400110"/>
+              </a:xfrm>
+              <a:prstGeom prst="rect">
+                <a:avLst/>
+              </a:prstGeom>
+              <a:blipFill rotWithShape="0">
+                <a:blip r:embed="rId3"/>
+                <a:stretch>
+                  <a:fillRect l="-18182"/>
+                </a:stretch>
+              </a:blipFill>
+            </p:spPr>
+            <p:txBody>
+              <a:bodyPr/>
+              <a:lstStyle/>
+              <a:p>
+                <a:r>
+                  <a:rPr lang="en-US">
+                    <a:noFill/>
+                  </a:rPr>
+                  <a:t> </a:t>
+                </a:r>
+              </a:p>
+            </p:txBody>
+          </p:sp>
+        </mc:Fallback>
+      </mc:AlternateContent>
+      <p:grpSp>
+        <p:nvGrpSpPr>
+          <p:cNvPr id="15" name="Group 14"/>
+          <p:cNvGrpSpPr/>
+          <p:nvPr/>
+        </p:nvGrpSpPr>
+        <p:grpSpPr>
+          <a:xfrm>
+            <a:off x="3750485" y="4807582"/>
+            <a:ext cx="1098550" cy="400110"/>
+            <a:chOff x="4580189" y="4761926"/>
+            <a:chExt cx="1098550" cy="400110"/>
+          </a:xfrm>
+        </p:grpSpPr>
+        <p:sp>
+          <p:nvSpPr>
+            <p:cNvPr id="14" name="Rectangle 13"/>
+            <p:cNvSpPr/>
+            <p:nvPr/>
+          </p:nvSpPr>
+          <p:spPr bwMode="auto">
+            <a:xfrm>
+              <a:off x="4580189" y="4864099"/>
+              <a:ext cx="1098550" cy="293051"/>
+            </a:xfrm>
+            <a:prstGeom prst="rect">
+              <a:avLst/>
+            </a:prstGeom>
+            <a:solidFill>
+              <a:schemeClr val="bg1"/>
+            </a:solidFill>
+            <a:ln w="9525" cap="flat" cmpd="sng" algn="ctr">
+              <a:solidFill>
+                <a:schemeClr val="bg1"/>
+              </a:solidFill>
+              <a:prstDash val="solid"/>
+              <a:round/>
+              <a:headEnd type="none" w="med" len="med"/>
+              <a:tailEnd type="none" w="med" len="med"/>
+            </a:ln>
+            <a:effectLst/>
+          </p:spPr>
+          <p:txBody>
+            <a:bodyPr vert="horz" wrap="square" lIns="91440" tIns="45720" rIns="91440" bIns="45720" numCol="1" rtlCol="0" anchor="t" anchorCtr="0" compatLnSpc="1">
+              <a:prstTxWarp prst="textNoShape">
+                <a:avLst/>
+              </a:prstTxWarp>
+            </a:bodyPr>
+            <a:lstStyle/>
+            <a:p>
+              <a:pPr marL="0" marR="0" indent="0" algn="l" defTabSz="457200" rtl="0" eaLnBrk="1" fontAlgn="base" latinLnBrk="0" hangingPunct="1">
+                <a:lnSpc>
+                  <a:spcPct val="100000"/>
+                </a:lnSpc>
+                <a:spcBef>
+                  <a:spcPct val="0"/>
+                </a:spcBef>
+                <a:spcAft>
+                  <a:spcPct val="0"/>
+                </a:spcAft>
+                <a:buClr>
+                  <a:srgbClr val="000000"/>
+                </a:buClr>
+                <a:buSzPct val="100000"/>
+                <a:buFont typeface="Times New Roman" pitchFamily="16" charset="0"/>
+                <a:buNone/>
+                <a:tabLst/>
+              </a:pPr>
+              <a:endParaRPr kumimoji="0" lang="en-US" sz="1800" b="0" i="0" u="none" strike="noStrike" cap="none" normalizeH="0" baseline="0" smtClean="0">
+                <a:ln>
+                  <a:noFill/>
+                </a:ln>
+                <a:solidFill>
+                  <a:schemeClr val="bg1"/>
+                </a:solidFill>
+                <a:effectLst/>
+                <a:latin typeface="Arial" charset="0"/>
+              </a:endParaRPr>
+            </a:p>
+          </p:txBody>
+        </p:sp>
+        <mc:AlternateContent xmlns:mc="http://schemas.openxmlformats.org/markup-compatibility/2006">
+          <mc:Choice xmlns:a14="http://schemas.microsoft.com/office/drawing/2010/main" Requires="a14">
+            <p:sp>
+              <p:nvSpPr>
+                <p:cNvPr id="4" name="TextBox 3"/>
+                <p:cNvSpPr txBox="1"/>
+                <p:nvPr/>
+              </p:nvSpPr>
+              <p:spPr>
+                <a:xfrm>
+                  <a:off x="4624840" y="4761926"/>
+                  <a:ext cx="875532" cy="400110"/>
+                </a:xfrm>
+                <a:prstGeom prst="rect">
+                  <a:avLst/>
+                </a:prstGeom>
+                <a:noFill/>
+              </p:spPr>
+              <p:txBody>
+                <a:bodyPr wrap="square" rtlCol="0">
+                  <a:spAutoFit/>
+                </a:bodyPr>
+                <a:lstStyle/>
+                <a:p>
+                  <a:pPr/>
+                  <a14:m>
+                    <m:oMathPara xmlns:m="http://schemas.openxmlformats.org/officeDocument/2006/math">
+                      <m:oMathParaPr>
+                        <m:jc m:val="centerGroup"/>
+                      </m:oMathParaPr>
+                      <m:oMath xmlns:m="http://schemas.openxmlformats.org/officeDocument/2006/math">
+                        <m:r>
+                          <a:rPr lang="en-US" sz="2000" b="0" i="1" smtClean="0">
+                            <a:solidFill>
+                              <a:schemeClr val="tx1"/>
+                            </a:solidFill>
+                            <a:latin typeface="Cambria Math" panose="02040503050406030204" pitchFamily="18" charset="0"/>
+                          </a:rPr>
+                          <m:t>𝜔</m:t>
+                        </m:r>
+                        <m:r>
+                          <a:rPr lang="en-US" sz="2000" b="0" i="1" smtClean="0">
+                            <a:solidFill>
+                              <a:schemeClr val="tx1"/>
+                            </a:solidFill>
+                            <a:latin typeface="Cambria Math" panose="02040503050406030204" pitchFamily="18" charset="0"/>
+                          </a:rPr>
+                          <m:t>/</m:t>
+                        </m:r>
+                        <m:r>
+                          <m:rPr>
+                            <m:sty m:val="p"/>
+                          </m:rPr>
+                          <a:rPr lang="en-US" sz="2000" b="0" i="0" smtClean="0">
+                            <a:solidFill>
+                              <a:schemeClr val="tx1"/>
+                            </a:solidFill>
+                            <a:latin typeface="Cambria Math" panose="02040503050406030204" pitchFamily="18" charset="0"/>
+                          </a:rPr>
+                          <m:t>Δ</m:t>
+                        </m:r>
+                      </m:oMath>
+                    </m:oMathPara>
+                  </a14:m>
+                  <a:endParaRPr lang="en-US" sz="2000" dirty="0">
+                    <a:solidFill>
+                      <a:schemeClr val="tx1"/>
+                    </a:solidFill>
+                    <a:latin typeface="Cambria" panose="02040503050406030204" pitchFamily="18" charset="0"/>
+                  </a:endParaRPr>
+                </a:p>
+              </p:txBody>
+            </p:sp>
+          </mc:Choice>
+          <mc:Fallback>
+            <p:sp>
+              <p:nvSpPr>
+                <p:cNvPr id="4" name="TextBox 3"/>
+                <p:cNvSpPr txBox="1">
+                  <a:spLocks noRot="1" noChangeAspect="1" noMove="1" noResize="1" noEditPoints="1" noAdjustHandles="1" noChangeArrowheads="1" noChangeShapeType="1" noTextEdit="1"/>
+                </p:cNvSpPr>
+                <p:nvPr/>
+              </p:nvSpPr>
+              <p:spPr>
+                <a:xfrm>
+                  <a:off x="4624840" y="4761926"/>
+                  <a:ext cx="875532" cy="400110"/>
+                </a:xfrm>
+                <a:prstGeom prst="rect">
+                  <a:avLst/>
+                </a:prstGeom>
+                <a:blipFill rotWithShape="0">
+                  <a:blip r:embed="rId4"/>
+                  <a:stretch>
+                    <a:fillRect b="-18462"/>
+                  </a:stretch>
+                </a:blipFill>
+              </p:spPr>
+              <p:txBody>
+                <a:bodyPr/>
+                <a:lstStyle/>
+                <a:p>
+                  <a:r>
+                    <a:rPr lang="en-US">
+                      <a:noFill/>
+                    </a:rPr>
+                    <a:t> </a:t>
+                  </a:r>
+                </a:p>
+              </p:txBody>
+            </p:sp>
+          </mc:Fallback>
+        </mc:AlternateContent>
+      </p:grpSp>
+      <p:cxnSp>
+        <p:nvCxnSpPr>
+          <p:cNvPr id="25" name="Straight Connector 24"/>
+          <p:cNvCxnSpPr/>
+          <p:nvPr/>
+        </p:nvCxnSpPr>
+        <p:spPr bwMode="auto">
+          <a:xfrm>
+            <a:off x="2817035" y="2002412"/>
+            <a:ext cx="539750" cy="6350"/>
+          </a:xfrm>
+          <a:prstGeom prst="line">
+            <a:avLst/>
+          </a:prstGeom>
+          <a:solidFill>
+            <a:srgbClr val="00B8FF"/>
+          </a:solidFill>
+          <a:ln w="25400" cap="flat" cmpd="sng" algn="ctr">
+            <a:solidFill>
+              <a:srgbClr val="FF0000"/>
+            </a:solidFill>
+            <a:prstDash val="solid"/>
+            <a:round/>
+            <a:headEnd type="none" w="med" len="med"/>
+            <a:tailEnd type="none" w="med" len="med"/>
+          </a:ln>
+          <a:effectLst/>
+        </p:spPr>
+      </p:cxnSp>
+      <p:cxnSp>
+        <p:nvCxnSpPr>
+          <p:cNvPr id="26" name="Straight Connector 25"/>
+          <p:cNvCxnSpPr/>
+          <p:nvPr/>
+        </p:nvCxnSpPr>
+        <p:spPr bwMode="auto">
+          <a:xfrm>
+            <a:off x="4610486" y="2003031"/>
+            <a:ext cx="539750" cy="6350"/>
+          </a:xfrm>
+          <a:prstGeom prst="line">
+            <a:avLst/>
+          </a:prstGeom>
+          <a:solidFill>
+            <a:srgbClr val="00B8FF"/>
+          </a:solidFill>
+          <a:ln w="25400" cap="flat" cmpd="sng" algn="ctr">
+            <a:solidFill>
+              <a:srgbClr val="0404BC"/>
+            </a:solidFill>
+            <a:prstDash val="solid"/>
+            <a:round/>
+            <a:headEnd type="none" w="med" len="med"/>
+            <a:tailEnd type="none" w="med" len="med"/>
+          </a:ln>
+          <a:effectLst/>
+        </p:spPr>
+      </p:cxnSp>
+      <p:sp>
+        <p:nvSpPr>
+          <p:cNvPr id="27" name="TextBox 26"/>
+          <p:cNvSpPr txBox="1"/>
+          <p:nvPr/>
+        </p:nvSpPr>
+        <p:spPr>
+          <a:xfrm>
+            <a:off x="5090429" y="1826652"/>
+            <a:ext cx="965443" cy="307777"/>
+          </a:xfrm>
+          <a:prstGeom prst="rect">
+            <a:avLst/>
+          </a:prstGeom>
+          <a:noFill/>
+        </p:spPr>
+        <p:txBody>
+          <a:bodyPr wrap="square" rtlCol="0">
+            <a:spAutoFit/>
+          </a:bodyPr>
+          <a:lstStyle/>
+          <a:p>
+            <a:r>
+              <a:rPr lang="en-US" sz="1400" dirty="0" smtClean="0">
+                <a:solidFill>
+                  <a:schemeClr val="tx1"/>
+                </a:solidFill>
+              </a:rPr>
+              <a:t>spin up</a:t>
+            </a:r>
+            <a:endParaRPr lang="en-US" sz="1400" dirty="0">
+              <a:solidFill>
+                <a:schemeClr val="tx1"/>
+              </a:solidFill>
+            </a:endParaRPr>
+          </a:p>
+        </p:txBody>
+      </p:sp>
+      <p:sp>
+        <p:nvSpPr>
+          <p:cNvPr id="28" name="TextBox 27"/>
+          <p:cNvSpPr txBox="1"/>
+          <p:nvPr/>
+        </p:nvSpPr>
+        <p:spPr>
+          <a:xfrm>
+            <a:off x="3311338" y="1842213"/>
+            <a:ext cx="1132205" cy="307777"/>
+          </a:xfrm>
+          <a:prstGeom prst="rect">
+            <a:avLst/>
+          </a:prstGeom>
+          <a:noFill/>
+        </p:spPr>
+        <p:txBody>
+          <a:bodyPr wrap="square" rtlCol="0">
+            <a:spAutoFit/>
+          </a:bodyPr>
+          <a:lstStyle/>
+          <a:p>
+            <a:r>
+              <a:rPr lang="en-US" sz="1400" dirty="0" smtClean="0">
+                <a:solidFill>
+                  <a:schemeClr val="tx1"/>
+                </a:solidFill>
+              </a:rPr>
+              <a:t>spin down</a:t>
+            </a:r>
+            <a:endParaRPr lang="en-US" sz="1400" dirty="0">
+              <a:solidFill>
+                <a:schemeClr val="tx1"/>
+              </a:solidFill>
+            </a:endParaRPr>
+          </a:p>
+        </p:txBody>
+      </p:sp>
+    </p:spTree>
+    <p:extLst>
+      <p:ext uri="{BB962C8B-B14F-4D97-AF65-F5344CB8AC3E}">
+        <p14:creationId xmlns:p14="http://schemas.microsoft.com/office/powerpoint/2010/main" val="2814038135"/>
+      </p:ext>
+    </p:extLst>
+  </p:cSld>
+  <p:clrMapOvr>
+    <a:masterClrMapping/>
+  </p:clrMapOvr>
+</p:sld>
+</file>
+
+<file path=ppt/slides/slide6.xml><?xml version="1.0" encoding="utf-8"?>
+<p:sld xmlns:a="http://schemas.openxmlformats.org/drawingml/2006/main" xmlns:r="http://schemas.openxmlformats.org/officeDocument/2006/relationships" xmlns:p="http://schemas.openxmlformats.org/presentationml/2006/main">
+  <p:cSld>
+    <p:spTree>
+      <p:nvGrpSpPr>
+        <p:cNvPr id="1" name=""/>
+        <p:cNvGrpSpPr/>
+        <p:nvPr/>
+      </p:nvGrpSpPr>
+      <p:grpSpPr>
+        <a:xfrm>
+          <a:off x="0" y="0"/>
+          <a:ext cx="0" cy="0"/>
+          <a:chOff x="0" y="0"/>
+          <a:chExt cx="0" cy="0"/>
+        </a:xfrm>
+      </p:grpSpPr>
+      <p:sp>
+        <p:nvSpPr>
+          <p:cNvPr id="2" name="Rectangle 6"/>
+          <p:cNvSpPr>
+            <a:spLocks noChangeArrowheads="1"/>
+          </p:cNvSpPr>
+          <p:nvPr/>
+        </p:nvSpPr>
+        <p:spPr bwMode="auto">
+          <a:xfrm>
+            <a:off x="2288109" y="1742904"/>
+            <a:ext cx="3889587" cy="3886200"/>
+          </a:xfrm>
+          <a:prstGeom prst="rect">
+            <a:avLst/>
+          </a:prstGeom>
+          <a:noFill/>
+          <a:ln w="9360">
+            <a:solidFill>
+              <a:srgbClr val="000000"/>
+            </a:solidFill>
+            <a:miter lim="800000"/>
+            <a:headEnd/>
+            <a:tailEnd/>
+          </a:ln>
+          <a:extLst>
+            <a:ext uri="{909E8E84-426E-40DD-AFC4-6F175D3DCCD1}">
+              <a14:hiddenFill xmlns:a14="http://schemas.microsoft.com/office/drawing/2010/main">
+                <a:solidFill>
+                  <a:srgbClr val="FFFFFF"/>
+                </a:solidFill>
+              </a14:hiddenFill>
+            </a:ext>
+          </a:extLst>
+        </p:spPr>
+        <p:txBody>
+          <a:bodyPr wrap="none" anchor="ctr"/>
+          <a:lstStyle/>
+          <a:p>
+            <a:pPr eaLnBrk="1" hangingPunct="1">
+              <a:buClr>
+                <a:srgbClr val="000000"/>
+              </a:buClr>
+              <a:buSzPct val="100000"/>
+              <a:buFont typeface="Times New Roman" panose="02020603050405020304" pitchFamily="18" charset="0"/>
+              <a:buNone/>
+            </a:pPr>
+            <a:endParaRPr lang="en-US" altLang="en-US"/>
+          </a:p>
+        </p:txBody>
+      </p:sp>
+      <p:pic>
+        <p:nvPicPr>
+          <p:cNvPr id="3" name="Picture 2"/>
+          <p:cNvPicPr>
+            <a:picLocks noChangeAspect="1"/>
+          </p:cNvPicPr>
+          <p:nvPr/>
+        </p:nvPicPr>
+        <p:blipFill>
+          <a:blip r:embed="rId2">
+            <a:extLst>
+              <a:ext uri="{28A0092B-C50C-407E-A947-70E740481C1C}">
+                <a14:useLocalDpi xmlns:a14="http://schemas.microsoft.com/office/drawing/2010/main" val="0"/>
+              </a:ext>
+            </a:extLst>
+          </a:blip>
+          <a:stretch>
+            <a:fillRect/>
+          </a:stretch>
+        </p:blipFill>
+        <p:spPr>
+          <a:xfrm>
+            <a:off x="2407722" y="2286699"/>
+            <a:ext cx="3650359" cy="2798609"/>
+          </a:xfrm>
+          <a:prstGeom prst="rect">
+            <a:avLst/>
+          </a:prstGeom>
+        </p:spPr>
+      </p:pic>
+      <mc:AlternateContent xmlns:mc="http://schemas.openxmlformats.org/markup-compatibility/2006">
+        <mc:Choice xmlns:a14="http://schemas.microsoft.com/office/drawing/2010/main" Requires="a14">
+          <p:sp>
+            <p:nvSpPr>
+              <p:cNvPr id="13" name="TextBox 12"/>
+              <p:cNvSpPr txBox="1"/>
+              <p:nvPr/>
+            </p:nvSpPr>
+            <p:spPr>
+              <a:xfrm rot="5400000">
+                <a:off x="3887937" y="2676305"/>
+                <a:ext cx="1207412" cy="400110"/>
+              </a:xfrm>
+              <a:prstGeom prst="rect">
+                <a:avLst/>
+              </a:prstGeom>
+              <a:noFill/>
+            </p:spPr>
+            <p:txBody>
+              <a:bodyPr wrap="square" rtlCol="0">
+                <a:spAutoFit/>
+              </a:bodyPr>
+              <a:lstStyle/>
+              <a:p>
+                <a:pPr/>
+                <a14:m>
+                  <m:oMathPara xmlns:m="http://schemas.openxmlformats.org/officeDocument/2006/math">
+                    <m:oMathParaPr>
+                      <m:jc m:val="centerGroup"/>
+                    </m:oMathParaPr>
+                    <m:oMath xmlns:m="http://schemas.openxmlformats.org/officeDocument/2006/math">
+                      <m:r>
+                        <a:rPr lang="en-US" sz="2000" b="0" i="1" smtClean="0">
+                          <a:solidFill>
+                            <a:schemeClr val="tx1"/>
+                          </a:solidFill>
+                          <a:latin typeface="Cambria Math" panose="02040503050406030204" pitchFamily="18" charset="0"/>
+                        </a:rPr>
+                        <m:t>𝜌</m:t>
+                      </m:r>
+                      <m:r>
+                        <a:rPr lang="en-US" sz="2000" b="0" i="1" smtClean="0">
+                          <a:solidFill>
+                            <a:schemeClr val="tx1"/>
+                          </a:solidFill>
+                          <a:latin typeface="Cambria Math" panose="02040503050406030204" pitchFamily="18" charset="0"/>
+                        </a:rPr>
+                        <m:t>(</m:t>
+                      </m:r>
+                      <m:r>
+                        <a:rPr lang="en-US" sz="2000" b="0" i="1" smtClean="0">
+                          <a:solidFill>
+                            <a:schemeClr val="tx1"/>
+                          </a:solidFill>
+                          <a:latin typeface="Cambria Math" panose="02040503050406030204" pitchFamily="18" charset="0"/>
+                        </a:rPr>
+                        <m:t>𝜔</m:t>
+                      </m:r>
+                      <m:r>
+                        <a:rPr lang="en-US" sz="2000" b="0" i="1" smtClean="0">
+                          <a:solidFill>
+                            <a:schemeClr val="tx1"/>
+                          </a:solidFill>
+                          <a:latin typeface="Cambria Math" panose="02040503050406030204" pitchFamily="18" charset="0"/>
+                        </a:rPr>
+                        <m:t>)/</m:t>
+                      </m:r>
+                      <m:sSub>
+                        <m:sSubPr>
+                          <m:ctrlPr>
+                            <a:rPr lang="en-US" sz="2000" b="0" i="1" smtClean="0">
+                              <a:solidFill>
+                                <a:schemeClr val="tx1"/>
+                              </a:solidFill>
+                              <a:latin typeface="Cambria Math" panose="02040503050406030204" pitchFamily="18" charset="0"/>
+                            </a:rPr>
+                          </m:ctrlPr>
+                        </m:sSubPr>
+                        <m:e>
+                          <m:r>
+                            <a:rPr lang="en-US" sz="2000" b="0" i="1" smtClean="0">
+                              <a:solidFill>
+                                <a:schemeClr val="tx1"/>
+                              </a:solidFill>
+                              <a:latin typeface="Cambria Math" panose="02040503050406030204" pitchFamily="18" charset="0"/>
+                            </a:rPr>
+                            <m:t>𝜌</m:t>
+                          </m:r>
+                        </m:e>
+                        <m:sub>
+                          <m:r>
+                            <a:rPr lang="en-US" sz="2000" b="0" i="1" smtClean="0">
+                              <a:solidFill>
+                                <a:schemeClr val="tx1"/>
+                              </a:solidFill>
+                              <a:latin typeface="Cambria Math" panose="02040503050406030204" pitchFamily="18" charset="0"/>
+                            </a:rPr>
+                            <m:t>0</m:t>
+                          </m:r>
+                        </m:sub>
+                      </m:sSub>
+                    </m:oMath>
+                  </m:oMathPara>
+                </a14:m>
+                <a:endParaRPr lang="en-US" sz="2000" dirty="0">
+                  <a:solidFill>
+                    <a:schemeClr val="tx1"/>
+                  </a:solidFill>
+                  <a:latin typeface="Cambria" panose="02040503050406030204" pitchFamily="18" charset="0"/>
+                </a:endParaRPr>
+              </a:p>
+            </p:txBody>
+          </p:sp>
+        </mc:Choice>
+        <mc:Fallback>
+          <p:sp>
+            <p:nvSpPr>
+              <p:cNvPr id="13" name="TextBox 12"/>
+              <p:cNvSpPr txBox="1">
+                <a:spLocks noRot="1" noChangeAspect="1" noMove="1" noResize="1" noEditPoints="1" noAdjustHandles="1" noChangeArrowheads="1" noChangeShapeType="1" noTextEdit="1"/>
+              </p:cNvSpPr>
+              <p:nvPr/>
+            </p:nvSpPr>
+            <p:spPr>
+              <a:xfrm rot="5400000">
+                <a:off x="3887937" y="2676305"/>
+                <a:ext cx="1207412" cy="400110"/>
+              </a:xfrm>
+              <a:prstGeom prst="rect">
+                <a:avLst/>
+              </a:prstGeom>
+              <a:blipFill rotWithShape="0">
+                <a:blip r:embed="rId3"/>
+                <a:stretch>
+                  <a:fillRect l="-18182"/>
+                </a:stretch>
+              </a:blipFill>
+            </p:spPr>
+            <p:txBody>
+              <a:bodyPr/>
+              <a:lstStyle/>
+              <a:p>
+                <a:r>
+                  <a:rPr lang="en-US">
+                    <a:noFill/>
+                  </a:rPr>
+                  <a:t> </a:t>
+                </a:r>
+              </a:p>
+            </p:txBody>
+          </p:sp>
+        </mc:Fallback>
+      </mc:AlternateContent>
+      <p:grpSp>
+        <p:nvGrpSpPr>
+          <p:cNvPr id="15" name="Group 14"/>
+          <p:cNvGrpSpPr/>
+          <p:nvPr/>
+        </p:nvGrpSpPr>
+        <p:grpSpPr>
+          <a:xfrm>
+            <a:off x="3750485" y="4807582"/>
+            <a:ext cx="1098550" cy="400110"/>
+            <a:chOff x="4580189" y="4761926"/>
+            <a:chExt cx="1098550" cy="400110"/>
+          </a:xfrm>
+        </p:grpSpPr>
+        <p:sp>
+          <p:nvSpPr>
+            <p:cNvPr id="14" name="Rectangle 13"/>
+            <p:cNvSpPr/>
+            <p:nvPr/>
+          </p:nvSpPr>
+          <p:spPr bwMode="auto">
+            <a:xfrm>
+              <a:off x="4580189" y="4864099"/>
+              <a:ext cx="1098550" cy="293051"/>
+            </a:xfrm>
+            <a:prstGeom prst="rect">
+              <a:avLst/>
+            </a:prstGeom>
+            <a:solidFill>
+              <a:schemeClr val="bg1"/>
+            </a:solidFill>
+            <a:ln w="9525" cap="flat" cmpd="sng" algn="ctr">
+              <a:solidFill>
+                <a:schemeClr val="bg1"/>
+              </a:solidFill>
+              <a:prstDash val="solid"/>
+              <a:round/>
+              <a:headEnd type="none" w="med" len="med"/>
+              <a:tailEnd type="none" w="med" len="med"/>
+            </a:ln>
+            <a:effectLst/>
+          </p:spPr>
+          <p:txBody>
+            <a:bodyPr vert="horz" wrap="square" lIns="91440" tIns="45720" rIns="91440" bIns="45720" numCol="1" rtlCol="0" anchor="t" anchorCtr="0" compatLnSpc="1">
+              <a:prstTxWarp prst="textNoShape">
+                <a:avLst/>
+              </a:prstTxWarp>
+            </a:bodyPr>
+            <a:lstStyle/>
+            <a:p>
+              <a:pPr marL="0" marR="0" indent="0" algn="l" defTabSz="457200" rtl="0" eaLnBrk="1" fontAlgn="base" latinLnBrk="0" hangingPunct="1">
+                <a:lnSpc>
+                  <a:spcPct val="100000"/>
+                </a:lnSpc>
+                <a:spcBef>
+                  <a:spcPct val="0"/>
+                </a:spcBef>
+                <a:spcAft>
+                  <a:spcPct val="0"/>
+                </a:spcAft>
+                <a:buClr>
+                  <a:srgbClr val="000000"/>
+                </a:buClr>
+                <a:buSzPct val="100000"/>
+                <a:buFont typeface="Times New Roman" pitchFamily="16" charset="0"/>
+                <a:buNone/>
+                <a:tabLst/>
+              </a:pPr>
+              <a:endParaRPr kumimoji="0" lang="en-US" sz="1800" b="0" i="0" u="none" strike="noStrike" cap="none" normalizeH="0" baseline="0" smtClean="0">
+                <a:ln>
+                  <a:noFill/>
+                </a:ln>
+                <a:solidFill>
+                  <a:schemeClr val="bg1"/>
+                </a:solidFill>
+                <a:effectLst/>
+                <a:latin typeface="Arial" charset="0"/>
+              </a:endParaRPr>
+            </a:p>
+          </p:txBody>
+        </p:sp>
+        <mc:AlternateContent xmlns:mc="http://schemas.openxmlformats.org/markup-compatibility/2006">
+          <mc:Choice xmlns:a14="http://schemas.microsoft.com/office/drawing/2010/main" Requires="a14">
+            <p:sp>
+              <p:nvSpPr>
+                <p:cNvPr id="4" name="TextBox 3"/>
+                <p:cNvSpPr txBox="1"/>
+                <p:nvPr/>
+              </p:nvSpPr>
+              <p:spPr>
+                <a:xfrm>
+                  <a:off x="4624840" y="4761926"/>
+                  <a:ext cx="875532" cy="400110"/>
+                </a:xfrm>
+                <a:prstGeom prst="rect">
+                  <a:avLst/>
+                </a:prstGeom>
+                <a:noFill/>
+              </p:spPr>
+              <p:txBody>
+                <a:bodyPr wrap="square" rtlCol="0">
+                  <a:spAutoFit/>
+                </a:bodyPr>
+                <a:lstStyle/>
+                <a:p>
+                  <a:pPr/>
+                  <a14:m>
+                    <m:oMathPara xmlns:m="http://schemas.openxmlformats.org/officeDocument/2006/math">
+                      <m:oMathParaPr>
+                        <m:jc m:val="centerGroup"/>
+                      </m:oMathParaPr>
+                      <m:oMath xmlns:m="http://schemas.openxmlformats.org/officeDocument/2006/math">
+                        <m:r>
+                          <a:rPr lang="en-US" sz="2000" b="0" i="1" smtClean="0">
+                            <a:solidFill>
+                              <a:schemeClr val="tx1"/>
+                            </a:solidFill>
+                            <a:latin typeface="Cambria Math" panose="02040503050406030204" pitchFamily="18" charset="0"/>
+                          </a:rPr>
+                          <m:t>𝜔</m:t>
+                        </m:r>
+                        <m:r>
+                          <a:rPr lang="en-US" sz="2000" b="0" i="1" smtClean="0">
+                            <a:solidFill>
+                              <a:schemeClr val="tx1"/>
+                            </a:solidFill>
+                            <a:latin typeface="Cambria Math" panose="02040503050406030204" pitchFamily="18" charset="0"/>
+                          </a:rPr>
+                          <m:t>/</m:t>
+                        </m:r>
+                        <m:r>
+                          <m:rPr>
+                            <m:sty m:val="p"/>
+                          </m:rPr>
+                          <a:rPr lang="en-US" sz="2000" b="0" i="0" smtClean="0">
+                            <a:solidFill>
+                              <a:schemeClr val="tx1"/>
+                            </a:solidFill>
+                            <a:latin typeface="Cambria Math" panose="02040503050406030204" pitchFamily="18" charset="0"/>
+                          </a:rPr>
+                          <m:t>Δ</m:t>
+                        </m:r>
+                      </m:oMath>
+                    </m:oMathPara>
+                  </a14:m>
+                  <a:endParaRPr lang="en-US" sz="2000" dirty="0">
+                    <a:solidFill>
+                      <a:schemeClr val="tx1"/>
+                    </a:solidFill>
+                    <a:latin typeface="Cambria" panose="02040503050406030204" pitchFamily="18" charset="0"/>
+                  </a:endParaRPr>
+                </a:p>
+              </p:txBody>
+            </p:sp>
+          </mc:Choice>
+          <mc:Fallback>
+            <p:sp>
+              <p:nvSpPr>
+                <p:cNvPr id="4" name="TextBox 3"/>
+                <p:cNvSpPr txBox="1">
+                  <a:spLocks noRot="1" noChangeAspect="1" noMove="1" noResize="1" noEditPoints="1" noAdjustHandles="1" noChangeArrowheads="1" noChangeShapeType="1" noTextEdit="1"/>
+                </p:cNvSpPr>
+                <p:nvPr/>
+              </p:nvSpPr>
+              <p:spPr>
+                <a:xfrm>
+                  <a:off x="4624840" y="4761926"/>
+                  <a:ext cx="875532" cy="400110"/>
+                </a:xfrm>
+                <a:prstGeom prst="rect">
+                  <a:avLst/>
+                </a:prstGeom>
+                <a:blipFill rotWithShape="0">
+                  <a:blip r:embed="rId4"/>
+                  <a:stretch>
+                    <a:fillRect b="-18462"/>
+                  </a:stretch>
+                </a:blipFill>
+              </p:spPr>
+              <p:txBody>
+                <a:bodyPr/>
+                <a:lstStyle/>
+                <a:p>
+                  <a:r>
+                    <a:rPr lang="en-US">
+                      <a:noFill/>
+                    </a:rPr>
+                    <a:t> </a:t>
+                  </a:r>
+                </a:p>
+              </p:txBody>
+            </p:sp>
+          </mc:Fallback>
+        </mc:AlternateContent>
+      </p:grpSp>
+      <p:cxnSp>
+        <p:nvCxnSpPr>
+          <p:cNvPr id="25" name="Straight Connector 24"/>
+          <p:cNvCxnSpPr/>
+          <p:nvPr/>
+        </p:nvCxnSpPr>
+        <p:spPr bwMode="auto">
+          <a:xfrm>
+            <a:off x="2817035" y="2002412"/>
+            <a:ext cx="539750" cy="6350"/>
+          </a:xfrm>
+          <a:prstGeom prst="line">
+            <a:avLst/>
+          </a:prstGeom>
+          <a:solidFill>
+            <a:srgbClr val="00B8FF"/>
+          </a:solidFill>
+          <a:ln w="25400" cap="flat" cmpd="sng" algn="ctr">
+            <a:solidFill>
+              <a:srgbClr val="FF0000"/>
+            </a:solidFill>
+            <a:prstDash val="solid"/>
+            <a:round/>
+            <a:headEnd type="none" w="med" len="med"/>
+            <a:tailEnd type="none" w="med" len="med"/>
+          </a:ln>
+          <a:effectLst/>
+        </p:spPr>
+      </p:cxnSp>
+      <p:cxnSp>
+        <p:nvCxnSpPr>
+          <p:cNvPr id="26" name="Straight Connector 25"/>
+          <p:cNvCxnSpPr/>
+          <p:nvPr/>
+        </p:nvCxnSpPr>
+        <p:spPr bwMode="auto">
+          <a:xfrm>
+            <a:off x="4610486" y="2003031"/>
+            <a:ext cx="539750" cy="6350"/>
+          </a:xfrm>
+          <a:prstGeom prst="line">
+            <a:avLst/>
+          </a:prstGeom>
+          <a:solidFill>
+            <a:srgbClr val="00B8FF"/>
+          </a:solidFill>
+          <a:ln w="25400" cap="flat" cmpd="sng" algn="ctr">
+            <a:solidFill>
+              <a:srgbClr val="0404BC"/>
+            </a:solidFill>
+            <a:prstDash val="solid"/>
+            <a:round/>
+            <a:headEnd type="none" w="med" len="med"/>
+            <a:tailEnd type="none" w="med" len="med"/>
+          </a:ln>
+          <a:effectLst/>
+        </p:spPr>
+      </p:cxnSp>
+      <p:sp>
+        <p:nvSpPr>
+          <p:cNvPr id="27" name="TextBox 26"/>
+          <p:cNvSpPr txBox="1"/>
+          <p:nvPr/>
+        </p:nvSpPr>
+        <p:spPr>
+          <a:xfrm>
+            <a:off x="5090429" y="1826652"/>
+            <a:ext cx="965443" cy="307777"/>
+          </a:xfrm>
+          <a:prstGeom prst="rect">
+            <a:avLst/>
+          </a:prstGeom>
+          <a:noFill/>
+        </p:spPr>
+        <p:txBody>
+          <a:bodyPr wrap="square" rtlCol="0">
+            <a:spAutoFit/>
+          </a:bodyPr>
+          <a:lstStyle/>
+          <a:p>
+            <a:r>
+              <a:rPr lang="en-US" sz="1400" dirty="0" smtClean="0">
+                <a:solidFill>
+                  <a:schemeClr val="tx1"/>
+                </a:solidFill>
+              </a:rPr>
+              <a:t>spin up</a:t>
+            </a:r>
+            <a:endParaRPr lang="en-US" sz="1400" dirty="0">
+              <a:solidFill>
+                <a:schemeClr val="tx1"/>
+              </a:solidFill>
+            </a:endParaRPr>
+          </a:p>
+        </p:txBody>
+      </p:sp>
+      <p:sp>
+        <p:nvSpPr>
+          <p:cNvPr id="28" name="TextBox 27"/>
+          <p:cNvSpPr txBox="1"/>
+          <p:nvPr/>
+        </p:nvSpPr>
+        <p:spPr>
+          <a:xfrm>
+            <a:off x="3311338" y="1842213"/>
+            <a:ext cx="1132205" cy="307777"/>
+          </a:xfrm>
+          <a:prstGeom prst="rect">
+            <a:avLst/>
+          </a:prstGeom>
+          <a:noFill/>
+        </p:spPr>
+        <p:txBody>
+          <a:bodyPr wrap="square" rtlCol="0">
+            <a:spAutoFit/>
+          </a:bodyPr>
+          <a:lstStyle/>
+          <a:p>
+            <a:r>
+              <a:rPr lang="en-US" sz="1400" dirty="0" smtClean="0">
+                <a:solidFill>
+                  <a:schemeClr val="tx1"/>
+                </a:solidFill>
+              </a:rPr>
+              <a:t>spin down</a:t>
+            </a:r>
+            <a:endParaRPr lang="en-US" sz="1400" dirty="0">
+              <a:solidFill>
+                <a:schemeClr val="tx1"/>
+              </a:solidFill>
+            </a:endParaRPr>
+          </a:p>
+        </p:txBody>
+      </p:sp>
+    </p:spTree>
+    <p:extLst>
+      <p:ext uri="{BB962C8B-B14F-4D97-AF65-F5344CB8AC3E}">
+        <p14:creationId xmlns:p14="http://schemas.microsoft.com/office/powerpoint/2010/main" val="2819936326"/>
+      </p:ext>
+    </p:extLst>
+  </p:cSld>
+  <p:clrMapOvr>
+    <a:masterClrMapping/>
+  </p:clrMapOvr>
+</p:sld>
+</file>
+
+<file path=ppt/slides/slide7.xml><?xml version="1.0" encoding="utf-8"?>
+<p:sld xmlns:a="http://schemas.openxmlformats.org/drawingml/2006/main" xmlns:r="http://schemas.openxmlformats.org/officeDocument/2006/relationships" xmlns:p="http://schemas.openxmlformats.org/presentationml/2006/main">
+  <p:cSld>
+    <p:spTree>
+      <p:nvGrpSpPr>
+        <p:cNvPr id="1" name=""/>
+        <p:cNvGrpSpPr/>
+        <p:nvPr/>
+      </p:nvGrpSpPr>
+      <p:grpSpPr>
+        <a:xfrm>
+          <a:off x="0" y="0"/>
+          <a:ext cx="0" cy="0"/>
+          <a:chOff x="0" y="0"/>
+          <a:chExt cx="0" cy="0"/>
+        </a:xfrm>
+      </p:grpSpPr>
+      <p:sp>
+        <p:nvSpPr>
+          <p:cNvPr id="2" name="Rectangle 6"/>
+          <p:cNvSpPr>
+            <a:spLocks noChangeArrowheads="1"/>
+          </p:cNvSpPr>
+          <p:nvPr/>
+        </p:nvSpPr>
+        <p:spPr bwMode="auto">
+          <a:xfrm>
+            <a:off x="2288109" y="1742904"/>
+            <a:ext cx="3889587" cy="3886200"/>
+          </a:xfrm>
+          <a:prstGeom prst="rect">
+            <a:avLst/>
+          </a:prstGeom>
+          <a:noFill/>
+          <a:ln w="9360">
+            <a:solidFill>
+              <a:srgbClr val="000000"/>
+            </a:solidFill>
+            <a:miter lim="800000"/>
+            <a:headEnd/>
+            <a:tailEnd/>
+          </a:ln>
+          <a:extLst>
+            <a:ext uri="{909E8E84-426E-40DD-AFC4-6F175D3DCCD1}">
+              <a14:hiddenFill xmlns:a14="http://schemas.microsoft.com/office/drawing/2010/main">
+                <a:solidFill>
+                  <a:srgbClr val="FFFFFF"/>
+                </a:solidFill>
+              </a14:hiddenFill>
+            </a:ext>
+          </a:extLst>
+        </p:spPr>
+        <p:txBody>
+          <a:bodyPr wrap="none" anchor="ctr"/>
+          <a:lstStyle/>
+          <a:p>
+            <a:pPr eaLnBrk="1" hangingPunct="1">
+              <a:buClr>
+                <a:srgbClr val="000000"/>
+              </a:buClr>
+              <a:buSzPct val="100000"/>
+              <a:buFont typeface="Times New Roman" panose="02020603050405020304" pitchFamily="18" charset="0"/>
+              <a:buNone/>
+            </a:pPr>
+            <a:endParaRPr lang="en-US" altLang="en-US"/>
+          </a:p>
+        </p:txBody>
+      </p:sp>
+      <p:pic>
+        <p:nvPicPr>
+          <p:cNvPr id="3" name="Picture 2"/>
+          <p:cNvPicPr>
+            <a:picLocks noChangeAspect="1"/>
+          </p:cNvPicPr>
+          <p:nvPr/>
+        </p:nvPicPr>
+        <p:blipFill>
+          <a:blip r:embed="rId2">
+            <a:extLst>
+              <a:ext uri="{28A0092B-C50C-407E-A947-70E740481C1C}">
+                <a14:useLocalDpi xmlns:a14="http://schemas.microsoft.com/office/drawing/2010/main" val="0"/>
+              </a:ext>
+            </a:extLst>
+          </a:blip>
+          <a:stretch>
+            <a:fillRect/>
+          </a:stretch>
+        </p:blipFill>
+        <p:spPr>
+          <a:xfrm>
+            <a:off x="2407722" y="2286699"/>
+            <a:ext cx="3650359" cy="2798608"/>
+          </a:xfrm>
+          <a:prstGeom prst="rect">
+            <a:avLst/>
+          </a:prstGeom>
+        </p:spPr>
+      </p:pic>
+      <mc:AlternateContent xmlns:mc="http://schemas.openxmlformats.org/markup-compatibility/2006">
+        <mc:Choice xmlns:a14="http://schemas.microsoft.com/office/drawing/2010/main" Requires="a14">
+          <p:sp>
+            <p:nvSpPr>
+              <p:cNvPr id="13" name="TextBox 12"/>
+              <p:cNvSpPr txBox="1"/>
+              <p:nvPr/>
+            </p:nvSpPr>
+            <p:spPr>
+              <a:xfrm rot="5400000">
+                <a:off x="3887937" y="2676305"/>
+                <a:ext cx="1207412" cy="400110"/>
+              </a:xfrm>
+              <a:prstGeom prst="rect">
+                <a:avLst/>
+              </a:prstGeom>
+              <a:noFill/>
+            </p:spPr>
+            <p:txBody>
+              <a:bodyPr wrap="square" rtlCol="0">
+                <a:spAutoFit/>
+              </a:bodyPr>
+              <a:lstStyle/>
+              <a:p>
+                <a:pPr/>
+                <a14:m>
+                  <m:oMathPara xmlns:m="http://schemas.openxmlformats.org/officeDocument/2006/math">
+                    <m:oMathParaPr>
+                      <m:jc m:val="centerGroup"/>
+                    </m:oMathParaPr>
+                    <m:oMath xmlns:m="http://schemas.openxmlformats.org/officeDocument/2006/math">
+                      <m:r>
+                        <a:rPr lang="en-US" sz="2000" b="0" i="1" smtClean="0">
+                          <a:solidFill>
+                            <a:schemeClr val="tx1"/>
+                          </a:solidFill>
+                          <a:latin typeface="Cambria Math" panose="02040503050406030204" pitchFamily="18" charset="0"/>
+                        </a:rPr>
+                        <m:t>𝜌</m:t>
+                      </m:r>
+                      <m:r>
+                        <a:rPr lang="en-US" sz="2000" b="0" i="1" smtClean="0">
+                          <a:solidFill>
+                            <a:schemeClr val="tx1"/>
+                          </a:solidFill>
+                          <a:latin typeface="Cambria Math" panose="02040503050406030204" pitchFamily="18" charset="0"/>
+                        </a:rPr>
+                        <m:t>(</m:t>
+                      </m:r>
+                      <m:r>
+                        <a:rPr lang="en-US" sz="2000" b="0" i="1" smtClean="0">
+                          <a:solidFill>
+                            <a:schemeClr val="tx1"/>
+                          </a:solidFill>
+                          <a:latin typeface="Cambria Math" panose="02040503050406030204" pitchFamily="18" charset="0"/>
+                        </a:rPr>
+                        <m:t>𝜔</m:t>
+                      </m:r>
+                      <m:r>
+                        <a:rPr lang="en-US" sz="2000" b="0" i="1" smtClean="0">
+                          <a:solidFill>
+                            <a:schemeClr val="tx1"/>
+                          </a:solidFill>
+                          <a:latin typeface="Cambria Math" panose="02040503050406030204" pitchFamily="18" charset="0"/>
+                        </a:rPr>
+                        <m:t>)/</m:t>
+                      </m:r>
+                      <m:sSub>
+                        <m:sSubPr>
+                          <m:ctrlPr>
+                            <a:rPr lang="en-US" sz="2000" b="0" i="1" smtClean="0">
+                              <a:solidFill>
+                                <a:schemeClr val="tx1"/>
+                              </a:solidFill>
+                              <a:latin typeface="Cambria Math" panose="02040503050406030204" pitchFamily="18" charset="0"/>
+                            </a:rPr>
+                          </m:ctrlPr>
+                        </m:sSubPr>
+                        <m:e>
+                          <m:r>
+                            <a:rPr lang="en-US" sz="2000" b="0" i="1" smtClean="0">
+                              <a:solidFill>
+                                <a:schemeClr val="tx1"/>
+                              </a:solidFill>
+                              <a:latin typeface="Cambria Math" panose="02040503050406030204" pitchFamily="18" charset="0"/>
+                            </a:rPr>
+                            <m:t>𝜌</m:t>
+                          </m:r>
+                        </m:e>
+                        <m:sub>
+                          <m:r>
+                            <a:rPr lang="en-US" sz="2000" b="0" i="1" smtClean="0">
+                              <a:solidFill>
+                                <a:schemeClr val="tx1"/>
+                              </a:solidFill>
+                              <a:latin typeface="Cambria Math" panose="02040503050406030204" pitchFamily="18" charset="0"/>
+                            </a:rPr>
+                            <m:t>0</m:t>
+                          </m:r>
+                        </m:sub>
+                      </m:sSub>
+                    </m:oMath>
+                  </m:oMathPara>
+                </a14:m>
+                <a:endParaRPr lang="en-US" sz="2000" dirty="0">
+                  <a:solidFill>
+                    <a:schemeClr val="tx1"/>
+                  </a:solidFill>
+                  <a:latin typeface="Cambria" panose="02040503050406030204" pitchFamily="18" charset="0"/>
+                </a:endParaRPr>
+              </a:p>
+            </p:txBody>
+          </p:sp>
+        </mc:Choice>
+        <mc:Fallback>
+          <p:sp>
+            <p:nvSpPr>
+              <p:cNvPr id="13" name="TextBox 12"/>
+              <p:cNvSpPr txBox="1">
+                <a:spLocks noRot="1" noChangeAspect="1" noMove="1" noResize="1" noEditPoints="1" noAdjustHandles="1" noChangeArrowheads="1" noChangeShapeType="1" noTextEdit="1"/>
+              </p:cNvSpPr>
+              <p:nvPr/>
+            </p:nvSpPr>
+            <p:spPr>
+              <a:xfrm rot="5400000">
+                <a:off x="3887937" y="2676305"/>
+                <a:ext cx="1207412" cy="400110"/>
+              </a:xfrm>
+              <a:prstGeom prst="rect">
+                <a:avLst/>
+              </a:prstGeom>
+              <a:blipFill rotWithShape="0">
+                <a:blip r:embed="rId3"/>
+                <a:stretch>
+                  <a:fillRect l="-18182"/>
+                </a:stretch>
+              </a:blipFill>
+            </p:spPr>
+            <p:txBody>
+              <a:bodyPr/>
+              <a:lstStyle/>
+              <a:p>
+                <a:r>
+                  <a:rPr lang="en-US">
+                    <a:noFill/>
+                  </a:rPr>
+                  <a:t> </a:t>
+                </a:r>
+              </a:p>
+            </p:txBody>
+          </p:sp>
+        </mc:Fallback>
+      </mc:AlternateContent>
+      <p:grpSp>
+        <p:nvGrpSpPr>
+          <p:cNvPr id="15" name="Group 14"/>
+          <p:cNvGrpSpPr/>
+          <p:nvPr/>
+        </p:nvGrpSpPr>
+        <p:grpSpPr>
+          <a:xfrm>
+            <a:off x="3750485" y="4807582"/>
+            <a:ext cx="1098550" cy="400110"/>
+            <a:chOff x="4580189" y="4761926"/>
+            <a:chExt cx="1098550" cy="400110"/>
+          </a:xfrm>
+        </p:grpSpPr>
+        <p:sp>
+          <p:nvSpPr>
+            <p:cNvPr id="14" name="Rectangle 13"/>
+            <p:cNvSpPr/>
+            <p:nvPr/>
+          </p:nvSpPr>
+          <p:spPr bwMode="auto">
+            <a:xfrm>
+              <a:off x="4580189" y="4864099"/>
+              <a:ext cx="1098550" cy="293051"/>
+            </a:xfrm>
+            <a:prstGeom prst="rect">
+              <a:avLst/>
+            </a:prstGeom>
+            <a:solidFill>
+              <a:schemeClr val="bg1"/>
+            </a:solidFill>
+            <a:ln w="9525" cap="flat" cmpd="sng" algn="ctr">
+              <a:solidFill>
+                <a:schemeClr val="bg1"/>
+              </a:solidFill>
+              <a:prstDash val="solid"/>
+              <a:round/>
+              <a:headEnd type="none" w="med" len="med"/>
+              <a:tailEnd type="none" w="med" len="med"/>
+            </a:ln>
+            <a:effectLst/>
+          </p:spPr>
+          <p:txBody>
+            <a:bodyPr vert="horz" wrap="square" lIns="91440" tIns="45720" rIns="91440" bIns="45720" numCol="1" rtlCol="0" anchor="t" anchorCtr="0" compatLnSpc="1">
+              <a:prstTxWarp prst="textNoShape">
+                <a:avLst/>
+              </a:prstTxWarp>
+            </a:bodyPr>
+            <a:lstStyle/>
+            <a:p>
+              <a:pPr marL="0" marR="0" indent="0" algn="l" defTabSz="457200" rtl="0" eaLnBrk="1" fontAlgn="base" latinLnBrk="0" hangingPunct="1">
+                <a:lnSpc>
+                  <a:spcPct val="100000"/>
+                </a:lnSpc>
+                <a:spcBef>
+                  <a:spcPct val="0"/>
+                </a:spcBef>
+                <a:spcAft>
+                  <a:spcPct val="0"/>
+                </a:spcAft>
+                <a:buClr>
+                  <a:srgbClr val="000000"/>
+                </a:buClr>
+                <a:buSzPct val="100000"/>
+                <a:buFont typeface="Times New Roman" pitchFamily="16" charset="0"/>
+                <a:buNone/>
+                <a:tabLst/>
+              </a:pPr>
+              <a:endParaRPr kumimoji="0" lang="en-US" sz="1800" b="0" i="0" u="none" strike="noStrike" cap="none" normalizeH="0" baseline="0" smtClean="0">
+                <a:ln>
+                  <a:noFill/>
+                </a:ln>
+                <a:solidFill>
+                  <a:schemeClr val="bg1"/>
+                </a:solidFill>
+                <a:effectLst/>
+                <a:latin typeface="Arial" charset="0"/>
+              </a:endParaRPr>
+            </a:p>
+          </p:txBody>
+        </p:sp>
+        <mc:AlternateContent xmlns:mc="http://schemas.openxmlformats.org/markup-compatibility/2006">
+          <mc:Choice xmlns:a14="http://schemas.microsoft.com/office/drawing/2010/main" Requires="a14">
+            <p:sp>
+              <p:nvSpPr>
+                <p:cNvPr id="4" name="TextBox 3"/>
+                <p:cNvSpPr txBox="1"/>
+                <p:nvPr/>
+              </p:nvSpPr>
+              <p:spPr>
+                <a:xfrm>
+                  <a:off x="4624840" y="4761926"/>
+                  <a:ext cx="875532" cy="400110"/>
+                </a:xfrm>
+                <a:prstGeom prst="rect">
+                  <a:avLst/>
+                </a:prstGeom>
+                <a:noFill/>
+              </p:spPr>
+              <p:txBody>
+                <a:bodyPr wrap="square" rtlCol="0">
+                  <a:spAutoFit/>
+                </a:bodyPr>
+                <a:lstStyle/>
+                <a:p>
+                  <a:pPr/>
+                  <a14:m>
+                    <m:oMathPara xmlns:m="http://schemas.openxmlformats.org/officeDocument/2006/math">
+                      <m:oMathParaPr>
+                        <m:jc m:val="centerGroup"/>
+                      </m:oMathParaPr>
+                      <m:oMath xmlns:m="http://schemas.openxmlformats.org/officeDocument/2006/math">
+                        <m:r>
+                          <a:rPr lang="en-US" sz="2000" b="0" i="1" smtClean="0">
+                            <a:solidFill>
+                              <a:schemeClr val="tx1"/>
+                            </a:solidFill>
+                            <a:latin typeface="Cambria Math" panose="02040503050406030204" pitchFamily="18" charset="0"/>
+                          </a:rPr>
+                          <m:t>𝜔</m:t>
+                        </m:r>
+                        <m:r>
+                          <a:rPr lang="en-US" sz="2000" b="0" i="1" smtClean="0">
+                            <a:solidFill>
+                              <a:schemeClr val="tx1"/>
+                            </a:solidFill>
+                            <a:latin typeface="Cambria Math" panose="02040503050406030204" pitchFamily="18" charset="0"/>
+                          </a:rPr>
+                          <m:t>/</m:t>
+                        </m:r>
+                        <m:r>
+                          <m:rPr>
+                            <m:sty m:val="p"/>
+                          </m:rPr>
+                          <a:rPr lang="en-US" sz="2000" b="0" i="0" smtClean="0">
+                            <a:solidFill>
+                              <a:schemeClr val="tx1"/>
+                            </a:solidFill>
+                            <a:latin typeface="Cambria Math" panose="02040503050406030204" pitchFamily="18" charset="0"/>
+                          </a:rPr>
+                          <m:t>Δ</m:t>
+                        </m:r>
+                      </m:oMath>
+                    </m:oMathPara>
+                  </a14:m>
+                  <a:endParaRPr lang="en-US" sz="2000" dirty="0">
+                    <a:solidFill>
+                      <a:schemeClr val="tx1"/>
+                    </a:solidFill>
+                    <a:latin typeface="Cambria" panose="02040503050406030204" pitchFamily="18" charset="0"/>
+                  </a:endParaRPr>
+                </a:p>
+              </p:txBody>
+            </p:sp>
+          </mc:Choice>
+          <mc:Fallback>
+            <p:sp>
+              <p:nvSpPr>
+                <p:cNvPr id="4" name="TextBox 3"/>
+                <p:cNvSpPr txBox="1">
+                  <a:spLocks noRot="1" noChangeAspect="1" noMove="1" noResize="1" noEditPoints="1" noAdjustHandles="1" noChangeArrowheads="1" noChangeShapeType="1" noTextEdit="1"/>
+                </p:cNvSpPr>
+                <p:nvPr/>
+              </p:nvSpPr>
+              <p:spPr>
+                <a:xfrm>
+                  <a:off x="4624840" y="4761926"/>
+                  <a:ext cx="875532" cy="400110"/>
+                </a:xfrm>
+                <a:prstGeom prst="rect">
+                  <a:avLst/>
+                </a:prstGeom>
+                <a:blipFill rotWithShape="0">
+                  <a:blip r:embed="rId4"/>
+                  <a:stretch>
+                    <a:fillRect b="-18462"/>
+                  </a:stretch>
+                </a:blipFill>
+              </p:spPr>
+              <p:txBody>
+                <a:bodyPr/>
+                <a:lstStyle/>
+                <a:p>
+                  <a:r>
+                    <a:rPr lang="en-US">
+                      <a:noFill/>
+                    </a:rPr>
+                    <a:t> </a:t>
+                  </a:r>
+                </a:p>
+              </p:txBody>
+            </p:sp>
+          </mc:Fallback>
+        </mc:AlternateContent>
+      </p:grpSp>
+      <p:cxnSp>
+        <p:nvCxnSpPr>
+          <p:cNvPr id="25" name="Straight Connector 24"/>
+          <p:cNvCxnSpPr/>
+          <p:nvPr/>
+        </p:nvCxnSpPr>
+        <p:spPr bwMode="auto">
+          <a:xfrm>
+            <a:off x="2817035" y="2002412"/>
+            <a:ext cx="539750" cy="6350"/>
+          </a:xfrm>
+          <a:prstGeom prst="line">
+            <a:avLst/>
+          </a:prstGeom>
+          <a:solidFill>
+            <a:srgbClr val="00B8FF"/>
+          </a:solidFill>
+          <a:ln w="25400" cap="flat" cmpd="sng" algn="ctr">
+            <a:solidFill>
+              <a:srgbClr val="FF0000"/>
+            </a:solidFill>
+            <a:prstDash val="solid"/>
+            <a:round/>
+            <a:headEnd type="none" w="med" len="med"/>
+            <a:tailEnd type="none" w="med" len="med"/>
+          </a:ln>
+          <a:effectLst/>
+        </p:spPr>
+      </p:cxnSp>
+      <p:cxnSp>
+        <p:nvCxnSpPr>
+          <p:cNvPr id="26" name="Straight Connector 25"/>
+          <p:cNvCxnSpPr/>
+          <p:nvPr/>
+        </p:nvCxnSpPr>
+        <p:spPr bwMode="auto">
+          <a:xfrm>
+            <a:off x="4610486" y="2003031"/>
+            <a:ext cx="539750" cy="6350"/>
+          </a:xfrm>
+          <a:prstGeom prst="line">
+            <a:avLst/>
+          </a:prstGeom>
+          <a:solidFill>
+            <a:srgbClr val="00B8FF"/>
+          </a:solidFill>
+          <a:ln w="25400" cap="flat" cmpd="sng" algn="ctr">
+            <a:solidFill>
+              <a:srgbClr val="0404BC"/>
+            </a:solidFill>
+            <a:prstDash val="solid"/>
+            <a:round/>
+            <a:headEnd type="none" w="med" len="med"/>
+            <a:tailEnd type="none" w="med" len="med"/>
+          </a:ln>
+          <a:effectLst/>
+        </p:spPr>
+      </p:cxnSp>
+      <p:sp>
+        <p:nvSpPr>
+          <p:cNvPr id="27" name="TextBox 26"/>
+          <p:cNvSpPr txBox="1"/>
+          <p:nvPr/>
+        </p:nvSpPr>
+        <p:spPr>
+          <a:xfrm>
+            <a:off x="5090429" y="1826652"/>
+            <a:ext cx="965443" cy="307777"/>
+          </a:xfrm>
+          <a:prstGeom prst="rect">
+            <a:avLst/>
+          </a:prstGeom>
+          <a:noFill/>
+        </p:spPr>
+        <p:txBody>
+          <a:bodyPr wrap="square" rtlCol="0">
+            <a:spAutoFit/>
+          </a:bodyPr>
+          <a:lstStyle/>
+          <a:p>
+            <a:r>
+              <a:rPr lang="en-US" sz="1400" dirty="0" smtClean="0">
+                <a:solidFill>
+                  <a:schemeClr val="tx1"/>
+                </a:solidFill>
+              </a:rPr>
+              <a:t>spin up</a:t>
+            </a:r>
+            <a:endParaRPr lang="en-US" sz="1400" dirty="0">
+              <a:solidFill>
+                <a:schemeClr val="tx1"/>
+              </a:solidFill>
+            </a:endParaRPr>
+          </a:p>
+        </p:txBody>
+      </p:sp>
+      <p:sp>
+        <p:nvSpPr>
+          <p:cNvPr id="28" name="TextBox 27"/>
+          <p:cNvSpPr txBox="1"/>
+          <p:nvPr/>
+        </p:nvSpPr>
+        <p:spPr>
+          <a:xfrm>
+            <a:off x="3311338" y="1842213"/>
+            <a:ext cx="1132205" cy="307777"/>
+          </a:xfrm>
+          <a:prstGeom prst="rect">
+            <a:avLst/>
+          </a:prstGeom>
+          <a:noFill/>
+        </p:spPr>
+        <p:txBody>
+          <a:bodyPr wrap="square" rtlCol="0">
+            <a:spAutoFit/>
+          </a:bodyPr>
+          <a:lstStyle/>
+          <a:p>
+            <a:r>
+              <a:rPr lang="en-US" sz="1400" dirty="0" smtClean="0">
+                <a:solidFill>
+                  <a:schemeClr val="tx1"/>
+                </a:solidFill>
+              </a:rPr>
+              <a:t>spin down</a:t>
+            </a:r>
+            <a:endParaRPr lang="en-US" sz="1400" dirty="0">
+              <a:solidFill>
+                <a:schemeClr val="tx1"/>
+              </a:solidFill>
+            </a:endParaRPr>
+          </a:p>
+        </p:txBody>
+      </p:sp>
+    </p:spTree>
+    <p:extLst>
+      <p:ext uri="{BB962C8B-B14F-4D97-AF65-F5344CB8AC3E}">
+        <p14:creationId xmlns:p14="http://schemas.microsoft.com/office/powerpoint/2010/main" val="1308596537"/>
+      </p:ext>
+    </p:extLst>
+  </p:cSld>
+  <p:clrMapOvr>
+    <a:masterClrMapping/>
+  </p:clrMapOvr>
+</p:sld>
+</file>
+
+<file path=ppt/slides/slide8.xml><?xml version="1.0" encoding="utf-8"?>
+<p:sld xmlns:a="http://schemas.openxmlformats.org/drawingml/2006/main" xmlns:r="http://schemas.openxmlformats.org/officeDocument/2006/relationships" xmlns:p="http://schemas.openxmlformats.org/presentationml/2006/main">
+  <p:cSld>
+    <p:spTree>
+      <p:nvGrpSpPr>
+        <p:cNvPr id="1" name=""/>
+        <p:cNvGrpSpPr/>
+        <p:nvPr/>
+      </p:nvGrpSpPr>
+      <p:grpSpPr>
+        <a:xfrm>
+          <a:off x="0" y="0"/>
+          <a:ext cx="0" cy="0"/>
+          <a:chOff x="0" y="0"/>
+          <a:chExt cx="0" cy="0"/>
+        </a:xfrm>
+      </p:grpSpPr>
+      <p:sp>
+        <p:nvSpPr>
+          <p:cNvPr id="2" name="Rectangle 6"/>
+          <p:cNvSpPr>
+            <a:spLocks noChangeArrowheads="1"/>
+          </p:cNvSpPr>
+          <p:nvPr/>
+        </p:nvSpPr>
+        <p:spPr bwMode="auto">
+          <a:xfrm>
+            <a:off x="2288109" y="1742904"/>
+            <a:ext cx="3889587" cy="3886200"/>
+          </a:xfrm>
+          <a:prstGeom prst="rect">
+            <a:avLst/>
+          </a:prstGeom>
+          <a:noFill/>
+          <a:ln w="9360">
+            <a:solidFill>
+              <a:srgbClr val="000000"/>
+            </a:solidFill>
+            <a:miter lim="800000"/>
+            <a:headEnd/>
+            <a:tailEnd/>
+          </a:ln>
+          <a:extLst>
+            <a:ext uri="{909E8E84-426E-40DD-AFC4-6F175D3DCCD1}">
+              <a14:hiddenFill xmlns:a14="http://schemas.microsoft.com/office/drawing/2010/main">
+                <a:solidFill>
+                  <a:srgbClr val="FFFFFF"/>
+                </a:solidFill>
+              </a14:hiddenFill>
+            </a:ext>
+          </a:extLst>
+        </p:spPr>
+        <p:txBody>
+          <a:bodyPr wrap="none" anchor="ctr"/>
+          <a:lstStyle/>
+          <a:p>
+            <a:pPr eaLnBrk="1" hangingPunct="1">
+              <a:buClr>
+                <a:srgbClr val="000000"/>
+              </a:buClr>
+              <a:buSzPct val="100000"/>
+              <a:buFont typeface="Times New Roman" panose="02020603050405020304" pitchFamily="18" charset="0"/>
+              <a:buNone/>
+            </a:pPr>
+            <a:endParaRPr lang="en-US" altLang="en-US"/>
+          </a:p>
+        </p:txBody>
+      </p:sp>
+      <p:pic>
+        <p:nvPicPr>
+          <p:cNvPr id="3" name="Picture 2"/>
+          <p:cNvPicPr>
+            <a:picLocks noChangeAspect="1"/>
+          </p:cNvPicPr>
+          <p:nvPr/>
+        </p:nvPicPr>
+        <p:blipFill>
+          <a:blip r:embed="rId2">
+            <a:extLst>
+              <a:ext uri="{28A0092B-C50C-407E-A947-70E740481C1C}">
+                <a14:useLocalDpi xmlns:a14="http://schemas.microsoft.com/office/drawing/2010/main" val="0"/>
+              </a:ext>
+            </a:extLst>
+          </a:blip>
+          <a:stretch>
+            <a:fillRect/>
+          </a:stretch>
+        </p:blipFill>
+        <p:spPr>
+          <a:xfrm>
+            <a:off x="2407722" y="2286699"/>
+            <a:ext cx="3650358" cy="2798608"/>
+          </a:xfrm>
+          <a:prstGeom prst="rect">
+            <a:avLst/>
+          </a:prstGeom>
+        </p:spPr>
+      </p:pic>
+      <mc:AlternateContent xmlns:mc="http://schemas.openxmlformats.org/markup-compatibility/2006">
+        <mc:Choice xmlns:a14="http://schemas.microsoft.com/office/drawing/2010/main" Requires="a14">
+          <p:sp>
+            <p:nvSpPr>
+              <p:cNvPr id="13" name="TextBox 12"/>
+              <p:cNvSpPr txBox="1"/>
+              <p:nvPr/>
+            </p:nvSpPr>
+            <p:spPr>
+              <a:xfrm rot="5400000">
+                <a:off x="3887937" y="2676305"/>
+                <a:ext cx="1207412" cy="400110"/>
+              </a:xfrm>
+              <a:prstGeom prst="rect">
+                <a:avLst/>
+              </a:prstGeom>
+              <a:noFill/>
+            </p:spPr>
+            <p:txBody>
+              <a:bodyPr wrap="square" rtlCol="0">
+                <a:spAutoFit/>
+              </a:bodyPr>
+              <a:lstStyle/>
+              <a:p>
+                <a:pPr/>
+                <a14:m>
+                  <m:oMathPara xmlns:m="http://schemas.openxmlformats.org/officeDocument/2006/math">
+                    <m:oMathParaPr>
+                      <m:jc m:val="centerGroup"/>
+                    </m:oMathParaPr>
+                    <m:oMath xmlns:m="http://schemas.openxmlformats.org/officeDocument/2006/math">
+                      <m:r>
+                        <a:rPr lang="en-US" sz="2000" b="0" i="1" smtClean="0">
+                          <a:solidFill>
+                            <a:schemeClr val="tx1"/>
+                          </a:solidFill>
+                          <a:latin typeface="Cambria Math" panose="02040503050406030204" pitchFamily="18" charset="0"/>
+                        </a:rPr>
+                        <m:t>𝜌</m:t>
+                      </m:r>
+                      <m:r>
+                        <a:rPr lang="en-US" sz="2000" b="0" i="1" smtClean="0">
+                          <a:solidFill>
+                            <a:schemeClr val="tx1"/>
+                          </a:solidFill>
+                          <a:latin typeface="Cambria Math" panose="02040503050406030204" pitchFamily="18" charset="0"/>
+                        </a:rPr>
+                        <m:t>(</m:t>
+                      </m:r>
+                      <m:r>
+                        <a:rPr lang="en-US" sz="2000" b="0" i="1" smtClean="0">
+                          <a:solidFill>
+                            <a:schemeClr val="tx1"/>
+                          </a:solidFill>
+                          <a:latin typeface="Cambria Math" panose="02040503050406030204" pitchFamily="18" charset="0"/>
+                        </a:rPr>
+                        <m:t>𝜔</m:t>
+                      </m:r>
+                      <m:r>
+                        <a:rPr lang="en-US" sz="2000" b="0" i="1" smtClean="0">
+                          <a:solidFill>
+                            <a:schemeClr val="tx1"/>
+                          </a:solidFill>
+                          <a:latin typeface="Cambria Math" panose="02040503050406030204" pitchFamily="18" charset="0"/>
+                        </a:rPr>
+                        <m:t>)/</m:t>
+                      </m:r>
+                      <m:sSub>
+                        <m:sSubPr>
+                          <m:ctrlPr>
+                            <a:rPr lang="en-US" sz="2000" b="0" i="1" smtClean="0">
+                              <a:solidFill>
+                                <a:schemeClr val="tx1"/>
+                              </a:solidFill>
+                              <a:latin typeface="Cambria Math" panose="02040503050406030204" pitchFamily="18" charset="0"/>
+                            </a:rPr>
+                          </m:ctrlPr>
+                        </m:sSubPr>
+                        <m:e>
+                          <m:r>
+                            <a:rPr lang="en-US" sz="2000" b="0" i="1" smtClean="0">
+                              <a:solidFill>
+                                <a:schemeClr val="tx1"/>
+                              </a:solidFill>
+                              <a:latin typeface="Cambria Math" panose="02040503050406030204" pitchFamily="18" charset="0"/>
+                            </a:rPr>
+                            <m:t>𝜌</m:t>
+                          </m:r>
+                        </m:e>
+                        <m:sub>
+                          <m:r>
+                            <a:rPr lang="en-US" sz="2000" b="0" i="1" smtClean="0">
+                              <a:solidFill>
+                                <a:schemeClr val="tx1"/>
+                              </a:solidFill>
+                              <a:latin typeface="Cambria Math" panose="02040503050406030204" pitchFamily="18" charset="0"/>
+                            </a:rPr>
+                            <m:t>0</m:t>
+                          </m:r>
+                        </m:sub>
+                      </m:sSub>
+                    </m:oMath>
+                  </m:oMathPara>
+                </a14:m>
+                <a:endParaRPr lang="en-US" sz="2000" dirty="0">
+                  <a:solidFill>
+                    <a:schemeClr val="tx1"/>
+                  </a:solidFill>
+                  <a:latin typeface="Cambria" panose="02040503050406030204" pitchFamily="18" charset="0"/>
+                </a:endParaRPr>
+              </a:p>
+            </p:txBody>
+          </p:sp>
+        </mc:Choice>
+        <mc:Fallback>
+          <p:sp>
+            <p:nvSpPr>
+              <p:cNvPr id="13" name="TextBox 12"/>
+              <p:cNvSpPr txBox="1">
+                <a:spLocks noRot="1" noChangeAspect="1" noMove="1" noResize="1" noEditPoints="1" noAdjustHandles="1" noChangeArrowheads="1" noChangeShapeType="1" noTextEdit="1"/>
+              </p:cNvSpPr>
+              <p:nvPr/>
+            </p:nvSpPr>
+            <p:spPr>
+              <a:xfrm rot="5400000">
+                <a:off x="3887937" y="2676305"/>
+                <a:ext cx="1207412" cy="400110"/>
+              </a:xfrm>
+              <a:prstGeom prst="rect">
+                <a:avLst/>
+              </a:prstGeom>
+              <a:blipFill rotWithShape="0">
+                <a:blip r:embed="rId3"/>
+                <a:stretch>
+                  <a:fillRect l="-18182"/>
+                </a:stretch>
+              </a:blipFill>
+            </p:spPr>
+            <p:txBody>
+              <a:bodyPr/>
+              <a:lstStyle/>
+              <a:p>
+                <a:r>
+                  <a:rPr lang="en-US">
+                    <a:noFill/>
+                  </a:rPr>
+                  <a:t> </a:t>
+                </a:r>
+              </a:p>
+            </p:txBody>
+          </p:sp>
+        </mc:Fallback>
+      </mc:AlternateContent>
+      <p:grpSp>
+        <p:nvGrpSpPr>
+          <p:cNvPr id="15" name="Group 14"/>
+          <p:cNvGrpSpPr/>
+          <p:nvPr/>
+        </p:nvGrpSpPr>
+        <p:grpSpPr>
+          <a:xfrm>
+            <a:off x="3750485" y="4807582"/>
+            <a:ext cx="1098550" cy="400110"/>
+            <a:chOff x="4580189" y="4761926"/>
+            <a:chExt cx="1098550" cy="400110"/>
+          </a:xfrm>
+        </p:grpSpPr>
+        <p:sp>
+          <p:nvSpPr>
+            <p:cNvPr id="14" name="Rectangle 13"/>
+            <p:cNvSpPr/>
+            <p:nvPr/>
+          </p:nvSpPr>
+          <p:spPr bwMode="auto">
+            <a:xfrm>
+              <a:off x="4580189" y="4864099"/>
+              <a:ext cx="1098550" cy="293051"/>
+            </a:xfrm>
+            <a:prstGeom prst="rect">
+              <a:avLst/>
+            </a:prstGeom>
+            <a:solidFill>
+              <a:schemeClr val="bg1"/>
+            </a:solidFill>
+            <a:ln w="9525" cap="flat" cmpd="sng" algn="ctr">
+              <a:solidFill>
+                <a:schemeClr val="bg1"/>
+              </a:solidFill>
+              <a:prstDash val="solid"/>
+              <a:round/>
+              <a:headEnd type="none" w="med" len="med"/>
+              <a:tailEnd type="none" w="med" len="med"/>
+            </a:ln>
+            <a:effectLst/>
+          </p:spPr>
+          <p:txBody>
+            <a:bodyPr vert="horz" wrap="square" lIns="91440" tIns="45720" rIns="91440" bIns="45720" numCol="1" rtlCol="0" anchor="t" anchorCtr="0" compatLnSpc="1">
+              <a:prstTxWarp prst="textNoShape">
+                <a:avLst/>
+              </a:prstTxWarp>
+            </a:bodyPr>
+            <a:lstStyle/>
+            <a:p>
+              <a:pPr marL="0" marR="0" indent="0" algn="l" defTabSz="457200" rtl="0" eaLnBrk="1" fontAlgn="base" latinLnBrk="0" hangingPunct="1">
+                <a:lnSpc>
+                  <a:spcPct val="100000"/>
+                </a:lnSpc>
+                <a:spcBef>
+                  <a:spcPct val="0"/>
+                </a:spcBef>
+                <a:spcAft>
+                  <a:spcPct val="0"/>
+                </a:spcAft>
+                <a:buClr>
+                  <a:srgbClr val="000000"/>
+                </a:buClr>
+                <a:buSzPct val="100000"/>
+                <a:buFont typeface="Times New Roman" pitchFamily="16" charset="0"/>
+                <a:buNone/>
+                <a:tabLst/>
+              </a:pPr>
+              <a:endParaRPr kumimoji="0" lang="en-US" sz="1800" b="0" i="0" u="none" strike="noStrike" cap="none" normalizeH="0" baseline="0" smtClean="0">
+                <a:ln>
+                  <a:noFill/>
+                </a:ln>
+                <a:solidFill>
+                  <a:schemeClr val="bg1"/>
+                </a:solidFill>
+                <a:effectLst/>
+                <a:latin typeface="Arial" charset="0"/>
+              </a:endParaRPr>
+            </a:p>
+          </p:txBody>
+        </p:sp>
+        <mc:AlternateContent xmlns:mc="http://schemas.openxmlformats.org/markup-compatibility/2006">
+          <mc:Choice xmlns:a14="http://schemas.microsoft.com/office/drawing/2010/main" Requires="a14">
+            <p:sp>
+              <p:nvSpPr>
+                <p:cNvPr id="4" name="TextBox 3"/>
+                <p:cNvSpPr txBox="1"/>
+                <p:nvPr/>
+              </p:nvSpPr>
+              <p:spPr>
+                <a:xfrm>
+                  <a:off x="4624840" y="4761926"/>
+                  <a:ext cx="875532" cy="400110"/>
+                </a:xfrm>
+                <a:prstGeom prst="rect">
+                  <a:avLst/>
+                </a:prstGeom>
+                <a:noFill/>
+              </p:spPr>
+              <p:txBody>
+                <a:bodyPr wrap="square" rtlCol="0">
+                  <a:spAutoFit/>
+                </a:bodyPr>
+                <a:lstStyle/>
+                <a:p>
+                  <a:pPr/>
+                  <a14:m>
+                    <m:oMathPara xmlns:m="http://schemas.openxmlformats.org/officeDocument/2006/math">
+                      <m:oMathParaPr>
+                        <m:jc m:val="centerGroup"/>
+                      </m:oMathParaPr>
+                      <m:oMath xmlns:m="http://schemas.openxmlformats.org/officeDocument/2006/math">
+                        <m:r>
+                          <a:rPr lang="en-US" sz="2000" b="0" i="1" smtClean="0">
+                            <a:solidFill>
+                              <a:schemeClr val="tx1"/>
+                            </a:solidFill>
+                            <a:latin typeface="Cambria Math" panose="02040503050406030204" pitchFamily="18" charset="0"/>
+                          </a:rPr>
+                          <m:t>𝜔</m:t>
+                        </m:r>
+                        <m:r>
+                          <a:rPr lang="en-US" sz="2000" b="0" i="1" smtClean="0">
+                            <a:solidFill>
+                              <a:schemeClr val="tx1"/>
+                            </a:solidFill>
+                            <a:latin typeface="Cambria Math" panose="02040503050406030204" pitchFamily="18" charset="0"/>
+                          </a:rPr>
+                          <m:t>/</m:t>
+                        </m:r>
+                        <m:r>
+                          <m:rPr>
+                            <m:sty m:val="p"/>
+                          </m:rPr>
+                          <a:rPr lang="en-US" sz="2000" b="0" i="0" smtClean="0">
+                            <a:solidFill>
+                              <a:schemeClr val="tx1"/>
+                            </a:solidFill>
+                            <a:latin typeface="Cambria Math" panose="02040503050406030204" pitchFamily="18" charset="0"/>
+                          </a:rPr>
+                          <m:t>Δ</m:t>
+                        </m:r>
+                      </m:oMath>
+                    </m:oMathPara>
+                  </a14:m>
+                  <a:endParaRPr lang="en-US" sz="2000" dirty="0">
+                    <a:solidFill>
+                      <a:schemeClr val="tx1"/>
+                    </a:solidFill>
+                    <a:latin typeface="Cambria" panose="02040503050406030204" pitchFamily="18" charset="0"/>
+                  </a:endParaRPr>
+                </a:p>
+              </p:txBody>
+            </p:sp>
+          </mc:Choice>
+          <mc:Fallback>
+            <p:sp>
+              <p:nvSpPr>
+                <p:cNvPr id="4" name="TextBox 3"/>
+                <p:cNvSpPr txBox="1">
+                  <a:spLocks noRot="1" noChangeAspect="1" noMove="1" noResize="1" noEditPoints="1" noAdjustHandles="1" noChangeArrowheads="1" noChangeShapeType="1" noTextEdit="1"/>
+                </p:cNvSpPr>
+                <p:nvPr/>
+              </p:nvSpPr>
+              <p:spPr>
+                <a:xfrm>
+                  <a:off x="4624840" y="4761926"/>
+                  <a:ext cx="875532" cy="400110"/>
+                </a:xfrm>
+                <a:prstGeom prst="rect">
+                  <a:avLst/>
+                </a:prstGeom>
+                <a:blipFill rotWithShape="0">
+                  <a:blip r:embed="rId4"/>
+                  <a:stretch>
+                    <a:fillRect b="-18462"/>
+                  </a:stretch>
+                </a:blipFill>
+              </p:spPr>
+              <p:txBody>
+                <a:bodyPr/>
+                <a:lstStyle/>
+                <a:p>
+                  <a:r>
+                    <a:rPr lang="en-US">
+                      <a:noFill/>
+                    </a:rPr>
+                    <a:t> </a:t>
+                  </a:r>
+                </a:p>
+              </p:txBody>
+            </p:sp>
+          </mc:Fallback>
+        </mc:AlternateContent>
+      </p:grpSp>
+      <p:cxnSp>
+        <p:nvCxnSpPr>
+          <p:cNvPr id="25" name="Straight Connector 24"/>
+          <p:cNvCxnSpPr/>
+          <p:nvPr/>
+        </p:nvCxnSpPr>
+        <p:spPr bwMode="auto">
+          <a:xfrm>
+            <a:off x="2817035" y="2002412"/>
+            <a:ext cx="539750" cy="6350"/>
+          </a:xfrm>
+          <a:prstGeom prst="line">
+            <a:avLst/>
+          </a:prstGeom>
+          <a:solidFill>
+            <a:srgbClr val="00B8FF"/>
+          </a:solidFill>
+          <a:ln w="25400" cap="flat" cmpd="sng" algn="ctr">
+            <a:solidFill>
+              <a:srgbClr val="FF0000"/>
+            </a:solidFill>
+            <a:prstDash val="solid"/>
+            <a:round/>
+            <a:headEnd type="none" w="med" len="med"/>
+            <a:tailEnd type="none" w="med" len="med"/>
+          </a:ln>
+          <a:effectLst/>
+        </p:spPr>
+      </p:cxnSp>
+      <p:cxnSp>
+        <p:nvCxnSpPr>
+          <p:cNvPr id="26" name="Straight Connector 25"/>
+          <p:cNvCxnSpPr/>
+          <p:nvPr/>
+        </p:nvCxnSpPr>
+        <p:spPr bwMode="auto">
+          <a:xfrm>
+            <a:off x="4610486" y="2003031"/>
+            <a:ext cx="539750" cy="6350"/>
+          </a:xfrm>
+          <a:prstGeom prst="line">
+            <a:avLst/>
+          </a:prstGeom>
+          <a:solidFill>
+            <a:srgbClr val="00B8FF"/>
+          </a:solidFill>
+          <a:ln w="25400" cap="flat" cmpd="sng" algn="ctr">
+            <a:solidFill>
+              <a:srgbClr val="0404BC"/>
+            </a:solidFill>
+            <a:prstDash val="solid"/>
+            <a:round/>
+            <a:headEnd type="none" w="med" len="med"/>
+            <a:tailEnd type="none" w="med" len="med"/>
+          </a:ln>
+          <a:effectLst/>
+        </p:spPr>
+      </p:cxnSp>
+      <p:sp>
+        <p:nvSpPr>
+          <p:cNvPr id="27" name="TextBox 26"/>
+          <p:cNvSpPr txBox="1"/>
+          <p:nvPr/>
+        </p:nvSpPr>
+        <p:spPr>
+          <a:xfrm>
+            <a:off x="5090429" y="1826652"/>
+            <a:ext cx="965443" cy="307777"/>
+          </a:xfrm>
+          <a:prstGeom prst="rect">
+            <a:avLst/>
+          </a:prstGeom>
+          <a:noFill/>
+        </p:spPr>
+        <p:txBody>
+          <a:bodyPr wrap="square" rtlCol="0">
+            <a:spAutoFit/>
+          </a:bodyPr>
+          <a:lstStyle/>
+          <a:p>
+            <a:r>
+              <a:rPr lang="en-US" sz="1400" dirty="0" smtClean="0">
+                <a:solidFill>
+                  <a:schemeClr val="tx1"/>
+                </a:solidFill>
+              </a:rPr>
+              <a:t>spin up</a:t>
+            </a:r>
+            <a:endParaRPr lang="en-US" sz="1400" dirty="0">
+              <a:solidFill>
+                <a:schemeClr val="tx1"/>
+              </a:solidFill>
+            </a:endParaRPr>
+          </a:p>
+        </p:txBody>
+      </p:sp>
+      <p:sp>
+        <p:nvSpPr>
+          <p:cNvPr id="28" name="TextBox 27"/>
+          <p:cNvSpPr txBox="1"/>
+          <p:nvPr/>
+        </p:nvSpPr>
+        <p:spPr>
+          <a:xfrm>
+            <a:off x="3311338" y="1842213"/>
+            <a:ext cx="1132205" cy="307777"/>
+          </a:xfrm>
+          <a:prstGeom prst="rect">
+            <a:avLst/>
+          </a:prstGeom>
+          <a:noFill/>
+        </p:spPr>
+        <p:txBody>
+          <a:bodyPr wrap="square" rtlCol="0">
+            <a:spAutoFit/>
+          </a:bodyPr>
+          <a:lstStyle/>
+          <a:p>
+            <a:r>
+              <a:rPr lang="en-US" sz="1400" dirty="0" smtClean="0">
+                <a:solidFill>
+                  <a:schemeClr val="tx1"/>
+                </a:solidFill>
+              </a:rPr>
+              <a:t>spin down</a:t>
+            </a:r>
+            <a:endParaRPr lang="en-US" sz="1400" dirty="0">
+              <a:solidFill>
+                <a:schemeClr val="tx1"/>
+              </a:solidFill>
+            </a:endParaRPr>
+          </a:p>
+        </p:txBody>
+      </p:sp>
+    </p:spTree>
+    <p:extLst>
+      <p:ext uri="{BB962C8B-B14F-4D97-AF65-F5344CB8AC3E}">
+        <p14:creationId xmlns:p14="http://schemas.microsoft.com/office/powerpoint/2010/main" val="2843493538"/>
+      </p:ext>
+    </p:extLst>
+  </p:cSld>
+  <p:clrMapOvr>
+    <a:masterClrMapping/>
+  </p:clrMapOvr>
+</p:sld>
+</file>
+
+<file path=ppt/slides/slide9.xml><?xml version="1.0" encoding="utf-8"?>
+<p:sld xmlns:a="http://schemas.openxmlformats.org/drawingml/2006/main" xmlns:r="http://schemas.openxmlformats.org/officeDocument/2006/relationships" xmlns:p="http://schemas.openxmlformats.org/presentationml/2006/main">
+  <p:cSld>
+    <p:spTree>
+      <p:nvGrpSpPr>
+        <p:cNvPr id="1" name=""/>
+        <p:cNvGrpSpPr/>
+        <p:nvPr/>
+      </p:nvGrpSpPr>
+      <p:grpSpPr>
+        <a:xfrm>
+          <a:off x="0" y="0"/>
+          <a:ext cx="0" cy="0"/>
+          <a:chOff x="0" y="0"/>
+          <a:chExt cx="0" cy="0"/>
+        </a:xfrm>
+      </p:grpSpPr>
+      <p:sp>
+        <p:nvSpPr>
+          <p:cNvPr id="2" name="Rectangle 6"/>
+          <p:cNvSpPr>
+            <a:spLocks noChangeArrowheads="1"/>
+          </p:cNvSpPr>
+          <p:nvPr/>
+        </p:nvSpPr>
+        <p:spPr bwMode="auto">
+          <a:xfrm>
+            <a:off x="2288109" y="1742904"/>
+            <a:ext cx="3889587" cy="3886200"/>
+          </a:xfrm>
+          <a:prstGeom prst="rect">
+            <a:avLst/>
+          </a:prstGeom>
+          <a:noFill/>
+          <a:ln w="9360">
+            <a:solidFill>
+              <a:srgbClr val="000000"/>
+            </a:solidFill>
+            <a:miter lim="800000"/>
+            <a:headEnd/>
+            <a:tailEnd/>
+          </a:ln>
+          <a:extLst>
+            <a:ext uri="{909E8E84-426E-40DD-AFC4-6F175D3DCCD1}">
+              <a14:hiddenFill xmlns:a14="http://schemas.microsoft.com/office/drawing/2010/main">
+                <a:solidFill>
+                  <a:srgbClr val="FFFFFF"/>
+                </a:solidFill>
+              </a14:hiddenFill>
+            </a:ext>
+          </a:extLst>
+        </p:spPr>
+        <p:txBody>
+          <a:bodyPr wrap="none" anchor="ctr"/>
+          <a:lstStyle/>
+          <a:p>
+            <a:pPr eaLnBrk="1" hangingPunct="1">
+              <a:buClr>
+                <a:srgbClr val="000000"/>
+              </a:buClr>
+              <a:buSzPct val="100000"/>
+              <a:buFont typeface="Times New Roman" panose="02020603050405020304" pitchFamily="18" charset="0"/>
+              <a:buNone/>
+            </a:pPr>
+            <a:endParaRPr lang="en-US" altLang="en-US"/>
+          </a:p>
+        </p:txBody>
+      </p:sp>
+      <p:pic>
+        <p:nvPicPr>
+          <p:cNvPr id="3" name="Picture 2"/>
+          <p:cNvPicPr>
+            <a:picLocks noChangeAspect="1"/>
+          </p:cNvPicPr>
+          <p:nvPr/>
+        </p:nvPicPr>
+        <p:blipFill>
+          <a:blip r:embed="rId2">
+            <a:extLst>
+              <a:ext uri="{28A0092B-C50C-407E-A947-70E740481C1C}">
+                <a14:useLocalDpi xmlns:a14="http://schemas.microsoft.com/office/drawing/2010/main" val="0"/>
+              </a:ext>
+            </a:extLst>
+          </a:blip>
+          <a:stretch>
+            <a:fillRect/>
+          </a:stretch>
+        </p:blipFill>
+        <p:spPr>
+          <a:xfrm>
+            <a:off x="2407722" y="2286699"/>
+            <a:ext cx="3650358" cy="2798607"/>
+          </a:xfrm>
+          <a:prstGeom prst="rect">
+            <a:avLst/>
+          </a:prstGeom>
+        </p:spPr>
+      </p:pic>
+      <mc:AlternateContent xmlns:mc="http://schemas.openxmlformats.org/markup-compatibility/2006">
+        <mc:Choice xmlns:a14="http://schemas.microsoft.com/office/drawing/2010/main" Requires="a14">
+          <p:sp>
+            <p:nvSpPr>
+              <p:cNvPr id="13" name="TextBox 12"/>
+              <p:cNvSpPr txBox="1"/>
+              <p:nvPr/>
+            </p:nvSpPr>
+            <p:spPr>
+              <a:xfrm rot="5400000">
+                <a:off x="3887937" y="2676305"/>
+                <a:ext cx="1207412" cy="400110"/>
+              </a:xfrm>
+              <a:prstGeom prst="rect">
+                <a:avLst/>
+              </a:prstGeom>
+              <a:noFill/>
+            </p:spPr>
+            <p:txBody>
+              <a:bodyPr wrap="square" rtlCol="0">
+                <a:spAutoFit/>
+              </a:bodyPr>
+              <a:lstStyle/>
+              <a:p>
+                <a:pPr/>
+                <a14:m>
+                  <m:oMathPara xmlns:m="http://schemas.openxmlformats.org/officeDocument/2006/math">
+                    <m:oMathParaPr>
+                      <m:jc m:val="centerGroup"/>
+                    </m:oMathParaPr>
+                    <m:oMath xmlns:m="http://schemas.openxmlformats.org/officeDocument/2006/math">
+                      <m:r>
+                        <a:rPr lang="en-US" sz="2000" b="0" i="1" smtClean="0">
+                          <a:solidFill>
+                            <a:schemeClr val="tx1"/>
+                          </a:solidFill>
+                          <a:latin typeface="Cambria Math" panose="02040503050406030204" pitchFamily="18" charset="0"/>
+                        </a:rPr>
+                        <m:t>𝜌</m:t>
+                      </m:r>
+                      <m:r>
+                        <a:rPr lang="en-US" sz="2000" b="0" i="1" smtClean="0">
+                          <a:solidFill>
+                            <a:schemeClr val="tx1"/>
+                          </a:solidFill>
+                          <a:latin typeface="Cambria Math" panose="02040503050406030204" pitchFamily="18" charset="0"/>
+                        </a:rPr>
+                        <m:t>(</m:t>
+                      </m:r>
+                      <m:r>
+                        <a:rPr lang="en-US" sz="2000" b="0" i="1" smtClean="0">
+                          <a:solidFill>
+                            <a:schemeClr val="tx1"/>
+                          </a:solidFill>
+                          <a:latin typeface="Cambria Math" panose="02040503050406030204" pitchFamily="18" charset="0"/>
+                        </a:rPr>
+                        <m:t>𝜔</m:t>
+                      </m:r>
+                      <m:r>
+                        <a:rPr lang="en-US" sz="2000" b="0" i="1" smtClean="0">
+                          <a:solidFill>
+                            <a:schemeClr val="tx1"/>
+                          </a:solidFill>
+                          <a:latin typeface="Cambria Math" panose="02040503050406030204" pitchFamily="18" charset="0"/>
+                        </a:rPr>
+                        <m:t>)/</m:t>
+                      </m:r>
+                      <m:sSub>
+                        <m:sSubPr>
+                          <m:ctrlPr>
+                            <a:rPr lang="en-US" sz="2000" b="0" i="1" smtClean="0">
+                              <a:solidFill>
+                                <a:schemeClr val="tx1"/>
+                              </a:solidFill>
+                              <a:latin typeface="Cambria Math" panose="02040503050406030204" pitchFamily="18" charset="0"/>
+                            </a:rPr>
+                          </m:ctrlPr>
+                        </m:sSubPr>
+                        <m:e>
+                          <m:r>
+                            <a:rPr lang="en-US" sz="2000" b="0" i="1" smtClean="0">
+                              <a:solidFill>
+                                <a:schemeClr val="tx1"/>
+                              </a:solidFill>
+                              <a:latin typeface="Cambria Math" panose="02040503050406030204" pitchFamily="18" charset="0"/>
+                            </a:rPr>
+                            <m:t>𝜌</m:t>
+                          </m:r>
+                        </m:e>
+                        <m:sub>
+                          <m:r>
+                            <a:rPr lang="en-US" sz="2000" b="0" i="1" smtClean="0">
+                              <a:solidFill>
+                                <a:schemeClr val="tx1"/>
+                              </a:solidFill>
+                              <a:latin typeface="Cambria Math" panose="02040503050406030204" pitchFamily="18" charset="0"/>
+                            </a:rPr>
+                            <m:t>0</m:t>
+                          </m:r>
+                        </m:sub>
+                      </m:sSub>
+                    </m:oMath>
+                  </m:oMathPara>
+                </a14:m>
+                <a:endParaRPr lang="en-US" sz="2000" dirty="0">
+                  <a:solidFill>
+                    <a:schemeClr val="tx1"/>
+                  </a:solidFill>
+                  <a:latin typeface="Cambria" panose="02040503050406030204" pitchFamily="18" charset="0"/>
+                </a:endParaRPr>
+              </a:p>
+            </p:txBody>
+          </p:sp>
+        </mc:Choice>
+        <mc:Fallback>
+          <p:sp>
+            <p:nvSpPr>
+              <p:cNvPr id="13" name="TextBox 12"/>
+              <p:cNvSpPr txBox="1">
+                <a:spLocks noRot="1" noChangeAspect="1" noMove="1" noResize="1" noEditPoints="1" noAdjustHandles="1" noChangeArrowheads="1" noChangeShapeType="1" noTextEdit="1"/>
+              </p:cNvSpPr>
+              <p:nvPr/>
+            </p:nvSpPr>
+            <p:spPr>
+              <a:xfrm rot="5400000">
+                <a:off x="3887937" y="2676305"/>
+                <a:ext cx="1207412" cy="400110"/>
+              </a:xfrm>
+              <a:prstGeom prst="rect">
+                <a:avLst/>
+              </a:prstGeom>
+              <a:blipFill rotWithShape="0">
+                <a:blip r:embed="rId3"/>
+                <a:stretch>
+                  <a:fillRect l="-18182"/>
+                </a:stretch>
+              </a:blipFill>
+            </p:spPr>
+            <p:txBody>
+              <a:bodyPr/>
+              <a:lstStyle/>
+              <a:p>
+                <a:r>
+                  <a:rPr lang="en-US">
+                    <a:noFill/>
+                  </a:rPr>
+                  <a:t> </a:t>
+                </a:r>
+              </a:p>
+            </p:txBody>
+          </p:sp>
+        </mc:Fallback>
+      </mc:AlternateContent>
+      <p:grpSp>
+        <p:nvGrpSpPr>
+          <p:cNvPr id="15" name="Group 14"/>
+          <p:cNvGrpSpPr/>
+          <p:nvPr/>
+        </p:nvGrpSpPr>
+        <p:grpSpPr>
+          <a:xfrm>
+            <a:off x="3750485" y="4807582"/>
+            <a:ext cx="1098550" cy="400110"/>
+            <a:chOff x="4580189" y="4761926"/>
+            <a:chExt cx="1098550" cy="400110"/>
+          </a:xfrm>
+        </p:grpSpPr>
+        <p:sp>
+          <p:nvSpPr>
+            <p:cNvPr id="14" name="Rectangle 13"/>
+            <p:cNvSpPr/>
+            <p:nvPr/>
+          </p:nvSpPr>
+          <p:spPr bwMode="auto">
+            <a:xfrm>
+              <a:off x="4580189" y="4864099"/>
+              <a:ext cx="1098550" cy="293051"/>
+            </a:xfrm>
+            <a:prstGeom prst="rect">
+              <a:avLst/>
+            </a:prstGeom>
+            <a:solidFill>
+              <a:schemeClr val="bg1"/>
+            </a:solidFill>
+            <a:ln w="9525" cap="flat" cmpd="sng" algn="ctr">
+              <a:solidFill>
+                <a:schemeClr val="bg1"/>
+              </a:solidFill>
+              <a:prstDash val="solid"/>
+              <a:round/>
+              <a:headEnd type="none" w="med" len="med"/>
+              <a:tailEnd type="none" w="med" len="med"/>
+            </a:ln>
+            <a:effectLst/>
+          </p:spPr>
+          <p:txBody>
+            <a:bodyPr vert="horz" wrap="square" lIns="91440" tIns="45720" rIns="91440" bIns="45720" numCol="1" rtlCol="0" anchor="t" anchorCtr="0" compatLnSpc="1">
+              <a:prstTxWarp prst="textNoShape">
+                <a:avLst/>
+              </a:prstTxWarp>
+            </a:bodyPr>
+            <a:lstStyle/>
+            <a:p>
+              <a:pPr marL="0" marR="0" indent="0" algn="l" defTabSz="457200" rtl="0" eaLnBrk="1" fontAlgn="base" latinLnBrk="0" hangingPunct="1">
+                <a:lnSpc>
+                  <a:spcPct val="100000"/>
+                </a:lnSpc>
+                <a:spcBef>
+                  <a:spcPct val="0"/>
+                </a:spcBef>
+                <a:spcAft>
+                  <a:spcPct val="0"/>
+                </a:spcAft>
+                <a:buClr>
+                  <a:srgbClr val="000000"/>
+                </a:buClr>
+                <a:buSzPct val="100000"/>
+                <a:buFont typeface="Times New Roman" pitchFamily="16" charset="0"/>
+                <a:buNone/>
+                <a:tabLst/>
+              </a:pPr>
+              <a:endParaRPr kumimoji="0" lang="en-US" sz="1800" b="0" i="0" u="none" strike="noStrike" cap="none" normalizeH="0" baseline="0" smtClean="0">
+                <a:ln>
+                  <a:noFill/>
+                </a:ln>
+                <a:solidFill>
+                  <a:schemeClr val="bg1"/>
+                </a:solidFill>
+                <a:effectLst/>
+                <a:latin typeface="Arial" charset="0"/>
+              </a:endParaRPr>
+            </a:p>
+          </p:txBody>
+        </p:sp>
+        <mc:AlternateContent xmlns:mc="http://schemas.openxmlformats.org/markup-compatibility/2006">
+          <mc:Choice xmlns:a14="http://schemas.microsoft.com/office/drawing/2010/main" Requires="a14">
+            <p:sp>
+              <p:nvSpPr>
+                <p:cNvPr id="4" name="TextBox 3"/>
+                <p:cNvSpPr txBox="1"/>
+                <p:nvPr/>
+              </p:nvSpPr>
+              <p:spPr>
+                <a:xfrm>
+                  <a:off x="4624840" y="4761926"/>
+                  <a:ext cx="875532" cy="400110"/>
+                </a:xfrm>
+                <a:prstGeom prst="rect">
+                  <a:avLst/>
+                </a:prstGeom>
+                <a:noFill/>
+              </p:spPr>
+              <p:txBody>
+                <a:bodyPr wrap="square" rtlCol="0">
+                  <a:spAutoFit/>
+                </a:bodyPr>
+                <a:lstStyle/>
+                <a:p>
+                  <a:pPr/>
+                  <a14:m>
+                    <m:oMathPara xmlns:m="http://schemas.openxmlformats.org/officeDocument/2006/math">
+                      <m:oMathParaPr>
+                        <m:jc m:val="centerGroup"/>
+                      </m:oMathParaPr>
+                      <m:oMath xmlns:m="http://schemas.openxmlformats.org/officeDocument/2006/math">
+                        <m:r>
+                          <a:rPr lang="en-US" sz="2000" b="0" i="1" smtClean="0">
+                            <a:solidFill>
+                              <a:schemeClr val="tx1"/>
+                            </a:solidFill>
+                            <a:latin typeface="Cambria Math" panose="02040503050406030204" pitchFamily="18" charset="0"/>
+                          </a:rPr>
+                          <m:t>𝜔</m:t>
+                        </m:r>
+                        <m:r>
+                          <a:rPr lang="en-US" sz="2000" b="0" i="1" smtClean="0">
+                            <a:solidFill>
+                              <a:schemeClr val="tx1"/>
+                            </a:solidFill>
+                            <a:latin typeface="Cambria Math" panose="02040503050406030204" pitchFamily="18" charset="0"/>
+                          </a:rPr>
+                          <m:t>/</m:t>
+                        </m:r>
+                        <m:r>
+                          <m:rPr>
+                            <m:sty m:val="p"/>
+                          </m:rPr>
+                          <a:rPr lang="en-US" sz="2000" b="0" i="0" smtClean="0">
+                            <a:solidFill>
+                              <a:schemeClr val="tx1"/>
+                            </a:solidFill>
+                            <a:latin typeface="Cambria Math" panose="02040503050406030204" pitchFamily="18" charset="0"/>
+                          </a:rPr>
+                          <m:t>Δ</m:t>
+                        </m:r>
+                      </m:oMath>
+                    </m:oMathPara>
+                  </a14:m>
+                  <a:endParaRPr lang="en-US" sz="2000" dirty="0">
+                    <a:solidFill>
+                      <a:schemeClr val="tx1"/>
+                    </a:solidFill>
+                    <a:latin typeface="Cambria" panose="02040503050406030204" pitchFamily="18" charset="0"/>
+                  </a:endParaRPr>
+                </a:p>
+              </p:txBody>
+            </p:sp>
+          </mc:Choice>
+          <mc:Fallback>
+            <p:sp>
+              <p:nvSpPr>
+                <p:cNvPr id="4" name="TextBox 3"/>
+                <p:cNvSpPr txBox="1">
+                  <a:spLocks noRot="1" noChangeAspect="1" noMove="1" noResize="1" noEditPoints="1" noAdjustHandles="1" noChangeArrowheads="1" noChangeShapeType="1" noTextEdit="1"/>
+                </p:cNvSpPr>
+                <p:nvPr/>
+              </p:nvSpPr>
+              <p:spPr>
+                <a:xfrm>
+                  <a:off x="4624840" y="4761926"/>
+                  <a:ext cx="875532" cy="400110"/>
+                </a:xfrm>
+                <a:prstGeom prst="rect">
+                  <a:avLst/>
+                </a:prstGeom>
+                <a:blipFill rotWithShape="0">
+                  <a:blip r:embed="rId4"/>
+                  <a:stretch>
+                    <a:fillRect b="-18462"/>
+                  </a:stretch>
+                </a:blipFill>
+              </p:spPr>
+              <p:txBody>
+                <a:bodyPr/>
+                <a:lstStyle/>
+                <a:p>
+                  <a:r>
+                    <a:rPr lang="en-US">
+                      <a:noFill/>
+                    </a:rPr>
+                    <a:t> </a:t>
+                  </a:r>
+                </a:p>
+              </p:txBody>
+            </p:sp>
+          </mc:Fallback>
+        </mc:AlternateContent>
+      </p:grpSp>
+      <p:cxnSp>
+        <p:nvCxnSpPr>
+          <p:cNvPr id="25" name="Straight Connector 24"/>
+          <p:cNvCxnSpPr/>
+          <p:nvPr/>
+        </p:nvCxnSpPr>
+        <p:spPr bwMode="auto">
+          <a:xfrm>
+            <a:off x="2817035" y="2002412"/>
+            <a:ext cx="539750" cy="6350"/>
+          </a:xfrm>
+          <a:prstGeom prst="line">
+            <a:avLst/>
+          </a:prstGeom>
+          <a:solidFill>
+            <a:srgbClr val="00B8FF"/>
+          </a:solidFill>
+          <a:ln w="25400" cap="flat" cmpd="sng" algn="ctr">
+            <a:solidFill>
+              <a:srgbClr val="FF0000"/>
+            </a:solidFill>
+            <a:prstDash val="solid"/>
+            <a:round/>
+            <a:headEnd type="none" w="med" len="med"/>
+            <a:tailEnd type="none" w="med" len="med"/>
+          </a:ln>
+          <a:effectLst/>
+        </p:spPr>
+      </p:cxnSp>
+      <p:cxnSp>
+        <p:nvCxnSpPr>
+          <p:cNvPr id="26" name="Straight Connector 25"/>
+          <p:cNvCxnSpPr/>
+          <p:nvPr/>
+        </p:nvCxnSpPr>
+        <p:spPr bwMode="auto">
+          <a:xfrm>
+            <a:off x="4610486" y="2003031"/>
+            <a:ext cx="539750" cy="6350"/>
+          </a:xfrm>
+          <a:prstGeom prst="line">
+            <a:avLst/>
+          </a:prstGeom>
+          <a:solidFill>
+            <a:srgbClr val="00B8FF"/>
+          </a:solidFill>
+          <a:ln w="25400" cap="flat" cmpd="sng" algn="ctr">
+            <a:solidFill>
+              <a:srgbClr val="0404BC"/>
+            </a:solidFill>
+            <a:prstDash val="solid"/>
+            <a:round/>
+            <a:headEnd type="none" w="med" len="med"/>
+            <a:tailEnd type="none" w="med" len="med"/>
+          </a:ln>
+          <a:effectLst/>
+        </p:spPr>
+      </p:cxnSp>
+      <p:sp>
+        <p:nvSpPr>
+          <p:cNvPr id="27" name="TextBox 26"/>
+          <p:cNvSpPr txBox="1"/>
+          <p:nvPr/>
+        </p:nvSpPr>
+        <p:spPr>
+          <a:xfrm>
+            <a:off x="5090429" y="1826652"/>
+            <a:ext cx="965443" cy="307777"/>
+          </a:xfrm>
+          <a:prstGeom prst="rect">
+            <a:avLst/>
+          </a:prstGeom>
+          <a:noFill/>
+        </p:spPr>
+        <p:txBody>
+          <a:bodyPr wrap="square" rtlCol="0">
+            <a:spAutoFit/>
+          </a:bodyPr>
+          <a:lstStyle/>
+          <a:p>
+            <a:r>
+              <a:rPr lang="en-US" sz="1400" dirty="0" smtClean="0">
+                <a:solidFill>
+                  <a:schemeClr val="tx1"/>
+                </a:solidFill>
+              </a:rPr>
+              <a:t>spin up</a:t>
+            </a:r>
+            <a:endParaRPr lang="en-US" sz="1400" dirty="0">
+              <a:solidFill>
+                <a:schemeClr val="tx1"/>
+              </a:solidFill>
+            </a:endParaRPr>
+          </a:p>
+        </p:txBody>
+      </p:sp>
+      <p:sp>
+        <p:nvSpPr>
+          <p:cNvPr id="28" name="TextBox 27"/>
+          <p:cNvSpPr txBox="1"/>
+          <p:nvPr/>
+        </p:nvSpPr>
+        <p:spPr>
+          <a:xfrm>
+            <a:off x="3311338" y="1842213"/>
+            <a:ext cx="1132205" cy="307777"/>
+          </a:xfrm>
+          <a:prstGeom prst="rect">
+            <a:avLst/>
+          </a:prstGeom>
+          <a:noFill/>
+        </p:spPr>
+        <p:txBody>
+          <a:bodyPr wrap="square" rtlCol="0">
+            <a:spAutoFit/>
+          </a:bodyPr>
+          <a:lstStyle/>
+          <a:p>
+            <a:r>
+              <a:rPr lang="en-US" sz="1400" dirty="0" smtClean="0">
+                <a:solidFill>
+                  <a:schemeClr val="tx1"/>
+                </a:solidFill>
+              </a:rPr>
+              <a:t>spin down</a:t>
+            </a:r>
+            <a:endParaRPr lang="en-US" sz="1400" dirty="0">
+              <a:solidFill>
+                <a:schemeClr val="tx1"/>
+              </a:solidFill>
+            </a:endParaRPr>
+          </a:p>
+        </p:txBody>
+      </p:sp>
+    </p:spTree>
+    <p:extLst>
+      <p:ext uri="{BB962C8B-B14F-4D97-AF65-F5344CB8AC3E}">
+        <p14:creationId xmlns:p14="http://schemas.microsoft.com/office/powerpoint/2010/main" val="3132049333"/>
       </p:ext>
     </p:extLst>
   </p:cSld>

</xml_diff>